<commit_message>
[RA1 Ch03] Placement Service (#1938)
* [RA1 Ch03] Placement Service

3.3.1.3 Cloud Controller Services: Split Nova entry into Placement and Nova

Fixes #1887

* [RA1 Ch04] Placement Service

Changes to 4.3.1.6 Nova and 4.3.1.10 Placement for OSTK Train.

* [RA1 Figures] Delete Core Srevices Figure

Delete RA1-Ch03-Core-Cloud-Infra-Services.png -- will be replaced by new Figure

* [RA1 Figures] Upload New Core Services Figure

Upload New Core Services Figure with Barbican and Placement Srevices

* [RA1 Figures] Upload New Core Srevices Figure

* [RA1 Figures] Delete old source file

Delete old source file -- will be replaced with source file for updated figure

* [RA1 Figures] Upload Source for Update Figure

* [RA1 Ch04] 4.3.1.10 spelling "prior"
</commit_message>
<xml_diff>
--- a/doc/ref_arch/openstack/figures/artefacts/RA1-Ch03-Core-Cloud-Infra-Services.pptx
+++ b/doc/ref_arch/openstack/figures/artefacts/RA1-Ch03-Core-Cloud-Infra-Services.pptx
@@ -259,7 +259,7 @@
           <a:p>
             <a:fld id="{342159D6-67C7-40E2-8C3A-19E3D49AF9D3}" type="datetimeFigureOut">
               <a:rPr lang="en-US" smtClean="0"/>
-              <a:t>5/18/2020</a:t>
+              <a:t>8/31/2020</a:t>
             </a:fld>
             <a:endParaRPr lang="en-US"/>
           </a:p>
@@ -457,7 +457,7 @@
           <a:p>
             <a:fld id="{342159D6-67C7-40E2-8C3A-19E3D49AF9D3}" type="datetimeFigureOut">
               <a:rPr lang="en-US" smtClean="0"/>
-              <a:t>5/18/2020</a:t>
+              <a:t>8/31/2020</a:t>
             </a:fld>
             <a:endParaRPr lang="en-US"/>
           </a:p>
@@ -665,7 +665,7 @@
           <a:p>
             <a:fld id="{342159D6-67C7-40E2-8C3A-19E3D49AF9D3}" type="datetimeFigureOut">
               <a:rPr lang="en-US" smtClean="0"/>
-              <a:t>5/18/2020</a:t>
+              <a:t>8/31/2020</a:t>
             </a:fld>
             <a:endParaRPr lang="en-US"/>
           </a:p>
@@ -863,7 +863,7 @@
           <a:p>
             <a:fld id="{342159D6-67C7-40E2-8C3A-19E3D49AF9D3}" type="datetimeFigureOut">
               <a:rPr lang="en-US" smtClean="0"/>
-              <a:t>5/18/2020</a:t>
+              <a:t>8/31/2020</a:t>
             </a:fld>
             <a:endParaRPr lang="en-US"/>
           </a:p>
@@ -1138,7 +1138,7 @@
           <a:p>
             <a:fld id="{342159D6-67C7-40E2-8C3A-19E3D49AF9D3}" type="datetimeFigureOut">
               <a:rPr lang="en-US" smtClean="0"/>
-              <a:t>5/18/2020</a:t>
+              <a:t>8/31/2020</a:t>
             </a:fld>
             <a:endParaRPr lang="en-US"/>
           </a:p>
@@ -1403,7 +1403,7 @@
           <a:p>
             <a:fld id="{342159D6-67C7-40E2-8C3A-19E3D49AF9D3}" type="datetimeFigureOut">
               <a:rPr lang="en-US" smtClean="0"/>
-              <a:t>5/18/2020</a:t>
+              <a:t>8/31/2020</a:t>
             </a:fld>
             <a:endParaRPr lang="en-US"/>
           </a:p>
@@ -1815,7 +1815,7 @@
           <a:p>
             <a:fld id="{342159D6-67C7-40E2-8C3A-19E3D49AF9D3}" type="datetimeFigureOut">
               <a:rPr lang="en-US" smtClean="0"/>
-              <a:t>5/18/2020</a:t>
+              <a:t>8/31/2020</a:t>
             </a:fld>
             <a:endParaRPr lang="en-US"/>
           </a:p>
@@ -1956,7 +1956,7 @@
           <a:p>
             <a:fld id="{342159D6-67C7-40E2-8C3A-19E3D49AF9D3}" type="datetimeFigureOut">
               <a:rPr lang="en-US" smtClean="0"/>
-              <a:t>5/18/2020</a:t>
+              <a:t>8/31/2020</a:t>
             </a:fld>
             <a:endParaRPr lang="en-US"/>
           </a:p>
@@ -2069,7 +2069,7 @@
           <a:p>
             <a:fld id="{342159D6-67C7-40E2-8C3A-19E3D49AF9D3}" type="datetimeFigureOut">
               <a:rPr lang="en-US" smtClean="0"/>
-              <a:t>5/18/2020</a:t>
+              <a:t>8/31/2020</a:t>
             </a:fld>
             <a:endParaRPr lang="en-US"/>
           </a:p>
@@ -2380,7 +2380,7 @@
           <a:p>
             <a:fld id="{342159D6-67C7-40E2-8C3A-19E3D49AF9D3}" type="datetimeFigureOut">
               <a:rPr lang="en-US" smtClean="0"/>
-              <a:t>5/18/2020</a:t>
+              <a:t>8/31/2020</a:t>
             </a:fld>
             <a:endParaRPr lang="en-US"/>
           </a:p>
@@ -2668,7 +2668,7 @@
           <a:p>
             <a:fld id="{342159D6-67C7-40E2-8C3A-19E3D49AF9D3}" type="datetimeFigureOut">
               <a:rPr lang="en-US" smtClean="0"/>
-              <a:t>5/18/2020</a:t>
+              <a:t>8/31/2020</a:t>
             </a:fld>
             <a:endParaRPr lang="en-US"/>
           </a:p>
@@ -2909,7 +2909,7 @@
           <a:p>
             <a:fld id="{342159D6-67C7-40E2-8C3A-19E3D49AF9D3}" type="datetimeFigureOut">
               <a:rPr lang="en-US" smtClean="0"/>
-              <a:t>5/18/2020</a:t>
+              <a:t>8/31/2020</a:t>
             </a:fld>
             <a:endParaRPr lang="en-US"/>
           </a:p>
@@ -3341,7 +3341,7 @@
         <p:spPr>
           <a:xfrm>
             <a:off x="3036105" y="4262627"/>
-            <a:ext cx="6151028" cy="1904530"/>
+            <a:ext cx="5384607" cy="1904530"/>
           </a:xfrm>
           <a:prstGeom prst="rect">
             <a:avLst/>
@@ -3413,7 +3413,7 @@
         </p:nvSpPr>
         <p:spPr>
           <a:xfrm>
-            <a:off x="9260691" y="1401323"/>
+            <a:off x="8658621" y="1418889"/>
             <a:ext cx="1862974" cy="889480"/>
           </a:xfrm>
           <a:prstGeom prst="rect">
@@ -3487,8 +3487,8 @@
         </p:nvSpPr>
         <p:spPr>
           <a:xfrm>
-            <a:off x="3409728" y="5785770"/>
-            <a:ext cx="5653689" cy="272932"/>
+            <a:off x="3409728" y="5778878"/>
+            <a:ext cx="4737797" cy="279824"/>
           </a:xfrm>
           <a:prstGeom prst="rect">
             <a:avLst/>
@@ -3566,7 +3566,7 @@
         <p:spPr>
           <a:xfrm>
             <a:off x="3027873" y="276045"/>
-            <a:ext cx="6159260" cy="3925019"/>
+            <a:ext cx="5384607" cy="3925019"/>
           </a:xfrm>
           <a:prstGeom prst="rect">
             <a:avLst/>
@@ -3639,7 +3639,7 @@
         <p:spPr>
           <a:xfrm>
             <a:off x="3405994" y="1074507"/>
-            <a:ext cx="5657423" cy="221097"/>
+            <a:ext cx="4698083" cy="178087"/>
           </a:xfrm>
           <a:prstGeom prst="rect">
             <a:avLst/>
@@ -4823,83 +4823,12 @@
           </p:txBody>
         </p:sp>
       </p:grpSp>
-      <p:sp>
-        <p:nvSpPr>
-          <p:cNvPr id="11" name="Rectangle 10">
-            <a:extLst>
-              <a:ext uri="{FF2B5EF4-FFF2-40B4-BE49-F238E27FC236}">
-                <a16:creationId xmlns:a16="http://schemas.microsoft.com/office/drawing/2014/main" id="{F7DD8C9A-C7DD-4CD1-87DE-6A8407B46750}"/>
-              </a:ext>
-            </a:extLst>
-          </p:cNvPr>
-          <p:cNvSpPr/>
-          <p:nvPr/>
-        </p:nvSpPr>
-        <p:spPr>
-          <a:xfrm>
-            <a:off x="4355516" y="1356689"/>
-            <a:ext cx="4707901" cy="1015630"/>
-          </a:xfrm>
-          <a:prstGeom prst="rect">
-            <a:avLst/>
-          </a:prstGeom>
-          <a:solidFill>
-            <a:srgbClr val="00B050"/>
-          </a:solidFill>
-          <a:ln w="25400" cap="flat" cmpd="sng" algn="ctr">
-            <a:noFill/>
-            <a:prstDash val="solid"/>
-          </a:ln>
-          <a:effectLst/>
-        </p:spPr>
-        <p:style>
-          <a:lnRef idx="2">
-            <a:scrgbClr r="0" g="0" b="0"/>
-          </a:lnRef>
-          <a:fillRef idx="1">
-            <a:scrgbClr r="0" g="0" b="0"/>
-          </a:fillRef>
-          <a:effectRef idx="0">
-            <a:scrgbClr r="0" g="0" b="0"/>
-          </a:effectRef>
-          <a:fontRef idx="minor">
-            <a:schemeClr val="lt1"/>
-          </a:fontRef>
-        </p:style>
-        <p:txBody>
-          <a:bodyPr spcFirstLastPara="0" vert="horz" wrap="square" lIns="6350" tIns="6350" rIns="6350" bIns="6350" numCol="1" spcCol="1270" rtlCol="0" anchor="ctr" anchorCtr="0">
-            <a:noAutofit/>
-          </a:bodyPr>
-          <a:lstStyle/>
-          <a:p>
-            <a:pPr algn="ctr" defTabSz="444500">
-              <a:lnSpc>
-                <a:spcPct val="90000"/>
-              </a:lnSpc>
-              <a:spcBef>
-                <a:spcPct val="0"/>
-              </a:spcBef>
-              <a:spcAft>
-                <a:spcPct val="35000"/>
-              </a:spcAft>
-            </a:pPr>
-            <a:endParaRPr lang="en-GB" sz="1000" kern="1200" dirty="0">
-              <a:solidFill>
-                <a:srgbClr val="34342B"/>
-              </a:solidFill>
-              <a:latin typeface="Vodafone Rg" pitchFamily="34" charset="0"/>
-              <a:ea typeface="+mn-ea"/>
-              <a:cs typeface="+mn-cs"/>
-            </a:endParaRPr>
-          </a:p>
-        </p:txBody>
-      </p:sp>
       <p:grpSp>
         <p:nvGrpSpPr>
-          <p:cNvPr id="4" name="Group 3">
-            <a:extLst>
-              <a:ext uri="{FF2B5EF4-FFF2-40B4-BE49-F238E27FC236}">
-                <a16:creationId xmlns:a16="http://schemas.microsoft.com/office/drawing/2014/main" id="{85C125E2-8F17-4130-A4F9-8AEA108497A1}"/>
+          <p:cNvPr id="3" name="Group 2">
+            <a:extLst>
+              <a:ext uri="{FF2B5EF4-FFF2-40B4-BE49-F238E27FC236}">
+                <a16:creationId xmlns:a16="http://schemas.microsoft.com/office/drawing/2014/main" id="{1CFFFEE9-A1DE-41C0-8A02-12E98F2622A4}"/>
               </a:ext>
             </a:extLst>
           </p:cNvPr>
@@ -4908,140 +4837,232 @@
         </p:nvGrpSpPr>
         <p:grpSpPr>
           <a:xfrm>
-            <a:off x="5791303" y="1381727"/>
-            <a:ext cx="1393714" cy="1009170"/>
-            <a:chOff x="4441360" y="1676314"/>
-            <a:chExt cx="1393714" cy="1009170"/>
+            <a:off x="4354544" y="1350973"/>
+            <a:ext cx="883043" cy="1035351"/>
+            <a:chOff x="4355516" y="1335684"/>
+            <a:chExt cx="1846005" cy="1035351"/>
           </a:xfrm>
         </p:grpSpPr>
-        <p:pic>
-          <p:nvPicPr>
-            <p:cNvPr id="37" name="Picture 36" descr="https://www.openstack.org/software/images/mascots/keystone.png">
+        <p:sp>
+          <p:nvSpPr>
+            <p:cNvPr id="11" name="Rectangle 10">
               <a:extLst>
                 <a:ext uri="{FF2B5EF4-FFF2-40B4-BE49-F238E27FC236}">
-                  <a16:creationId xmlns:a16="http://schemas.microsoft.com/office/drawing/2014/main" id="{289A6C8A-1C08-46A6-A003-E79ADE023335}"/>
+                  <a16:creationId xmlns:a16="http://schemas.microsoft.com/office/drawing/2014/main" id="{F7DD8C9A-C7DD-4CD1-87DE-6A8407B46750}"/>
                 </a:ext>
               </a:extLst>
             </p:cNvPr>
-            <p:cNvPicPr/>
+            <p:cNvSpPr/>
             <p:nvPr/>
-          </p:nvPicPr>
-          <p:blipFill>
-            <a:blip r:embed="rId7">
-              <a:extLst>
-                <a:ext uri="{28A0092B-C50C-407E-A947-70E740481C1C}">
-                  <a14:useLocalDpi xmlns:a14="http://schemas.microsoft.com/office/drawing/2010/main" val="0"/>
-                </a:ext>
-              </a:extLst>
-            </a:blip>
-            <a:srcRect/>
-            <a:stretch>
-              <a:fillRect/>
-            </a:stretch>
-          </p:blipFill>
-          <p:spPr bwMode="auto">
+          </p:nvSpPr>
+          <p:spPr>
             <a:xfrm>
-              <a:off x="4876143" y="1866590"/>
-              <a:ext cx="524148" cy="426841"/>
+              <a:off x="4355516" y="1335684"/>
+              <a:ext cx="1846005" cy="1019085"/>
             </a:xfrm>
             <a:prstGeom prst="rect">
               <a:avLst/>
             </a:prstGeom>
-            <a:noFill/>
-            <a:ln>
+            <a:solidFill>
+              <a:srgbClr val="00B050"/>
+            </a:solidFill>
+            <a:ln w="25400" cap="flat" cmpd="sng" algn="ctr">
               <a:noFill/>
+              <a:prstDash val="solid"/>
             </a:ln>
+            <a:effectLst/>
           </p:spPr>
-        </p:pic>
-        <p:sp>
-          <p:nvSpPr>
-            <p:cNvPr id="38" name="TextBox 37">
-              <a:extLst>
-                <a:ext uri="{FF2B5EF4-FFF2-40B4-BE49-F238E27FC236}">
-                  <a16:creationId xmlns:a16="http://schemas.microsoft.com/office/drawing/2014/main" id="{72E74F7B-06A3-4E60-91AB-DE9CBE1D96ED}"/>
-                </a:ext>
-              </a:extLst>
-            </p:cNvPr>
-            <p:cNvSpPr txBox="1"/>
-            <p:nvPr/>
-          </p:nvSpPr>
-          <p:spPr>
-            <a:xfrm>
-              <a:off x="4441360" y="1676314"/>
-              <a:ext cx="1393714" cy="115533"/>
-            </a:xfrm>
-            <a:prstGeom prst="rect">
-              <a:avLst/>
-            </a:prstGeom>
-          </p:spPr>
+          <p:style>
+            <a:lnRef idx="2">
+              <a:scrgbClr r="0" g="0" b="0"/>
+            </a:lnRef>
+            <a:fillRef idx="1">
+              <a:scrgbClr r="0" g="0" b="0"/>
+            </a:fillRef>
+            <a:effectRef idx="0">
+              <a:scrgbClr r="0" g="0" b="0"/>
+            </a:effectRef>
+            <a:fontRef idx="minor">
+              <a:schemeClr val="lt1"/>
+            </a:fontRef>
+          </p:style>
           <p:txBody>
-            <a:bodyPr wrap="square" lIns="0" tIns="0" rIns="0" bIns="0" rtlCol="0">
+            <a:bodyPr spcFirstLastPara="0" vert="horz" wrap="square" lIns="6350" tIns="6350" rIns="6350" bIns="6350" numCol="1" spcCol="1270" rtlCol="0" anchor="ctr" anchorCtr="0">
               <a:noAutofit/>
             </a:bodyPr>
             <a:lstStyle/>
             <a:p>
-              <a:pPr marL="0" indent="0" algn="ctr">
-                <a:buFont typeface="Arial" pitchFamily="34" charset="0"/>
-                <a:buNone/>
+              <a:pPr algn="ctr" defTabSz="444500">
+                <a:lnSpc>
+                  <a:spcPct val="90000"/>
+                </a:lnSpc>
+                <a:spcBef>
+                  <a:spcPct val="0"/>
+                </a:spcBef>
+                <a:spcAft>
+                  <a:spcPct val="35000"/>
+                </a:spcAft>
               </a:pPr>
-              <a:r>
-                <a:rPr lang="en-GB" sz="800" b="1" dirty="0">
-                  <a:latin typeface="Vodafone Rg" pitchFamily="34" charset="0"/>
-                </a:rPr>
-                <a:t>Tenant Services</a:t>
-              </a:r>
-            </a:p>
-            <a:p>
-              <a:pPr marL="0" indent="0" algn="ctr">
-                <a:buFont typeface="Arial" pitchFamily="34" charset="0"/>
-                <a:buNone/>
-              </a:pPr>
-              <a:endParaRPr lang="en-GB" sz="800" dirty="0">
+              <a:endParaRPr lang="en-GB" sz="1000" kern="1200" dirty="0">
+                <a:solidFill>
+                  <a:srgbClr val="34342B"/>
+                </a:solidFill>
                 <a:latin typeface="Vodafone Rg" pitchFamily="34" charset="0"/>
+                <a:ea typeface="+mn-ea"/>
+                <a:cs typeface="+mn-cs"/>
               </a:endParaRPr>
             </a:p>
           </p:txBody>
         </p:sp>
-        <p:sp>
-          <p:nvSpPr>
-            <p:cNvPr id="47" name="TextBox 46">
+        <p:grpSp>
+          <p:nvGrpSpPr>
+            <p:cNvPr id="4" name="Group 3">
               <a:extLst>
                 <a:ext uri="{FF2B5EF4-FFF2-40B4-BE49-F238E27FC236}">
-                  <a16:creationId xmlns:a16="http://schemas.microsoft.com/office/drawing/2014/main" id="{67C68949-4096-4DFC-AE8B-AA92551ED30A}"/>
+                  <a16:creationId xmlns:a16="http://schemas.microsoft.com/office/drawing/2014/main" id="{85C125E2-8F17-4130-A4F9-8AEA108497A1}"/>
                 </a:ext>
               </a:extLst>
             </p:cNvPr>
-            <p:cNvSpPr txBox="1"/>
+            <p:cNvGrpSpPr/>
             <p:nvPr/>
-          </p:nvSpPr>
-          <p:spPr>
+          </p:nvGrpSpPr>
+          <p:grpSpPr>
             <a:xfrm>
-              <a:off x="4447803" y="2454185"/>
-              <a:ext cx="1380829" cy="231299"/>
+              <a:off x="4581661" y="1361865"/>
+              <a:ext cx="1393714" cy="1009170"/>
+              <a:chOff x="4441360" y="1676314"/>
+              <a:chExt cx="1393714" cy="1009170"/>
             </a:xfrm>
-            <a:prstGeom prst="rect">
-              <a:avLst/>
-            </a:prstGeom>
-          </p:spPr>
-          <p:txBody>
-            <a:bodyPr wrap="square" lIns="0" tIns="0" rIns="0" bIns="0" rtlCol="0">
-              <a:noAutofit/>
-            </a:bodyPr>
-            <a:lstStyle/>
-            <a:p>
-              <a:pPr marL="0" indent="0" algn="ctr">
-                <a:buFont typeface="Arial" pitchFamily="34" charset="0"/>
-                <a:buNone/>
-              </a:pPr>
-              <a:r>
-                <a:rPr lang="en-GB" sz="800" b="1" dirty="0">
+          </p:grpSpPr>
+          <p:pic>
+            <p:nvPicPr>
+              <p:cNvPr id="37" name="Picture 36" descr="https://www.openstack.org/software/images/mascots/keystone.png">
+                <a:extLst>
+                  <a:ext uri="{FF2B5EF4-FFF2-40B4-BE49-F238E27FC236}">
+                    <a16:creationId xmlns:a16="http://schemas.microsoft.com/office/drawing/2014/main" id="{289A6C8A-1C08-46A6-A003-E79ADE023335}"/>
+                  </a:ext>
+                </a:extLst>
+              </p:cNvPr>
+              <p:cNvPicPr/>
+              <p:nvPr/>
+            </p:nvPicPr>
+            <p:blipFill>
+              <a:blip r:embed="rId7">
+                <a:extLst>
+                  <a:ext uri="{28A0092B-C50C-407E-A947-70E740481C1C}">
+                    <a14:useLocalDpi xmlns:a14="http://schemas.microsoft.com/office/drawing/2010/main" val="0"/>
+                  </a:ext>
+                </a:extLst>
+              </a:blip>
+              <a:srcRect/>
+              <a:stretch>
+                <a:fillRect/>
+              </a:stretch>
+            </p:blipFill>
+            <p:spPr bwMode="auto">
+              <a:xfrm>
+                <a:off x="4876143" y="1866590"/>
+                <a:ext cx="524148" cy="426841"/>
+              </a:xfrm>
+              <a:prstGeom prst="rect">
+                <a:avLst/>
+              </a:prstGeom>
+              <a:noFill/>
+              <a:ln>
+                <a:noFill/>
+              </a:ln>
+            </p:spPr>
+          </p:pic>
+          <p:sp>
+            <p:nvSpPr>
+              <p:cNvPr id="38" name="TextBox 37">
+                <a:extLst>
+                  <a:ext uri="{FF2B5EF4-FFF2-40B4-BE49-F238E27FC236}">
+                    <a16:creationId xmlns:a16="http://schemas.microsoft.com/office/drawing/2014/main" id="{72E74F7B-06A3-4E60-91AB-DE9CBE1D96ED}"/>
+                  </a:ext>
+                </a:extLst>
+              </p:cNvPr>
+              <p:cNvSpPr txBox="1"/>
+              <p:nvPr/>
+            </p:nvSpPr>
+            <p:spPr>
+              <a:xfrm>
+                <a:off x="4441360" y="1676314"/>
+                <a:ext cx="1393714" cy="115533"/>
+              </a:xfrm>
+              <a:prstGeom prst="rect">
+                <a:avLst/>
+              </a:prstGeom>
+            </p:spPr>
+            <p:txBody>
+              <a:bodyPr wrap="square" lIns="0" tIns="0" rIns="0" bIns="0" rtlCol="0">
+                <a:noAutofit/>
+              </a:bodyPr>
+              <a:lstStyle/>
+              <a:p>
+                <a:pPr marL="0" indent="0" algn="ctr">
+                  <a:buFont typeface="Arial" pitchFamily="34" charset="0"/>
+                  <a:buNone/>
+                </a:pPr>
+                <a:r>
+                  <a:rPr lang="en-GB" sz="800" b="1" dirty="0">
+                    <a:latin typeface="Vodafone Rg" pitchFamily="34" charset="0"/>
+                  </a:rPr>
+                  <a:t>Tenant Services</a:t>
+                </a:r>
+              </a:p>
+              <a:p>
+                <a:pPr marL="0" indent="0" algn="ctr">
+                  <a:buFont typeface="Arial" pitchFamily="34" charset="0"/>
+                  <a:buNone/>
+                </a:pPr>
+                <a:endParaRPr lang="en-GB" sz="800" dirty="0">
                   <a:latin typeface="Vodafone Rg" pitchFamily="34" charset="0"/>
-                </a:rPr>
-                <a:t>KEYSTONE</a:t>
-              </a:r>
-            </a:p>
-          </p:txBody>
-        </p:sp>
+                </a:endParaRPr>
+              </a:p>
+            </p:txBody>
+          </p:sp>
+          <p:sp>
+            <p:nvSpPr>
+              <p:cNvPr id="47" name="TextBox 46">
+                <a:extLst>
+                  <a:ext uri="{FF2B5EF4-FFF2-40B4-BE49-F238E27FC236}">
+                    <a16:creationId xmlns:a16="http://schemas.microsoft.com/office/drawing/2014/main" id="{67C68949-4096-4DFC-AE8B-AA92551ED30A}"/>
+                  </a:ext>
+                </a:extLst>
+              </p:cNvPr>
+              <p:cNvSpPr txBox="1"/>
+              <p:nvPr/>
+            </p:nvSpPr>
+            <p:spPr>
+              <a:xfrm>
+                <a:off x="4447803" y="2454185"/>
+                <a:ext cx="1380829" cy="231299"/>
+              </a:xfrm>
+              <a:prstGeom prst="rect">
+                <a:avLst/>
+              </a:prstGeom>
+            </p:spPr>
+            <p:txBody>
+              <a:bodyPr wrap="square" lIns="0" tIns="0" rIns="0" bIns="0" rtlCol="0">
+                <a:noAutofit/>
+              </a:bodyPr>
+              <a:lstStyle/>
+              <a:p>
+                <a:pPr marL="0" indent="0" algn="ctr">
+                  <a:buFont typeface="Arial" pitchFamily="34" charset="0"/>
+                  <a:buNone/>
+                </a:pPr>
+                <a:r>
+                  <a:rPr lang="en-GB" sz="800" b="1" dirty="0">
+                    <a:latin typeface="Vodafone Rg" pitchFamily="34" charset="0"/>
+                  </a:rPr>
+                  <a:t>KEYSTONE</a:t>
+                </a:r>
+              </a:p>
+            </p:txBody>
+          </p:sp>
+        </p:grpSp>
       </p:grpSp>
       <p:grpSp>
         <p:nvGrpSpPr>
@@ -5057,7 +5078,7 @@
         </p:nvGrpSpPr>
         <p:grpSpPr>
           <a:xfrm>
-            <a:off x="6265192" y="2433250"/>
+            <a:off x="5291301" y="1335670"/>
             <a:ext cx="898917" cy="1043959"/>
             <a:chOff x="7188241" y="2725652"/>
             <a:chExt cx="898917" cy="1043959"/>
@@ -5280,7 +5301,7 @@
         </p:nvSpPr>
         <p:spPr>
           <a:xfrm>
-            <a:off x="9311380" y="1452482"/>
+            <a:off x="8709310" y="1470048"/>
             <a:ext cx="1460028" cy="774112"/>
           </a:xfrm>
           <a:prstGeom prst="rect">
@@ -5352,7 +5373,7 @@
         </p:nvGrpSpPr>
         <p:grpSpPr>
           <a:xfrm>
-            <a:off x="7224644" y="2436903"/>
+            <a:off x="6270111" y="2437604"/>
             <a:ext cx="894878" cy="1043959"/>
             <a:chOff x="9804945" y="1602735"/>
             <a:chExt cx="894878" cy="1043959"/>
@@ -5578,7 +5599,7 @@
         </p:nvGrpSpPr>
         <p:grpSpPr>
           <a:xfrm>
-            <a:off x="8157022" y="2436903"/>
+            <a:off x="7241129" y="2422982"/>
             <a:ext cx="906396" cy="1034021"/>
             <a:chOff x="8091870" y="3344065"/>
             <a:chExt cx="906396" cy="1034021"/>
@@ -5817,7 +5838,7 @@
         <p:spPr>
           <a:xfrm>
             <a:off x="5306643" y="3585062"/>
-            <a:ext cx="3756774" cy="221097"/>
+            <a:ext cx="2840882" cy="254559"/>
           </a:xfrm>
           <a:prstGeom prst="rect">
             <a:avLst/>
@@ -5899,7 +5920,7 @@
         </p:nvGrpSpPr>
         <p:grpSpPr>
           <a:xfrm>
-            <a:off x="5893333" y="4369848"/>
+            <a:off x="5303840" y="4355876"/>
             <a:ext cx="906580" cy="1043959"/>
             <a:chOff x="3396900" y="2743836"/>
             <a:chExt cx="906580" cy="1043959"/>
@@ -6110,7 +6131,7 @@
         </p:nvGrpSpPr>
         <p:grpSpPr>
           <a:xfrm>
-            <a:off x="6869095" y="4369848"/>
+            <a:off x="6290967" y="4382006"/>
             <a:ext cx="896836" cy="1072201"/>
             <a:chOff x="4354177" y="2732397"/>
             <a:chExt cx="896836" cy="1072201"/>
@@ -6469,7 +6490,7 @@
         </p:nvGrpSpPr>
         <p:grpSpPr>
           <a:xfrm>
-            <a:off x="7875235" y="4374379"/>
+            <a:off x="7260192" y="4359863"/>
             <a:ext cx="896836" cy="1043959"/>
             <a:chOff x="7793663" y="4153047"/>
             <a:chExt cx="896836" cy="1043959"/>
@@ -6900,10 +6921,10 @@
       </p:grpSp>
       <p:grpSp>
         <p:nvGrpSpPr>
-          <p:cNvPr id="105" name="Group 104">
-            <a:extLst>
-              <a:ext uri="{FF2B5EF4-FFF2-40B4-BE49-F238E27FC236}">
-                <a16:creationId xmlns:a16="http://schemas.microsoft.com/office/drawing/2014/main" id="{E23F16CB-43BB-46CC-9E43-5E5F89A89CFB}"/>
+          <p:cNvPr id="52" name="Group 51">
+            <a:extLst>
+              <a:ext uri="{FF2B5EF4-FFF2-40B4-BE49-F238E27FC236}">
+                <a16:creationId xmlns:a16="http://schemas.microsoft.com/office/drawing/2014/main" id="{91947338-CB24-4300-84A9-28719EAF868E}"/>
               </a:ext>
             </a:extLst>
           </p:cNvPr>
@@ -6912,18 +6933,1323 @@
         </p:nvGrpSpPr>
         <p:grpSpPr>
           <a:xfrm>
-            <a:off x="4900535" y="4369435"/>
+            <a:off x="4338539" y="4380498"/>
             <a:ext cx="905717" cy="1033544"/>
-            <a:chOff x="3396900" y="2754251"/>
+            <a:chOff x="4338539" y="4380498"/>
             <a:chExt cx="905717" cy="1033544"/>
+          </a:xfrm>
+        </p:grpSpPr>
+        <p:grpSp>
+          <p:nvGrpSpPr>
+            <p:cNvPr id="105" name="Group 104">
+              <a:extLst>
+                <a:ext uri="{FF2B5EF4-FFF2-40B4-BE49-F238E27FC236}">
+                  <a16:creationId xmlns:a16="http://schemas.microsoft.com/office/drawing/2014/main" id="{E23F16CB-43BB-46CC-9E43-5E5F89A89CFB}"/>
+                </a:ext>
+              </a:extLst>
+            </p:cNvPr>
+            <p:cNvGrpSpPr/>
+            <p:nvPr/>
+          </p:nvGrpSpPr>
+          <p:grpSpPr>
+            <a:xfrm>
+              <a:off x="4338539" y="4380498"/>
+              <a:ext cx="905717" cy="1033544"/>
+              <a:chOff x="3396900" y="2754251"/>
+              <a:chExt cx="905717" cy="1033544"/>
+            </a:xfrm>
+          </p:grpSpPr>
+          <p:sp>
+            <p:nvSpPr>
+              <p:cNvPr id="106" name="Rectangle 105">
+                <a:extLst>
+                  <a:ext uri="{FF2B5EF4-FFF2-40B4-BE49-F238E27FC236}">
+                    <a16:creationId xmlns:a16="http://schemas.microsoft.com/office/drawing/2014/main" id="{DC54F51C-C6CF-45B2-995B-C95F9FDF3677}"/>
+                  </a:ext>
+                </a:extLst>
+              </p:cNvPr>
+              <p:cNvSpPr/>
+              <p:nvPr/>
+            </p:nvSpPr>
+            <p:spPr>
+              <a:xfrm>
+                <a:off x="3401722" y="2754251"/>
+                <a:ext cx="894878" cy="1033544"/>
+              </a:xfrm>
+              <a:prstGeom prst="rect">
+                <a:avLst/>
+              </a:prstGeom>
+              <a:solidFill>
+                <a:srgbClr val="00B050"/>
+              </a:solidFill>
+              <a:ln w="25400" cap="flat" cmpd="sng" algn="ctr">
+                <a:noFill/>
+                <a:prstDash val="solid"/>
+              </a:ln>
+              <a:effectLst/>
+            </p:spPr>
+            <p:style>
+              <a:lnRef idx="2">
+                <a:scrgbClr r="0" g="0" b="0"/>
+              </a:lnRef>
+              <a:fillRef idx="1">
+                <a:scrgbClr r="0" g="0" b="0"/>
+              </a:fillRef>
+              <a:effectRef idx="0">
+                <a:scrgbClr r="0" g="0" b="0"/>
+              </a:effectRef>
+              <a:fontRef idx="minor">
+                <a:schemeClr val="lt1"/>
+              </a:fontRef>
+            </p:style>
+            <p:txBody>
+              <a:bodyPr spcFirstLastPara="0" vert="horz" wrap="square" lIns="6350" tIns="6350" rIns="6350" bIns="6350" numCol="1" spcCol="1270" rtlCol="0" anchor="ctr" anchorCtr="0">
+                <a:noAutofit/>
+              </a:bodyPr>
+              <a:lstStyle/>
+              <a:p>
+                <a:pPr algn="ctr" defTabSz="444500">
+                  <a:lnSpc>
+                    <a:spcPct val="90000"/>
+                  </a:lnSpc>
+                  <a:spcBef>
+                    <a:spcPct val="0"/>
+                  </a:spcBef>
+                  <a:spcAft>
+                    <a:spcPct val="35000"/>
+                  </a:spcAft>
+                </a:pPr>
+                <a:endParaRPr lang="en-GB" sz="1000" kern="1200" dirty="0">
+                  <a:solidFill>
+                    <a:srgbClr val="34342B"/>
+                  </a:solidFill>
+                  <a:latin typeface="Vodafone Rg" pitchFamily="34" charset="0"/>
+                  <a:ea typeface="+mn-ea"/>
+                  <a:cs typeface="+mn-cs"/>
+                </a:endParaRPr>
+              </a:p>
+            </p:txBody>
+          </p:sp>
+          <p:sp>
+            <p:nvSpPr>
+              <p:cNvPr id="108" name="TextBox 107">
+                <a:extLst>
+                  <a:ext uri="{FF2B5EF4-FFF2-40B4-BE49-F238E27FC236}">
+                    <a16:creationId xmlns:a16="http://schemas.microsoft.com/office/drawing/2014/main" id="{5DF03EA4-5544-49FA-80A9-59B34F356762}"/>
+                  </a:ext>
+                </a:extLst>
+              </p:cNvPr>
+              <p:cNvSpPr txBox="1"/>
+              <p:nvPr/>
+            </p:nvSpPr>
+            <p:spPr>
+              <a:xfrm>
+                <a:off x="3400859" y="2787269"/>
+                <a:ext cx="901758" cy="158719"/>
+              </a:xfrm>
+              <a:prstGeom prst="rect">
+                <a:avLst/>
+              </a:prstGeom>
+            </p:spPr>
+            <p:txBody>
+              <a:bodyPr wrap="square" lIns="0" tIns="0" rIns="0" bIns="0" rtlCol="0">
+                <a:noAutofit/>
+              </a:bodyPr>
+              <a:lstStyle/>
+              <a:p>
+                <a:pPr marL="0" indent="0" algn="ctr">
+                  <a:buFont typeface="Arial" pitchFamily="34" charset="0"/>
+                  <a:buNone/>
+                </a:pPr>
+                <a:r>
+                  <a:rPr lang="en-GB" sz="800" b="1" dirty="0">
+                    <a:latin typeface="Vodafone Rg" pitchFamily="34" charset="0"/>
+                  </a:rPr>
+                  <a:t>Virtual switch</a:t>
+                </a:r>
+              </a:p>
+            </p:txBody>
+          </p:sp>
+          <p:sp>
+            <p:nvSpPr>
+              <p:cNvPr id="109" name="TextBox 108">
+                <a:extLst>
+                  <a:ext uri="{FF2B5EF4-FFF2-40B4-BE49-F238E27FC236}">
+                    <a16:creationId xmlns:a16="http://schemas.microsoft.com/office/drawing/2014/main" id="{FF66E979-99E2-4833-9ABF-E57CE37152A4}"/>
+                  </a:ext>
+                </a:extLst>
+              </p:cNvPr>
+              <p:cNvSpPr txBox="1"/>
+              <p:nvPr/>
+            </p:nvSpPr>
+            <p:spPr>
+              <a:xfrm>
+                <a:off x="3396900" y="3589110"/>
+                <a:ext cx="880481" cy="196299"/>
+              </a:xfrm>
+              <a:prstGeom prst="rect">
+                <a:avLst/>
+              </a:prstGeom>
+            </p:spPr>
+            <p:txBody>
+              <a:bodyPr wrap="square" lIns="0" tIns="0" rIns="0" bIns="0" rtlCol="0">
+                <a:noAutofit/>
+              </a:bodyPr>
+              <a:lstStyle/>
+              <a:p>
+                <a:pPr marL="0" indent="0" algn="ctr">
+                  <a:buFont typeface="Arial" pitchFamily="34" charset="0"/>
+                  <a:buNone/>
+                </a:pPr>
+                <a:r>
+                  <a:rPr lang="en-GB" sz="800" b="1" dirty="0" err="1">
+                    <a:latin typeface="Vodafone Rg" pitchFamily="34" charset="0"/>
+                  </a:rPr>
+                  <a:t>OvS</a:t>
+                </a:r>
+                <a:r>
+                  <a:rPr lang="en-GB" sz="800" b="1" dirty="0">
+                    <a:latin typeface="Vodafone Rg" pitchFamily="34" charset="0"/>
+                  </a:rPr>
+                  <a:t> / DPDK</a:t>
+                </a:r>
+              </a:p>
+            </p:txBody>
+          </p:sp>
+        </p:grpSp>
+        <p:pic>
+          <p:nvPicPr>
+            <p:cNvPr id="55" name="Picture 54">
+              <a:extLst>
+                <a:ext uri="{FF2B5EF4-FFF2-40B4-BE49-F238E27FC236}">
+                  <a16:creationId xmlns:a16="http://schemas.microsoft.com/office/drawing/2014/main" id="{8F337140-3308-4578-9B50-F27C10601492}"/>
+                </a:ext>
+              </a:extLst>
+            </p:cNvPr>
+            <p:cNvPicPr>
+              <a:picLocks noChangeAspect="1"/>
+            </p:cNvPicPr>
+            <p:nvPr/>
+          </p:nvPicPr>
+          <p:blipFill>
+            <a:blip r:embed="rId11">
+              <a:clrChange>
+                <a:clrFrom>
+                  <a:srgbClr val="FFFFFF"/>
+                </a:clrFrom>
+                <a:clrTo>
+                  <a:srgbClr val="FFFFFF">
+                    <a:alpha val="0"/>
+                  </a:srgbClr>
+                </a:clrTo>
+              </a:clrChange>
+            </a:blip>
+            <a:stretch>
+              <a:fillRect/>
+            </a:stretch>
+          </p:blipFill>
+          <p:spPr>
+            <a:xfrm>
+              <a:off x="4621276" y="4637185"/>
+              <a:ext cx="339260" cy="213919"/>
+            </a:xfrm>
+            <a:prstGeom prst="rect">
+              <a:avLst/>
+            </a:prstGeom>
+          </p:spPr>
+        </p:pic>
+        <p:pic>
+          <p:nvPicPr>
+            <p:cNvPr id="63" name="Picture 62">
+              <a:extLst>
+                <a:ext uri="{FF2B5EF4-FFF2-40B4-BE49-F238E27FC236}">
+                  <a16:creationId xmlns:a16="http://schemas.microsoft.com/office/drawing/2014/main" id="{9D81D0A9-DCD3-4753-BCA5-1BAD8534246C}"/>
+                </a:ext>
+              </a:extLst>
+            </p:cNvPr>
+            <p:cNvPicPr>
+              <a:picLocks noChangeAspect="1"/>
+            </p:cNvPicPr>
+            <p:nvPr/>
+          </p:nvPicPr>
+          <p:blipFill>
+            <a:blip r:embed="rId12" cstate="print">
+              <a:extLst>
+                <a:ext uri="{28A0092B-C50C-407E-A947-70E740481C1C}">
+                  <a14:useLocalDpi xmlns:a14="http://schemas.microsoft.com/office/drawing/2010/main" val="0"/>
+                </a:ext>
+              </a:extLst>
+            </a:blip>
+            <a:stretch>
+              <a:fillRect/>
+            </a:stretch>
+          </p:blipFill>
+          <p:spPr>
+            <a:xfrm>
+              <a:off x="4577851" y="4903405"/>
+              <a:ext cx="426110" cy="234824"/>
+            </a:xfrm>
+            <a:prstGeom prst="rect">
+              <a:avLst/>
+            </a:prstGeom>
+          </p:spPr>
+        </p:pic>
+      </p:grpSp>
+      <p:sp>
+        <p:nvSpPr>
+          <p:cNvPr id="116" name="Rectangle 115">
+            <a:extLst>
+              <a:ext uri="{FF2B5EF4-FFF2-40B4-BE49-F238E27FC236}">
+                <a16:creationId xmlns:a16="http://schemas.microsoft.com/office/drawing/2014/main" id="{CAD5372E-BB4A-450C-88AC-9F2098D43162}"/>
+              </a:ext>
+            </a:extLst>
+          </p:cNvPr>
+          <p:cNvSpPr/>
+          <p:nvPr/>
+        </p:nvSpPr>
+        <p:spPr>
+          <a:xfrm>
+            <a:off x="5893333" y="5472816"/>
+            <a:ext cx="878728" cy="221097"/>
+          </a:xfrm>
+          <a:prstGeom prst="rect">
+            <a:avLst/>
+          </a:prstGeom>
+          <a:solidFill>
+            <a:srgbClr val="00B050"/>
+          </a:solidFill>
+          <a:ln w="25400" cap="flat" cmpd="sng" algn="ctr">
+            <a:noFill/>
+            <a:prstDash val="solid"/>
+          </a:ln>
+          <a:effectLst/>
+        </p:spPr>
+        <p:style>
+          <a:lnRef idx="2">
+            <a:scrgbClr r="0" g="0" b="0"/>
+          </a:lnRef>
+          <a:fillRef idx="1">
+            <a:scrgbClr r="0" g="0" b="0"/>
+          </a:fillRef>
+          <a:effectRef idx="0">
+            <a:scrgbClr r="0" g="0" b="0"/>
+          </a:effectRef>
+          <a:fontRef idx="minor">
+            <a:schemeClr val="lt1"/>
+          </a:fontRef>
+        </p:style>
+        <p:txBody>
+          <a:bodyPr spcFirstLastPara="0" vert="horz" wrap="square" lIns="6350" tIns="6350" rIns="6350" bIns="6350" numCol="1" spcCol="1270" rtlCol="0" anchor="ctr" anchorCtr="0">
+            <a:noAutofit/>
+          </a:bodyPr>
+          <a:lstStyle/>
+          <a:p>
+            <a:pPr algn="ctr" defTabSz="444500">
+              <a:lnSpc>
+                <a:spcPct val="90000"/>
+              </a:lnSpc>
+              <a:spcBef>
+                <a:spcPct val="0"/>
+              </a:spcBef>
+              <a:spcAft>
+                <a:spcPct val="35000"/>
+              </a:spcAft>
+            </a:pPr>
+            <a:r>
+              <a:rPr lang="en-GB" sz="1000" b="1" kern="1200" dirty="0">
+                <a:solidFill>
+                  <a:schemeClr val="tx1"/>
+                </a:solidFill>
+                <a:latin typeface="Vodafone Rg" pitchFamily="34" charset="0"/>
+                <a:ea typeface="+mn-ea"/>
+                <a:cs typeface="+mn-cs"/>
+              </a:rPr>
+              <a:t>Monitoring</a:t>
+            </a:r>
+          </a:p>
+        </p:txBody>
+      </p:sp>
+      <p:sp>
+        <p:nvSpPr>
+          <p:cNvPr id="117" name="Rectangle 116">
+            <a:extLst>
+              <a:ext uri="{FF2B5EF4-FFF2-40B4-BE49-F238E27FC236}">
+                <a16:creationId xmlns:a16="http://schemas.microsoft.com/office/drawing/2014/main" id="{C129B30A-03E5-4288-922C-75141416A189}"/>
+              </a:ext>
+            </a:extLst>
+          </p:cNvPr>
+          <p:cNvSpPr/>
+          <p:nvPr/>
+        </p:nvSpPr>
+        <p:spPr>
+          <a:xfrm>
+            <a:off x="4909452" y="5472816"/>
+            <a:ext cx="878728" cy="221097"/>
+          </a:xfrm>
+          <a:prstGeom prst="rect">
+            <a:avLst/>
+          </a:prstGeom>
+          <a:solidFill>
+            <a:srgbClr val="00B050"/>
+          </a:solidFill>
+          <a:ln w="25400" cap="flat" cmpd="sng" algn="ctr">
+            <a:noFill/>
+            <a:prstDash val="solid"/>
+          </a:ln>
+          <a:effectLst/>
+        </p:spPr>
+        <p:style>
+          <a:lnRef idx="2">
+            <a:scrgbClr r="0" g="0" b="0"/>
+          </a:lnRef>
+          <a:fillRef idx="1">
+            <a:scrgbClr r="0" g="0" b="0"/>
+          </a:fillRef>
+          <a:effectRef idx="0">
+            <a:scrgbClr r="0" g="0" b="0"/>
+          </a:effectRef>
+          <a:fontRef idx="minor">
+            <a:schemeClr val="lt1"/>
+          </a:fontRef>
+        </p:style>
+        <p:txBody>
+          <a:bodyPr spcFirstLastPara="0" vert="horz" wrap="square" lIns="6350" tIns="6350" rIns="6350" bIns="6350" numCol="1" spcCol="1270" rtlCol="0" anchor="ctr" anchorCtr="0">
+            <a:noAutofit/>
+          </a:bodyPr>
+          <a:lstStyle/>
+          <a:p>
+            <a:pPr algn="ctr" defTabSz="444500">
+              <a:lnSpc>
+                <a:spcPct val="90000"/>
+              </a:lnSpc>
+              <a:spcBef>
+                <a:spcPct val="0"/>
+              </a:spcBef>
+              <a:spcAft>
+                <a:spcPct val="35000"/>
+              </a:spcAft>
+            </a:pPr>
+            <a:r>
+              <a:rPr lang="en-GB" sz="1000" b="1" kern="1200" dirty="0">
+                <a:solidFill>
+                  <a:schemeClr val="tx1"/>
+                </a:solidFill>
+                <a:latin typeface="Vodafone Rg" pitchFamily="34" charset="0"/>
+                <a:ea typeface="+mn-ea"/>
+                <a:cs typeface="+mn-cs"/>
+              </a:rPr>
+              <a:t>Alerting</a:t>
+            </a:r>
+          </a:p>
+        </p:txBody>
+      </p:sp>
+      <p:sp>
+        <p:nvSpPr>
+          <p:cNvPr id="118" name="Rectangle 117">
+            <a:extLst>
+              <a:ext uri="{FF2B5EF4-FFF2-40B4-BE49-F238E27FC236}">
+                <a16:creationId xmlns:a16="http://schemas.microsoft.com/office/drawing/2014/main" id="{AC375A5F-8562-48D1-9649-068B66A6B1C5}"/>
+              </a:ext>
+            </a:extLst>
+          </p:cNvPr>
+          <p:cNvSpPr/>
+          <p:nvPr/>
+        </p:nvSpPr>
+        <p:spPr>
+          <a:xfrm>
+            <a:off x="8678064" y="2377113"/>
+            <a:ext cx="1862974" cy="889480"/>
+          </a:xfrm>
+          <a:prstGeom prst="rect">
+            <a:avLst/>
+          </a:prstGeom>
+          <a:solidFill>
+            <a:schemeClr val="bg1">
+              <a:lumMod val="85000"/>
+            </a:schemeClr>
+          </a:solidFill>
+          <a:ln w="25400" cap="flat" cmpd="sng" algn="ctr">
+            <a:noFill/>
+            <a:prstDash val="solid"/>
+          </a:ln>
+          <a:effectLst/>
+        </p:spPr>
+        <p:style>
+          <a:lnRef idx="2">
+            <a:scrgbClr r="0" g="0" b="0"/>
+          </a:lnRef>
+          <a:fillRef idx="1">
+            <a:scrgbClr r="0" g="0" b="0"/>
+          </a:fillRef>
+          <a:effectRef idx="0">
+            <a:scrgbClr r="0" g="0" b="0"/>
+          </a:effectRef>
+          <a:fontRef idx="minor">
+            <a:schemeClr val="lt1"/>
+          </a:fontRef>
+        </p:style>
+        <p:txBody>
+          <a:bodyPr spcFirstLastPara="0" vert="vert" wrap="square" lIns="6350" tIns="6350" rIns="6350" bIns="6350" numCol="1" spcCol="1270" rtlCol="0" anchor="t" anchorCtr="0">
+            <a:noAutofit/>
+          </a:bodyPr>
+          <a:lstStyle/>
+          <a:p>
+            <a:pPr algn="ctr" defTabSz="444500">
+              <a:lnSpc>
+                <a:spcPct val="90000"/>
+              </a:lnSpc>
+              <a:spcBef>
+                <a:spcPct val="0"/>
+              </a:spcBef>
+              <a:spcAft>
+                <a:spcPct val="35000"/>
+              </a:spcAft>
+            </a:pPr>
+            <a:r>
+              <a:rPr lang="en-GB" sz="800" b="1" dirty="0">
+                <a:solidFill>
+                  <a:srgbClr val="34342B"/>
+                </a:solidFill>
+                <a:latin typeface="Vodafone Rg" pitchFamily="34" charset="0"/>
+              </a:rPr>
+              <a:t>Logging, monitoring and alerting node(s)</a:t>
+            </a:r>
+          </a:p>
+        </p:txBody>
+      </p:sp>
+      <p:sp>
+        <p:nvSpPr>
+          <p:cNvPr id="119" name="Rectangle 118">
+            <a:extLst>
+              <a:ext uri="{FF2B5EF4-FFF2-40B4-BE49-F238E27FC236}">
+                <a16:creationId xmlns:a16="http://schemas.microsoft.com/office/drawing/2014/main" id="{F468ABAF-C1C6-4E66-918B-88CEB97F8B20}"/>
+              </a:ext>
+            </a:extLst>
+          </p:cNvPr>
+          <p:cNvSpPr/>
+          <p:nvPr/>
+        </p:nvSpPr>
+        <p:spPr>
+          <a:xfrm>
+            <a:off x="8728753" y="2428272"/>
+            <a:ext cx="1460028" cy="774112"/>
+          </a:xfrm>
+          <a:prstGeom prst="rect">
+            <a:avLst/>
+          </a:prstGeom>
+          <a:solidFill>
+            <a:srgbClr val="00B050"/>
+          </a:solidFill>
+          <a:ln w="25400" cap="flat" cmpd="sng" algn="ctr">
+            <a:noFill/>
+            <a:prstDash val="solid"/>
+          </a:ln>
+          <a:effectLst/>
+        </p:spPr>
+        <p:style>
+          <a:lnRef idx="2">
+            <a:scrgbClr r="0" g="0" b="0"/>
+          </a:lnRef>
+          <a:fillRef idx="1">
+            <a:scrgbClr r="0" g="0" b="0"/>
+          </a:fillRef>
+          <a:effectRef idx="0">
+            <a:scrgbClr r="0" g="0" b="0"/>
+          </a:effectRef>
+          <a:fontRef idx="minor">
+            <a:schemeClr val="lt1"/>
+          </a:fontRef>
+        </p:style>
+        <p:txBody>
+          <a:bodyPr spcFirstLastPara="0" vert="horz" wrap="square" lIns="6350" tIns="6350" rIns="6350" bIns="6350" numCol="1" spcCol="1270" rtlCol="0" anchor="ctr" anchorCtr="0">
+            <a:noAutofit/>
+          </a:bodyPr>
+          <a:lstStyle/>
+          <a:p>
+            <a:pPr algn="ctr" defTabSz="444500">
+              <a:lnSpc>
+                <a:spcPct val="90000"/>
+              </a:lnSpc>
+              <a:spcBef>
+                <a:spcPct val="0"/>
+              </a:spcBef>
+              <a:spcAft>
+                <a:spcPct val="35000"/>
+              </a:spcAft>
+            </a:pPr>
+            <a:r>
+              <a:rPr lang="en-GB" sz="1000" b="1" dirty="0">
+                <a:solidFill>
+                  <a:schemeClr val="tx1"/>
+                </a:solidFill>
+                <a:latin typeface="Vodafone Rg" pitchFamily="34" charset="0"/>
+              </a:rPr>
+              <a:t>Logging</a:t>
+            </a:r>
+          </a:p>
+          <a:p>
+            <a:pPr algn="ctr" defTabSz="444500">
+              <a:lnSpc>
+                <a:spcPct val="90000"/>
+              </a:lnSpc>
+              <a:spcBef>
+                <a:spcPct val="0"/>
+              </a:spcBef>
+              <a:spcAft>
+                <a:spcPct val="35000"/>
+              </a:spcAft>
+            </a:pPr>
+            <a:r>
+              <a:rPr lang="en-GB" sz="1000" b="1" dirty="0">
+                <a:solidFill>
+                  <a:schemeClr val="tx1"/>
+                </a:solidFill>
+                <a:latin typeface="Vodafone Rg" pitchFamily="34" charset="0"/>
+              </a:rPr>
+              <a:t>Monitoring</a:t>
+            </a:r>
+          </a:p>
+          <a:p>
+            <a:pPr algn="ctr" defTabSz="444500">
+              <a:lnSpc>
+                <a:spcPct val="90000"/>
+              </a:lnSpc>
+              <a:spcBef>
+                <a:spcPct val="0"/>
+              </a:spcBef>
+              <a:spcAft>
+                <a:spcPct val="35000"/>
+              </a:spcAft>
+            </a:pPr>
+            <a:r>
+              <a:rPr lang="en-GB" sz="1000" b="1" dirty="0">
+                <a:solidFill>
+                  <a:schemeClr val="tx1"/>
+                </a:solidFill>
+                <a:latin typeface="Vodafone Rg" pitchFamily="34" charset="0"/>
+              </a:rPr>
+              <a:t>Alerting</a:t>
+            </a:r>
+          </a:p>
+        </p:txBody>
+      </p:sp>
+      <p:sp>
+        <p:nvSpPr>
+          <p:cNvPr id="120" name="Rectangle 119">
+            <a:extLst>
+              <a:ext uri="{FF2B5EF4-FFF2-40B4-BE49-F238E27FC236}">
+                <a16:creationId xmlns:a16="http://schemas.microsoft.com/office/drawing/2014/main" id="{C20A29D1-E41C-451E-88E3-B0B45173D729}"/>
+              </a:ext>
+            </a:extLst>
+          </p:cNvPr>
+          <p:cNvSpPr/>
+          <p:nvPr/>
+        </p:nvSpPr>
+        <p:spPr>
+          <a:xfrm>
+            <a:off x="8678064" y="3335160"/>
+            <a:ext cx="1862974" cy="889480"/>
+          </a:xfrm>
+          <a:prstGeom prst="rect">
+            <a:avLst/>
+          </a:prstGeom>
+          <a:solidFill>
+            <a:schemeClr val="bg1">
+              <a:lumMod val="85000"/>
+            </a:schemeClr>
+          </a:solidFill>
+          <a:ln w="25400" cap="flat" cmpd="sng" algn="ctr">
+            <a:noFill/>
+            <a:prstDash val="solid"/>
+          </a:ln>
+          <a:effectLst/>
+        </p:spPr>
+        <p:style>
+          <a:lnRef idx="2">
+            <a:scrgbClr r="0" g="0" b="0"/>
+          </a:lnRef>
+          <a:fillRef idx="1">
+            <a:scrgbClr r="0" g="0" b="0"/>
+          </a:fillRef>
+          <a:effectRef idx="0">
+            <a:scrgbClr r="0" g="0" b="0"/>
+          </a:effectRef>
+          <a:fontRef idx="minor">
+            <a:schemeClr val="lt1"/>
+          </a:fontRef>
+        </p:style>
+        <p:txBody>
+          <a:bodyPr spcFirstLastPara="0" vert="vert" wrap="square" lIns="6350" tIns="6350" rIns="6350" bIns="6350" numCol="1" spcCol="1270" rtlCol="0" anchor="t" anchorCtr="0">
+            <a:noAutofit/>
+          </a:bodyPr>
+          <a:lstStyle/>
+          <a:p>
+            <a:pPr algn="ctr" defTabSz="444500">
+              <a:lnSpc>
+                <a:spcPct val="90000"/>
+              </a:lnSpc>
+              <a:spcBef>
+                <a:spcPct val="0"/>
+              </a:spcBef>
+              <a:spcAft>
+                <a:spcPct val="35000"/>
+              </a:spcAft>
+            </a:pPr>
+            <a:r>
+              <a:rPr lang="en-GB" sz="1200" b="1" dirty="0">
+                <a:solidFill>
+                  <a:srgbClr val="34342B"/>
+                </a:solidFill>
+                <a:latin typeface="Vodafone Rg" pitchFamily="34" charset="0"/>
+              </a:rPr>
+              <a:t>Storage nodes</a:t>
+            </a:r>
+          </a:p>
+        </p:txBody>
+      </p:sp>
+      <p:sp>
+        <p:nvSpPr>
+          <p:cNvPr id="121" name="Rectangle 120">
+            <a:extLst>
+              <a:ext uri="{FF2B5EF4-FFF2-40B4-BE49-F238E27FC236}">
+                <a16:creationId xmlns:a16="http://schemas.microsoft.com/office/drawing/2014/main" id="{86E25094-D7D8-4CAA-B7B2-2A4FB48A6233}"/>
+              </a:ext>
+            </a:extLst>
+          </p:cNvPr>
+          <p:cNvSpPr/>
+          <p:nvPr/>
+        </p:nvSpPr>
+        <p:spPr>
+          <a:xfrm>
+            <a:off x="8728753" y="3386319"/>
+            <a:ext cx="1460028" cy="774112"/>
+          </a:xfrm>
+          <a:prstGeom prst="rect">
+            <a:avLst/>
+          </a:prstGeom>
+          <a:solidFill>
+            <a:srgbClr val="00B050"/>
+          </a:solidFill>
+          <a:ln w="25400" cap="flat" cmpd="sng" algn="ctr">
+            <a:noFill/>
+            <a:prstDash val="solid"/>
+          </a:ln>
+          <a:effectLst/>
+        </p:spPr>
+        <p:style>
+          <a:lnRef idx="2">
+            <a:scrgbClr r="0" g="0" b="0"/>
+          </a:lnRef>
+          <a:fillRef idx="1">
+            <a:scrgbClr r="0" g="0" b="0"/>
+          </a:fillRef>
+          <a:effectRef idx="0">
+            <a:scrgbClr r="0" g="0" b="0"/>
+          </a:effectRef>
+          <a:fontRef idx="minor">
+            <a:schemeClr val="lt1"/>
+          </a:fontRef>
+        </p:style>
+        <p:txBody>
+          <a:bodyPr spcFirstLastPara="0" vert="horz" wrap="square" lIns="6350" tIns="6350" rIns="6350" bIns="6350" numCol="1" spcCol="1270" rtlCol="0" anchor="ctr" anchorCtr="0">
+            <a:noAutofit/>
+          </a:bodyPr>
+          <a:lstStyle/>
+          <a:p>
+            <a:pPr algn="ctr" defTabSz="444500">
+              <a:lnSpc>
+                <a:spcPct val="90000"/>
+              </a:lnSpc>
+              <a:spcBef>
+                <a:spcPct val="0"/>
+              </a:spcBef>
+              <a:spcAft>
+                <a:spcPct val="35000"/>
+              </a:spcAft>
+            </a:pPr>
+            <a:r>
+              <a:rPr lang="en-GB" sz="1000" b="1" dirty="0">
+                <a:solidFill>
+                  <a:schemeClr val="tx1"/>
+                </a:solidFill>
+                <a:latin typeface="Vodafone Rg" pitchFamily="34" charset="0"/>
+              </a:rPr>
+              <a:t>Shared Storage</a:t>
+            </a:r>
+          </a:p>
+        </p:txBody>
+      </p:sp>
+      <p:sp>
+        <p:nvSpPr>
+          <p:cNvPr id="107" name="Rectangle 106">
+            <a:extLst>
+              <a:ext uri="{FF2B5EF4-FFF2-40B4-BE49-F238E27FC236}">
+                <a16:creationId xmlns:a16="http://schemas.microsoft.com/office/drawing/2014/main" id="{78CDBA7C-5047-4A21-AA63-1F05D108CE98}"/>
+              </a:ext>
+            </a:extLst>
+          </p:cNvPr>
+          <p:cNvSpPr/>
+          <p:nvPr/>
+        </p:nvSpPr>
+        <p:spPr>
+          <a:xfrm>
+            <a:off x="3382401" y="3896804"/>
+            <a:ext cx="4749313" cy="268802"/>
+          </a:xfrm>
+          <a:prstGeom prst="rect">
+            <a:avLst/>
+          </a:prstGeom>
+          <a:solidFill>
+            <a:srgbClr val="00B050"/>
+          </a:solidFill>
+          <a:ln w="25400" cap="flat" cmpd="sng" algn="ctr">
+            <a:noFill/>
+            <a:prstDash val="solid"/>
+          </a:ln>
+          <a:effectLst/>
+        </p:spPr>
+        <p:style>
+          <a:lnRef idx="2">
+            <a:scrgbClr r="0" g="0" b="0"/>
+          </a:lnRef>
+          <a:fillRef idx="1">
+            <a:scrgbClr r="0" g="0" b="0"/>
+          </a:fillRef>
+          <a:effectRef idx="0">
+            <a:scrgbClr r="0" g="0" b="0"/>
+          </a:effectRef>
+          <a:fontRef idx="minor">
+            <a:schemeClr val="lt1"/>
+          </a:fontRef>
+        </p:style>
+        <p:txBody>
+          <a:bodyPr spcFirstLastPara="0" vert="horz" wrap="square" lIns="6350" tIns="6350" rIns="6350" bIns="6350" numCol="1" spcCol="1270" rtlCol="0" anchor="ctr" anchorCtr="0">
+            <a:noAutofit/>
+          </a:bodyPr>
+          <a:lstStyle/>
+          <a:p>
+            <a:pPr algn="ctr" defTabSz="444500">
+              <a:lnSpc>
+                <a:spcPct val="90000"/>
+              </a:lnSpc>
+              <a:spcBef>
+                <a:spcPct val="0"/>
+              </a:spcBef>
+              <a:spcAft>
+                <a:spcPct val="35000"/>
+              </a:spcAft>
+            </a:pPr>
+            <a:r>
+              <a:rPr lang="en-GB" sz="1000" b="1" dirty="0">
+                <a:solidFill>
+                  <a:schemeClr val="tx1"/>
+                </a:solidFill>
+                <a:latin typeface="Vodafone Rg" pitchFamily="34" charset="0"/>
+              </a:rPr>
+              <a:t>Host OS + Hardware Drivers</a:t>
+            </a:r>
+            <a:endParaRPr lang="en-GB" sz="1000" b="1" kern="1200" dirty="0">
+              <a:solidFill>
+                <a:schemeClr val="tx1"/>
+              </a:solidFill>
+              <a:latin typeface="Vodafone Rg" pitchFamily="34" charset="0"/>
+            </a:endParaRPr>
+          </a:p>
+        </p:txBody>
+      </p:sp>
+      <p:grpSp>
+        <p:nvGrpSpPr>
+          <p:cNvPr id="24" name="Group 23">
+            <a:extLst>
+              <a:ext uri="{FF2B5EF4-FFF2-40B4-BE49-F238E27FC236}">
+                <a16:creationId xmlns:a16="http://schemas.microsoft.com/office/drawing/2014/main" id="{2F7CDCA2-DC76-4DFC-A867-575D52FE99DE}"/>
+              </a:ext>
+            </a:extLst>
+          </p:cNvPr>
+          <p:cNvGrpSpPr/>
+          <p:nvPr/>
+        </p:nvGrpSpPr>
+        <p:grpSpPr>
+          <a:xfrm>
+            <a:off x="3381996" y="4406133"/>
+            <a:ext cx="905717" cy="1033544"/>
+            <a:chOff x="3381996" y="4406133"/>
+            <a:chExt cx="905717" cy="1033544"/>
+          </a:xfrm>
+        </p:grpSpPr>
+        <p:grpSp>
+          <p:nvGrpSpPr>
+            <p:cNvPr id="115" name="Group 114">
+              <a:extLst>
+                <a:ext uri="{FF2B5EF4-FFF2-40B4-BE49-F238E27FC236}">
+                  <a16:creationId xmlns:a16="http://schemas.microsoft.com/office/drawing/2014/main" id="{E2AF446D-EE30-4F6B-A680-0618467870F9}"/>
+                </a:ext>
+              </a:extLst>
+            </p:cNvPr>
+            <p:cNvGrpSpPr/>
+            <p:nvPr/>
+          </p:nvGrpSpPr>
+          <p:grpSpPr>
+            <a:xfrm>
+              <a:off x="3381996" y="4406133"/>
+              <a:ext cx="905717" cy="1033544"/>
+              <a:chOff x="3396900" y="2754251"/>
+              <a:chExt cx="905717" cy="1033544"/>
+            </a:xfrm>
+          </p:grpSpPr>
+          <p:sp>
+            <p:nvSpPr>
+              <p:cNvPr id="122" name="Rectangle 121">
+                <a:extLst>
+                  <a:ext uri="{FF2B5EF4-FFF2-40B4-BE49-F238E27FC236}">
+                    <a16:creationId xmlns:a16="http://schemas.microsoft.com/office/drawing/2014/main" id="{63B3DF2F-C3DC-4D7B-8AF8-76A1E689CB47}"/>
+                  </a:ext>
+                </a:extLst>
+              </p:cNvPr>
+              <p:cNvSpPr/>
+              <p:nvPr/>
+            </p:nvSpPr>
+            <p:spPr>
+              <a:xfrm>
+                <a:off x="3401722" y="2754251"/>
+                <a:ext cx="894878" cy="1033544"/>
+              </a:xfrm>
+              <a:prstGeom prst="rect">
+                <a:avLst/>
+              </a:prstGeom>
+              <a:solidFill>
+                <a:srgbClr val="00B050"/>
+              </a:solidFill>
+              <a:ln w="25400" cap="flat" cmpd="sng" algn="ctr">
+                <a:noFill/>
+                <a:prstDash val="solid"/>
+              </a:ln>
+              <a:effectLst/>
+            </p:spPr>
+            <p:style>
+              <a:lnRef idx="2">
+                <a:scrgbClr r="0" g="0" b="0"/>
+              </a:lnRef>
+              <a:fillRef idx="1">
+                <a:scrgbClr r="0" g="0" b="0"/>
+              </a:fillRef>
+              <a:effectRef idx="0">
+                <a:scrgbClr r="0" g="0" b="0"/>
+              </a:effectRef>
+              <a:fontRef idx="minor">
+                <a:schemeClr val="lt1"/>
+              </a:fontRef>
+            </p:style>
+            <p:txBody>
+              <a:bodyPr spcFirstLastPara="0" vert="horz" wrap="square" lIns="6350" tIns="6350" rIns="6350" bIns="6350" numCol="1" spcCol="1270" rtlCol="0" anchor="ctr" anchorCtr="0">
+                <a:noAutofit/>
+              </a:bodyPr>
+              <a:lstStyle/>
+              <a:p>
+                <a:pPr algn="ctr" defTabSz="444500">
+                  <a:lnSpc>
+                    <a:spcPct val="90000"/>
+                  </a:lnSpc>
+                  <a:spcBef>
+                    <a:spcPct val="0"/>
+                  </a:spcBef>
+                  <a:spcAft>
+                    <a:spcPct val="35000"/>
+                  </a:spcAft>
+                </a:pPr>
+                <a:endParaRPr lang="en-GB" sz="1000" kern="1200" dirty="0">
+                  <a:solidFill>
+                    <a:srgbClr val="34342B"/>
+                  </a:solidFill>
+                  <a:latin typeface="Vodafone Rg" pitchFamily="34" charset="0"/>
+                  <a:ea typeface="+mn-ea"/>
+                  <a:cs typeface="+mn-cs"/>
+                </a:endParaRPr>
+              </a:p>
+            </p:txBody>
+          </p:sp>
+          <p:sp>
+            <p:nvSpPr>
+              <p:cNvPr id="123" name="TextBox 122">
+                <a:extLst>
+                  <a:ext uri="{FF2B5EF4-FFF2-40B4-BE49-F238E27FC236}">
+                    <a16:creationId xmlns:a16="http://schemas.microsoft.com/office/drawing/2014/main" id="{8EBF8EB4-D5D2-4A78-9075-3201E9D740E1}"/>
+                  </a:ext>
+                </a:extLst>
+              </p:cNvPr>
+              <p:cNvSpPr txBox="1"/>
+              <p:nvPr/>
+            </p:nvSpPr>
+            <p:spPr>
+              <a:xfrm>
+                <a:off x="3400859" y="2787269"/>
+                <a:ext cx="901758" cy="158719"/>
+              </a:xfrm>
+              <a:prstGeom prst="rect">
+                <a:avLst/>
+              </a:prstGeom>
+            </p:spPr>
+            <p:txBody>
+              <a:bodyPr wrap="square" lIns="0" tIns="0" rIns="0" bIns="0" rtlCol="0">
+                <a:noAutofit/>
+              </a:bodyPr>
+              <a:lstStyle/>
+              <a:p>
+                <a:pPr marL="0" indent="0" algn="ctr">
+                  <a:buFont typeface="Arial" pitchFamily="34" charset="0"/>
+                  <a:buNone/>
+                </a:pPr>
+                <a:r>
+                  <a:rPr lang="en-GB" sz="800" b="1" dirty="0" err="1">
+                    <a:latin typeface="Vodafone Rg" pitchFamily="34" charset="0"/>
+                  </a:rPr>
+                  <a:t>vRouter</a:t>
+                </a:r>
+                <a:endParaRPr lang="en-GB" sz="800" b="1" dirty="0">
+                  <a:latin typeface="Vodafone Rg" pitchFamily="34" charset="0"/>
+                </a:endParaRPr>
+              </a:p>
+            </p:txBody>
+          </p:sp>
+          <p:sp>
+            <p:nvSpPr>
+              <p:cNvPr id="124" name="TextBox 123">
+                <a:extLst>
+                  <a:ext uri="{FF2B5EF4-FFF2-40B4-BE49-F238E27FC236}">
+                    <a16:creationId xmlns:a16="http://schemas.microsoft.com/office/drawing/2014/main" id="{637B7EBC-83DB-42E5-BC91-DF28D0CDD6BE}"/>
+                  </a:ext>
+                </a:extLst>
+              </p:cNvPr>
+              <p:cNvSpPr txBox="1"/>
+              <p:nvPr/>
+            </p:nvSpPr>
+            <p:spPr>
+              <a:xfrm>
+                <a:off x="3396900" y="3589110"/>
+                <a:ext cx="880481" cy="196299"/>
+              </a:xfrm>
+              <a:prstGeom prst="rect">
+                <a:avLst/>
+              </a:prstGeom>
+            </p:spPr>
+            <p:txBody>
+              <a:bodyPr wrap="square" lIns="0" tIns="0" rIns="0" bIns="0" rtlCol="0">
+                <a:noAutofit/>
+              </a:bodyPr>
+              <a:lstStyle/>
+              <a:p>
+                <a:pPr marL="0" indent="0" algn="ctr">
+                  <a:buFont typeface="Arial" pitchFamily="34" charset="0"/>
+                  <a:buNone/>
+                </a:pPr>
+                <a:r>
+                  <a:rPr lang="en-GB" sz="800" b="1" dirty="0" err="1">
+                    <a:latin typeface="Vodafone Rg" pitchFamily="34" charset="0"/>
+                  </a:rPr>
+                  <a:t>vR</a:t>
+                </a:r>
+                <a:r>
+                  <a:rPr lang="en-GB" sz="800" b="1" dirty="0">
+                    <a:latin typeface="Vodafone Rg" pitchFamily="34" charset="0"/>
+                  </a:rPr>
+                  <a:t> / DPDK</a:t>
+                </a:r>
+              </a:p>
+            </p:txBody>
+          </p:sp>
+        </p:grpSp>
+        <p:pic>
+          <p:nvPicPr>
+            <p:cNvPr id="51" name="Picture 50" descr="A close up of a sign&#10;&#10;Description automatically generated">
+              <a:extLst>
+                <a:ext uri="{FF2B5EF4-FFF2-40B4-BE49-F238E27FC236}">
+                  <a16:creationId xmlns:a16="http://schemas.microsoft.com/office/drawing/2014/main" id="{5D0E6E78-91D7-4AEC-888F-4AEDE5A3BEB4}"/>
+                </a:ext>
+              </a:extLst>
+            </p:cNvPr>
+            <p:cNvPicPr>
+              <a:picLocks noChangeAspect="1"/>
+            </p:cNvPicPr>
+            <p:nvPr/>
+          </p:nvPicPr>
+          <p:blipFill>
+            <a:blip r:embed="rId13">
+              <a:extLst>
+                <a:ext uri="{28A0092B-C50C-407E-A947-70E740481C1C}">
+                  <a14:useLocalDpi xmlns:a14="http://schemas.microsoft.com/office/drawing/2010/main" val="0"/>
+                </a:ext>
+              </a:extLst>
+            </a:blip>
+            <a:stretch>
+              <a:fillRect/>
+            </a:stretch>
+          </p:blipFill>
+          <p:spPr>
+            <a:xfrm>
+              <a:off x="3696662" y="4741376"/>
+              <a:ext cx="247830" cy="218257"/>
+            </a:xfrm>
+            <a:prstGeom prst="rect">
+              <a:avLst/>
+            </a:prstGeom>
+          </p:spPr>
+        </p:pic>
+      </p:grpSp>
+      <p:grpSp>
+        <p:nvGrpSpPr>
+          <p:cNvPr id="10" name="Group 9">
+            <a:extLst>
+              <a:ext uri="{FF2B5EF4-FFF2-40B4-BE49-F238E27FC236}">
+                <a16:creationId xmlns:a16="http://schemas.microsoft.com/office/drawing/2014/main" id="{49252461-9233-408C-B5EF-97EF1C8C56CF}"/>
+              </a:ext>
+            </a:extLst>
+          </p:cNvPr>
+          <p:cNvGrpSpPr/>
+          <p:nvPr/>
+        </p:nvGrpSpPr>
+        <p:grpSpPr>
+          <a:xfrm>
+            <a:off x="7219902" y="1343011"/>
+            <a:ext cx="902611" cy="1029307"/>
+            <a:chOff x="625233" y="1610862"/>
+            <a:chExt cx="902611" cy="1029307"/>
+          </a:xfrm>
+        </p:grpSpPr>
+        <p:grpSp>
+          <p:nvGrpSpPr>
+            <p:cNvPr id="130" name="Group 129">
+              <a:extLst>
+                <a:ext uri="{FF2B5EF4-FFF2-40B4-BE49-F238E27FC236}">
+                  <a16:creationId xmlns:a16="http://schemas.microsoft.com/office/drawing/2014/main" id="{731A169B-E325-4C13-86BC-5D040A9C8BED}"/>
+                </a:ext>
+              </a:extLst>
+            </p:cNvPr>
+            <p:cNvGrpSpPr/>
+            <p:nvPr/>
+          </p:nvGrpSpPr>
+          <p:grpSpPr>
+            <a:xfrm>
+              <a:off x="625233" y="1610862"/>
+              <a:ext cx="902611" cy="1029307"/>
+              <a:chOff x="3398219" y="1627681"/>
+              <a:chExt cx="902611" cy="1029307"/>
+            </a:xfrm>
+          </p:grpSpPr>
+          <p:sp>
+            <p:nvSpPr>
+              <p:cNvPr id="131" name="Rectangle 130">
+                <a:extLst>
+                  <a:ext uri="{FF2B5EF4-FFF2-40B4-BE49-F238E27FC236}">
+                    <a16:creationId xmlns:a16="http://schemas.microsoft.com/office/drawing/2014/main" id="{AC59E3C1-27A0-4B79-9F85-0D795726FC51}"/>
+                  </a:ext>
+                </a:extLst>
+              </p:cNvPr>
+              <p:cNvSpPr/>
+              <p:nvPr/>
+            </p:nvSpPr>
+            <p:spPr>
+              <a:xfrm>
+                <a:off x="3398219" y="1627681"/>
+                <a:ext cx="902610" cy="1029307"/>
+              </a:xfrm>
+              <a:prstGeom prst="rect">
+                <a:avLst/>
+              </a:prstGeom>
+              <a:solidFill>
+                <a:srgbClr val="00B050"/>
+              </a:solidFill>
+              <a:ln w="25400" cap="flat" cmpd="sng" algn="ctr">
+                <a:noFill/>
+                <a:prstDash val="solid"/>
+              </a:ln>
+              <a:effectLst/>
+            </p:spPr>
+            <p:style>
+              <a:lnRef idx="2">
+                <a:scrgbClr r="0" g="0" b="0"/>
+              </a:lnRef>
+              <a:fillRef idx="1">
+                <a:scrgbClr r="0" g="0" b="0"/>
+              </a:fillRef>
+              <a:effectRef idx="0">
+                <a:scrgbClr r="0" g="0" b="0"/>
+              </a:effectRef>
+              <a:fontRef idx="minor">
+                <a:schemeClr val="lt1"/>
+              </a:fontRef>
+            </p:style>
+            <p:txBody>
+              <a:bodyPr spcFirstLastPara="0" vert="horz" wrap="square" lIns="6350" tIns="6350" rIns="6350" bIns="6350" numCol="1" spcCol="1270" rtlCol="0" anchor="ctr" anchorCtr="0">
+                <a:noAutofit/>
+              </a:bodyPr>
+              <a:lstStyle/>
+              <a:p>
+                <a:pPr algn="ctr" defTabSz="444500">
+                  <a:lnSpc>
+                    <a:spcPct val="90000"/>
+                  </a:lnSpc>
+                  <a:spcBef>
+                    <a:spcPct val="0"/>
+                  </a:spcBef>
+                  <a:spcAft>
+                    <a:spcPct val="35000"/>
+                  </a:spcAft>
+                </a:pPr>
+                <a:endParaRPr lang="en-GB" sz="1000" kern="1200" dirty="0">
+                  <a:solidFill>
+                    <a:srgbClr val="34342B"/>
+                  </a:solidFill>
+                  <a:latin typeface="Vodafone Rg" pitchFamily="34" charset="0"/>
+                  <a:ea typeface="+mn-ea"/>
+                  <a:cs typeface="+mn-cs"/>
+                </a:endParaRPr>
+              </a:p>
+            </p:txBody>
+          </p:sp>
+          <p:sp>
+            <p:nvSpPr>
+              <p:cNvPr id="133" name="TextBox 132">
+                <a:extLst>
+                  <a:ext uri="{FF2B5EF4-FFF2-40B4-BE49-F238E27FC236}">
+                    <a16:creationId xmlns:a16="http://schemas.microsoft.com/office/drawing/2014/main" id="{352D7753-5924-4664-981B-FFB6F4794DAD}"/>
+                  </a:ext>
+                </a:extLst>
+              </p:cNvPr>
+              <p:cNvSpPr txBox="1"/>
+              <p:nvPr/>
+            </p:nvSpPr>
+            <p:spPr>
+              <a:xfrm>
+                <a:off x="3408053" y="1643922"/>
+                <a:ext cx="892777" cy="189851"/>
+              </a:xfrm>
+              <a:prstGeom prst="rect">
+                <a:avLst/>
+              </a:prstGeom>
+            </p:spPr>
+            <p:txBody>
+              <a:bodyPr wrap="square" lIns="0" tIns="0" rIns="0" bIns="0" rtlCol="0">
+                <a:noAutofit/>
+              </a:bodyPr>
+              <a:lstStyle/>
+              <a:p>
+                <a:pPr marL="0" indent="0" algn="ctr">
+                  <a:buFont typeface="Arial" pitchFamily="34" charset="0"/>
+                  <a:buNone/>
+                </a:pPr>
+                <a:r>
+                  <a:rPr lang="en-GB" sz="800" b="1" dirty="0">
+                    <a:latin typeface="Vodafone Rg" pitchFamily="34" charset="0"/>
+                  </a:rPr>
+                  <a:t>Key Management</a:t>
+                </a:r>
+              </a:p>
+            </p:txBody>
+          </p:sp>
+          <p:sp>
+            <p:nvSpPr>
+              <p:cNvPr id="134" name="TextBox 133">
+                <a:extLst>
+                  <a:ext uri="{FF2B5EF4-FFF2-40B4-BE49-F238E27FC236}">
+                    <a16:creationId xmlns:a16="http://schemas.microsoft.com/office/drawing/2014/main" id="{7F13593D-EE01-4C05-9BF9-020AD64A3F71}"/>
+                  </a:ext>
+                </a:extLst>
+              </p:cNvPr>
+              <p:cNvSpPr txBox="1"/>
+              <p:nvPr/>
+            </p:nvSpPr>
+            <p:spPr>
+              <a:xfrm>
+                <a:off x="3405994" y="2520868"/>
+                <a:ext cx="876400" cy="125968"/>
+              </a:xfrm>
+              <a:prstGeom prst="rect">
+                <a:avLst/>
+              </a:prstGeom>
+            </p:spPr>
+            <p:txBody>
+              <a:bodyPr wrap="square" lIns="0" tIns="0" rIns="0" bIns="0" rtlCol="0">
+                <a:noAutofit/>
+              </a:bodyPr>
+              <a:lstStyle/>
+              <a:p>
+                <a:pPr marL="0" indent="0" algn="ctr">
+                  <a:buFont typeface="Arial" pitchFamily="34" charset="0"/>
+                  <a:buNone/>
+                </a:pPr>
+                <a:r>
+                  <a:rPr lang="en-GB" sz="800" b="1" dirty="0">
+                    <a:latin typeface="Vodafone Rg" pitchFamily="34" charset="0"/>
+                  </a:rPr>
+                  <a:t>BARBICAN</a:t>
+                </a:r>
+              </a:p>
+            </p:txBody>
+          </p:sp>
+        </p:grpSp>
+        <p:pic>
+          <p:nvPicPr>
+            <p:cNvPr id="7" name="Picture 6" descr="A picture containing helmet, hat&#10;&#10;Description automatically generated">
+              <a:extLst>
+                <a:ext uri="{FF2B5EF4-FFF2-40B4-BE49-F238E27FC236}">
+                  <a16:creationId xmlns:a16="http://schemas.microsoft.com/office/drawing/2014/main" id="{86EB63D3-3D5A-4F4D-90DB-139FCD4ECD89}"/>
+                </a:ext>
+              </a:extLst>
+            </p:cNvPr>
+            <p:cNvPicPr>
+              <a:picLocks noChangeAspect="1"/>
+            </p:cNvPicPr>
+            <p:nvPr/>
+          </p:nvPicPr>
+          <p:blipFill>
+            <a:blip r:embed="rId14">
+              <a:extLst>
+                <a:ext uri="{28A0092B-C50C-407E-A947-70E740481C1C}">
+                  <a14:useLocalDpi xmlns:a14="http://schemas.microsoft.com/office/drawing/2010/main" val="0"/>
+                </a:ext>
+              </a:extLst>
+            </a:blip>
+            <a:stretch>
+              <a:fillRect/>
+            </a:stretch>
+          </p:blipFill>
+          <p:spPr>
+            <a:xfrm>
+              <a:off x="787430" y="1833195"/>
+              <a:ext cx="493690" cy="417083"/>
+            </a:xfrm>
+            <a:prstGeom prst="rect">
+              <a:avLst/>
+            </a:prstGeom>
+          </p:spPr>
+        </p:pic>
+      </p:grpSp>
+      <p:grpSp>
+        <p:nvGrpSpPr>
+          <p:cNvPr id="136" name="Group 135">
+            <a:extLst>
+              <a:ext uri="{FF2B5EF4-FFF2-40B4-BE49-F238E27FC236}">
+                <a16:creationId xmlns:a16="http://schemas.microsoft.com/office/drawing/2014/main" id="{BDA4CFDF-2054-4031-9D3B-F00EF2BD4EE1}"/>
+              </a:ext>
+            </a:extLst>
+          </p:cNvPr>
+          <p:cNvGrpSpPr/>
+          <p:nvPr/>
+        </p:nvGrpSpPr>
+        <p:grpSpPr>
+          <a:xfrm>
+            <a:off x="6264431" y="1350973"/>
+            <a:ext cx="902611" cy="1029307"/>
+            <a:chOff x="3398219" y="1627681"/>
+            <a:chExt cx="902611" cy="1029307"/>
           </a:xfrm>
         </p:grpSpPr>
         <p:sp>
           <p:nvSpPr>
-            <p:cNvPr id="106" name="Rectangle 105">
+            <p:cNvPr id="138" name="Rectangle 137">
               <a:extLst>
                 <a:ext uri="{FF2B5EF4-FFF2-40B4-BE49-F238E27FC236}">
-                  <a16:creationId xmlns:a16="http://schemas.microsoft.com/office/drawing/2014/main" id="{DC54F51C-C6CF-45B2-995B-C95F9FDF3677}"/>
+                  <a16:creationId xmlns:a16="http://schemas.microsoft.com/office/drawing/2014/main" id="{DBBA2AA1-F9ED-47AE-AC7C-B141DD7BAB7C}"/>
                 </a:ext>
               </a:extLst>
             </p:cNvPr>
@@ -6932,8 +8258,8 @@
           </p:nvSpPr>
           <p:spPr>
             <a:xfrm>
-              <a:off x="3401722" y="2754251"/>
-              <a:ext cx="894878" cy="1033544"/>
+              <a:off x="3398219" y="1627681"/>
+              <a:ext cx="902610" cy="1029307"/>
             </a:xfrm>
             <a:prstGeom prst="rect">
               <a:avLst/>
@@ -6991,10 +8317,10 @@
         </p:sp>
         <p:sp>
           <p:nvSpPr>
-            <p:cNvPr id="108" name="TextBox 107">
+            <p:cNvPr id="139" name="TextBox 138">
               <a:extLst>
                 <a:ext uri="{FF2B5EF4-FFF2-40B4-BE49-F238E27FC236}">
-                  <a16:creationId xmlns:a16="http://schemas.microsoft.com/office/drawing/2014/main" id="{5DF03EA4-5544-49FA-80A9-59B34F356762}"/>
+                  <a16:creationId xmlns:a16="http://schemas.microsoft.com/office/drawing/2014/main" id="{642700D5-9EAF-48F1-B156-51ACF21BAA15}"/>
                 </a:ext>
               </a:extLst>
             </p:cNvPr>
@@ -7003,8 +8329,8 @@
           </p:nvSpPr>
           <p:spPr>
             <a:xfrm>
-              <a:off x="3400859" y="2787269"/>
-              <a:ext cx="901758" cy="158719"/>
+              <a:off x="3408053" y="1643922"/>
+              <a:ext cx="892777" cy="189851"/>
             </a:xfrm>
             <a:prstGeom prst="rect">
               <a:avLst/>
@@ -7024,17 +8350,17 @@
                 <a:rPr lang="en-GB" sz="800" b="1" dirty="0">
                   <a:latin typeface="Vodafone Rg" pitchFamily="34" charset="0"/>
                 </a:rPr>
-                <a:t>Virtual switch</a:t>
+                <a:t>Placement</a:t>
               </a:r>
             </a:p>
           </p:txBody>
         </p:sp>
         <p:sp>
           <p:nvSpPr>
-            <p:cNvPr id="109" name="TextBox 108">
+            <p:cNvPr id="140" name="TextBox 139">
               <a:extLst>
                 <a:ext uri="{FF2B5EF4-FFF2-40B4-BE49-F238E27FC236}">
-                  <a16:creationId xmlns:a16="http://schemas.microsoft.com/office/drawing/2014/main" id="{FF66E979-99E2-4833-9ABF-E57CE37152A4}"/>
+                  <a16:creationId xmlns:a16="http://schemas.microsoft.com/office/drawing/2014/main" id="{64F63D89-47DA-4640-B11E-3478F440211B}"/>
                 </a:ext>
               </a:extLst>
             </p:cNvPr>
@@ -7043,8 +8369,8 @@
           </p:nvSpPr>
           <p:spPr>
             <a:xfrm>
-              <a:off x="3396900" y="3589110"/>
-              <a:ext cx="880481" cy="196299"/>
+              <a:off x="3405994" y="2520868"/>
+              <a:ext cx="876400" cy="125968"/>
             </a:xfrm>
             <a:prstGeom prst="rect">
               <a:avLst/>
@@ -7061,877 +8387,15 @@
                 <a:buNone/>
               </a:pPr>
               <a:r>
-                <a:rPr lang="en-GB" sz="800" b="1" dirty="0" err="1">
-                  <a:latin typeface="Vodafone Rg" pitchFamily="34" charset="0"/>
-                </a:rPr>
-                <a:t>OvS</a:t>
-              </a:r>
-              <a:r>
                 <a:rPr lang="en-GB" sz="800" b="1" dirty="0">
                   <a:latin typeface="Vodafone Rg" pitchFamily="34" charset="0"/>
                 </a:rPr>
-                <a:t> / DPDK</a:t>
+                <a:t>PLACEMENT</a:t>
               </a:r>
             </a:p>
           </p:txBody>
         </p:sp>
       </p:grpSp>
-      <p:pic>
-        <p:nvPicPr>
-          <p:cNvPr id="55" name="Picture 54">
-            <a:extLst>
-              <a:ext uri="{FF2B5EF4-FFF2-40B4-BE49-F238E27FC236}">
-                <a16:creationId xmlns:a16="http://schemas.microsoft.com/office/drawing/2014/main" id="{8F337140-3308-4578-9B50-F27C10601492}"/>
-              </a:ext>
-            </a:extLst>
-          </p:cNvPr>
-          <p:cNvPicPr>
-            <a:picLocks noChangeAspect="1"/>
-          </p:cNvPicPr>
-          <p:nvPr/>
-        </p:nvPicPr>
-        <p:blipFill>
-          <a:blip r:embed="rId11">
-            <a:clrChange>
-              <a:clrFrom>
-                <a:srgbClr val="FFFFFF"/>
-              </a:clrFrom>
-              <a:clrTo>
-                <a:srgbClr val="FFFFFF">
-                  <a:alpha val="0"/>
-                </a:srgbClr>
-              </a:clrTo>
-            </a:clrChange>
-          </a:blip>
-          <a:stretch>
-            <a:fillRect/>
-          </a:stretch>
-        </p:blipFill>
-        <p:spPr>
-          <a:xfrm>
-            <a:off x="5142494" y="4622053"/>
-            <a:ext cx="339260" cy="213919"/>
-          </a:xfrm>
-          <a:prstGeom prst="rect">
-            <a:avLst/>
-          </a:prstGeom>
-        </p:spPr>
-      </p:pic>
-      <p:pic>
-        <p:nvPicPr>
-          <p:cNvPr id="63" name="Picture 62">
-            <a:extLst>
-              <a:ext uri="{FF2B5EF4-FFF2-40B4-BE49-F238E27FC236}">
-                <a16:creationId xmlns:a16="http://schemas.microsoft.com/office/drawing/2014/main" id="{9D81D0A9-DCD3-4753-BCA5-1BAD8534246C}"/>
-              </a:ext>
-            </a:extLst>
-          </p:cNvPr>
-          <p:cNvPicPr>
-            <a:picLocks noChangeAspect="1"/>
-          </p:cNvPicPr>
-          <p:nvPr/>
-        </p:nvPicPr>
-        <p:blipFill>
-          <a:blip r:embed="rId12" cstate="print">
-            <a:extLst>
-              <a:ext uri="{28A0092B-C50C-407E-A947-70E740481C1C}">
-                <a14:useLocalDpi xmlns:a14="http://schemas.microsoft.com/office/drawing/2010/main" val="0"/>
-              </a:ext>
-            </a:extLst>
-          </a:blip>
-          <a:stretch>
-            <a:fillRect/>
-          </a:stretch>
-        </p:blipFill>
-        <p:spPr>
-          <a:xfrm>
-            <a:off x="5099069" y="4888273"/>
-            <a:ext cx="426110" cy="234824"/>
-          </a:xfrm>
-          <a:prstGeom prst="rect">
-            <a:avLst/>
-          </a:prstGeom>
-        </p:spPr>
-      </p:pic>
-      <p:sp>
-        <p:nvSpPr>
-          <p:cNvPr id="116" name="Rectangle 115">
-            <a:extLst>
-              <a:ext uri="{FF2B5EF4-FFF2-40B4-BE49-F238E27FC236}">
-                <a16:creationId xmlns:a16="http://schemas.microsoft.com/office/drawing/2014/main" id="{CAD5372E-BB4A-450C-88AC-9F2098D43162}"/>
-              </a:ext>
-            </a:extLst>
-          </p:cNvPr>
-          <p:cNvSpPr/>
-          <p:nvPr/>
-        </p:nvSpPr>
-        <p:spPr>
-          <a:xfrm>
-            <a:off x="5893333" y="5472816"/>
-            <a:ext cx="878728" cy="221097"/>
-          </a:xfrm>
-          <a:prstGeom prst="rect">
-            <a:avLst/>
-          </a:prstGeom>
-          <a:solidFill>
-            <a:srgbClr val="00B050"/>
-          </a:solidFill>
-          <a:ln w="25400" cap="flat" cmpd="sng" algn="ctr">
-            <a:noFill/>
-            <a:prstDash val="solid"/>
-          </a:ln>
-          <a:effectLst/>
-        </p:spPr>
-        <p:style>
-          <a:lnRef idx="2">
-            <a:scrgbClr r="0" g="0" b="0"/>
-          </a:lnRef>
-          <a:fillRef idx="1">
-            <a:scrgbClr r="0" g="0" b="0"/>
-          </a:fillRef>
-          <a:effectRef idx="0">
-            <a:scrgbClr r="0" g="0" b="0"/>
-          </a:effectRef>
-          <a:fontRef idx="minor">
-            <a:schemeClr val="lt1"/>
-          </a:fontRef>
-        </p:style>
-        <p:txBody>
-          <a:bodyPr spcFirstLastPara="0" vert="horz" wrap="square" lIns="6350" tIns="6350" rIns="6350" bIns="6350" numCol="1" spcCol="1270" rtlCol="0" anchor="ctr" anchorCtr="0">
-            <a:noAutofit/>
-          </a:bodyPr>
-          <a:lstStyle/>
-          <a:p>
-            <a:pPr algn="ctr" defTabSz="444500">
-              <a:lnSpc>
-                <a:spcPct val="90000"/>
-              </a:lnSpc>
-              <a:spcBef>
-                <a:spcPct val="0"/>
-              </a:spcBef>
-              <a:spcAft>
-                <a:spcPct val="35000"/>
-              </a:spcAft>
-            </a:pPr>
-            <a:r>
-              <a:rPr lang="en-GB" sz="1000" b="1" kern="1200" dirty="0">
-                <a:solidFill>
-                  <a:schemeClr val="tx1"/>
-                </a:solidFill>
-                <a:latin typeface="Vodafone Rg" pitchFamily="34" charset="0"/>
-                <a:ea typeface="+mn-ea"/>
-                <a:cs typeface="+mn-cs"/>
-              </a:rPr>
-              <a:t>Monitoring</a:t>
-            </a:r>
-          </a:p>
-        </p:txBody>
-      </p:sp>
-      <p:sp>
-        <p:nvSpPr>
-          <p:cNvPr id="117" name="Rectangle 116">
-            <a:extLst>
-              <a:ext uri="{FF2B5EF4-FFF2-40B4-BE49-F238E27FC236}">
-                <a16:creationId xmlns:a16="http://schemas.microsoft.com/office/drawing/2014/main" id="{C129B30A-03E5-4288-922C-75141416A189}"/>
-              </a:ext>
-            </a:extLst>
-          </p:cNvPr>
-          <p:cNvSpPr/>
-          <p:nvPr/>
-        </p:nvSpPr>
-        <p:spPr>
-          <a:xfrm>
-            <a:off x="4909452" y="5472816"/>
-            <a:ext cx="878728" cy="221097"/>
-          </a:xfrm>
-          <a:prstGeom prst="rect">
-            <a:avLst/>
-          </a:prstGeom>
-          <a:solidFill>
-            <a:srgbClr val="00B050"/>
-          </a:solidFill>
-          <a:ln w="25400" cap="flat" cmpd="sng" algn="ctr">
-            <a:noFill/>
-            <a:prstDash val="solid"/>
-          </a:ln>
-          <a:effectLst/>
-        </p:spPr>
-        <p:style>
-          <a:lnRef idx="2">
-            <a:scrgbClr r="0" g="0" b="0"/>
-          </a:lnRef>
-          <a:fillRef idx="1">
-            <a:scrgbClr r="0" g="0" b="0"/>
-          </a:fillRef>
-          <a:effectRef idx="0">
-            <a:scrgbClr r="0" g="0" b="0"/>
-          </a:effectRef>
-          <a:fontRef idx="minor">
-            <a:schemeClr val="lt1"/>
-          </a:fontRef>
-        </p:style>
-        <p:txBody>
-          <a:bodyPr spcFirstLastPara="0" vert="horz" wrap="square" lIns="6350" tIns="6350" rIns="6350" bIns="6350" numCol="1" spcCol="1270" rtlCol="0" anchor="ctr" anchorCtr="0">
-            <a:noAutofit/>
-          </a:bodyPr>
-          <a:lstStyle/>
-          <a:p>
-            <a:pPr algn="ctr" defTabSz="444500">
-              <a:lnSpc>
-                <a:spcPct val="90000"/>
-              </a:lnSpc>
-              <a:spcBef>
-                <a:spcPct val="0"/>
-              </a:spcBef>
-              <a:spcAft>
-                <a:spcPct val="35000"/>
-              </a:spcAft>
-            </a:pPr>
-            <a:r>
-              <a:rPr lang="en-GB" sz="1000" b="1" kern="1200" dirty="0">
-                <a:solidFill>
-                  <a:schemeClr val="tx1"/>
-                </a:solidFill>
-                <a:latin typeface="Vodafone Rg" pitchFamily="34" charset="0"/>
-                <a:ea typeface="+mn-ea"/>
-                <a:cs typeface="+mn-cs"/>
-              </a:rPr>
-              <a:t>Alerting</a:t>
-            </a:r>
-          </a:p>
-        </p:txBody>
-      </p:sp>
-      <p:sp>
-        <p:nvSpPr>
-          <p:cNvPr id="118" name="Rectangle 117">
-            <a:extLst>
-              <a:ext uri="{FF2B5EF4-FFF2-40B4-BE49-F238E27FC236}">
-                <a16:creationId xmlns:a16="http://schemas.microsoft.com/office/drawing/2014/main" id="{AC375A5F-8562-48D1-9649-068B66A6B1C5}"/>
-              </a:ext>
-            </a:extLst>
-          </p:cNvPr>
-          <p:cNvSpPr/>
-          <p:nvPr/>
-        </p:nvSpPr>
-        <p:spPr>
-          <a:xfrm>
-            <a:off x="9280134" y="2359547"/>
-            <a:ext cx="1862974" cy="889480"/>
-          </a:xfrm>
-          <a:prstGeom prst="rect">
-            <a:avLst/>
-          </a:prstGeom>
-          <a:solidFill>
-            <a:schemeClr val="bg1">
-              <a:lumMod val="85000"/>
-            </a:schemeClr>
-          </a:solidFill>
-          <a:ln w="25400" cap="flat" cmpd="sng" algn="ctr">
-            <a:noFill/>
-            <a:prstDash val="solid"/>
-          </a:ln>
-          <a:effectLst/>
-        </p:spPr>
-        <p:style>
-          <a:lnRef idx="2">
-            <a:scrgbClr r="0" g="0" b="0"/>
-          </a:lnRef>
-          <a:fillRef idx="1">
-            <a:scrgbClr r="0" g="0" b="0"/>
-          </a:fillRef>
-          <a:effectRef idx="0">
-            <a:scrgbClr r="0" g="0" b="0"/>
-          </a:effectRef>
-          <a:fontRef idx="minor">
-            <a:schemeClr val="lt1"/>
-          </a:fontRef>
-        </p:style>
-        <p:txBody>
-          <a:bodyPr spcFirstLastPara="0" vert="vert" wrap="square" lIns="6350" tIns="6350" rIns="6350" bIns="6350" numCol="1" spcCol="1270" rtlCol="0" anchor="t" anchorCtr="0">
-            <a:noAutofit/>
-          </a:bodyPr>
-          <a:lstStyle/>
-          <a:p>
-            <a:pPr algn="ctr" defTabSz="444500">
-              <a:lnSpc>
-                <a:spcPct val="90000"/>
-              </a:lnSpc>
-              <a:spcBef>
-                <a:spcPct val="0"/>
-              </a:spcBef>
-              <a:spcAft>
-                <a:spcPct val="35000"/>
-              </a:spcAft>
-            </a:pPr>
-            <a:r>
-              <a:rPr lang="en-GB" sz="800" b="1" dirty="0">
-                <a:solidFill>
-                  <a:srgbClr val="34342B"/>
-                </a:solidFill>
-                <a:latin typeface="Vodafone Rg" pitchFamily="34" charset="0"/>
-              </a:rPr>
-              <a:t>Logging, monitoring and alerting node(s)</a:t>
-            </a:r>
-          </a:p>
-        </p:txBody>
-      </p:sp>
-      <p:sp>
-        <p:nvSpPr>
-          <p:cNvPr id="119" name="Rectangle 118">
-            <a:extLst>
-              <a:ext uri="{FF2B5EF4-FFF2-40B4-BE49-F238E27FC236}">
-                <a16:creationId xmlns:a16="http://schemas.microsoft.com/office/drawing/2014/main" id="{F468ABAF-C1C6-4E66-918B-88CEB97F8B20}"/>
-              </a:ext>
-            </a:extLst>
-          </p:cNvPr>
-          <p:cNvSpPr/>
-          <p:nvPr/>
-        </p:nvSpPr>
-        <p:spPr>
-          <a:xfrm>
-            <a:off x="9330823" y="2410706"/>
-            <a:ext cx="1460028" cy="774112"/>
-          </a:xfrm>
-          <a:prstGeom prst="rect">
-            <a:avLst/>
-          </a:prstGeom>
-          <a:solidFill>
-            <a:srgbClr val="00B050"/>
-          </a:solidFill>
-          <a:ln w="25400" cap="flat" cmpd="sng" algn="ctr">
-            <a:noFill/>
-            <a:prstDash val="solid"/>
-          </a:ln>
-          <a:effectLst/>
-        </p:spPr>
-        <p:style>
-          <a:lnRef idx="2">
-            <a:scrgbClr r="0" g="0" b="0"/>
-          </a:lnRef>
-          <a:fillRef idx="1">
-            <a:scrgbClr r="0" g="0" b="0"/>
-          </a:fillRef>
-          <a:effectRef idx="0">
-            <a:scrgbClr r="0" g="0" b="0"/>
-          </a:effectRef>
-          <a:fontRef idx="minor">
-            <a:schemeClr val="lt1"/>
-          </a:fontRef>
-        </p:style>
-        <p:txBody>
-          <a:bodyPr spcFirstLastPara="0" vert="horz" wrap="square" lIns="6350" tIns="6350" rIns="6350" bIns="6350" numCol="1" spcCol="1270" rtlCol="0" anchor="ctr" anchorCtr="0">
-            <a:noAutofit/>
-          </a:bodyPr>
-          <a:lstStyle/>
-          <a:p>
-            <a:pPr algn="ctr" defTabSz="444500">
-              <a:lnSpc>
-                <a:spcPct val="90000"/>
-              </a:lnSpc>
-              <a:spcBef>
-                <a:spcPct val="0"/>
-              </a:spcBef>
-              <a:spcAft>
-                <a:spcPct val="35000"/>
-              </a:spcAft>
-            </a:pPr>
-            <a:r>
-              <a:rPr lang="en-GB" sz="1000" b="1" dirty="0">
-                <a:solidFill>
-                  <a:schemeClr val="tx1"/>
-                </a:solidFill>
-                <a:latin typeface="Vodafone Rg" pitchFamily="34" charset="0"/>
-              </a:rPr>
-              <a:t>Logging</a:t>
-            </a:r>
-          </a:p>
-          <a:p>
-            <a:pPr algn="ctr" defTabSz="444500">
-              <a:lnSpc>
-                <a:spcPct val="90000"/>
-              </a:lnSpc>
-              <a:spcBef>
-                <a:spcPct val="0"/>
-              </a:spcBef>
-              <a:spcAft>
-                <a:spcPct val="35000"/>
-              </a:spcAft>
-            </a:pPr>
-            <a:r>
-              <a:rPr lang="en-GB" sz="1000" b="1" dirty="0">
-                <a:solidFill>
-                  <a:schemeClr val="tx1"/>
-                </a:solidFill>
-                <a:latin typeface="Vodafone Rg" pitchFamily="34" charset="0"/>
-              </a:rPr>
-              <a:t>Monitoring</a:t>
-            </a:r>
-          </a:p>
-          <a:p>
-            <a:pPr algn="ctr" defTabSz="444500">
-              <a:lnSpc>
-                <a:spcPct val="90000"/>
-              </a:lnSpc>
-              <a:spcBef>
-                <a:spcPct val="0"/>
-              </a:spcBef>
-              <a:spcAft>
-                <a:spcPct val="35000"/>
-              </a:spcAft>
-            </a:pPr>
-            <a:r>
-              <a:rPr lang="en-GB" sz="1000" b="1" dirty="0">
-                <a:solidFill>
-                  <a:schemeClr val="tx1"/>
-                </a:solidFill>
-                <a:latin typeface="Vodafone Rg" pitchFamily="34" charset="0"/>
-              </a:rPr>
-              <a:t>Alerting</a:t>
-            </a:r>
-          </a:p>
-        </p:txBody>
-      </p:sp>
-      <p:sp>
-        <p:nvSpPr>
-          <p:cNvPr id="120" name="Rectangle 119">
-            <a:extLst>
-              <a:ext uri="{FF2B5EF4-FFF2-40B4-BE49-F238E27FC236}">
-                <a16:creationId xmlns:a16="http://schemas.microsoft.com/office/drawing/2014/main" id="{C20A29D1-E41C-451E-88E3-B0B45173D729}"/>
-              </a:ext>
-            </a:extLst>
-          </p:cNvPr>
-          <p:cNvSpPr/>
-          <p:nvPr/>
-        </p:nvSpPr>
-        <p:spPr>
-          <a:xfrm>
-            <a:off x="9280134" y="3317594"/>
-            <a:ext cx="1862974" cy="889480"/>
-          </a:xfrm>
-          <a:prstGeom prst="rect">
-            <a:avLst/>
-          </a:prstGeom>
-          <a:solidFill>
-            <a:schemeClr val="bg1">
-              <a:lumMod val="85000"/>
-            </a:schemeClr>
-          </a:solidFill>
-          <a:ln w="25400" cap="flat" cmpd="sng" algn="ctr">
-            <a:noFill/>
-            <a:prstDash val="solid"/>
-          </a:ln>
-          <a:effectLst/>
-        </p:spPr>
-        <p:style>
-          <a:lnRef idx="2">
-            <a:scrgbClr r="0" g="0" b="0"/>
-          </a:lnRef>
-          <a:fillRef idx="1">
-            <a:scrgbClr r="0" g="0" b="0"/>
-          </a:fillRef>
-          <a:effectRef idx="0">
-            <a:scrgbClr r="0" g="0" b="0"/>
-          </a:effectRef>
-          <a:fontRef idx="minor">
-            <a:schemeClr val="lt1"/>
-          </a:fontRef>
-        </p:style>
-        <p:txBody>
-          <a:bodyPr spcFirstLastPara="0" vert="vert" wrap="square" lIns="6350" tIns="6350" rIns="6350" bIns="6350" numCol="1" spcCol="1270" rtlCol="0" anchor="t" anchorCtr="0">
-            <a:noAutofit/>
-          </a:bodyPr>
-          <a:lstStyle/>
-          <a:p>
-            <a:pPr algn="ctr" defTabSz="444500">
-              <a:lnSpc>
-                <a:spcPct val="90000"/>
-              </a:lnSpc>
-              <a:spcBef>
-                <a:spcPct val="0"/>
-              </a:spcBef>
-              <a:spcAft>
-                <a:spcPct val="35000"/>
-              </a:spcAft>
-            </a:pPr>
-            <a:r>
-              <a:rPr lang="en-GB" sz="1200" b="1" dirty="0">
-                <a:solidFill>
-                  <a:srgbClr val="34342B"/>
-                </a:solidFill>
-                <a:latin typeface="Vodafone Rg" pitchFamily="34" charset="0"/>
-              </a:rPr>
-              <a:t>Storage nodes</a:t>
-            </a:r>
-          </a:p>
-        </p:txBody>
-      </p:sp>
-      <p:sp>
-        <p:nvSpPr>
-          <p:cNvPr id="121" name="Rectangle 120">
-            <a:extLst>
-              <a:ext uri="{FF2B5EF4-FFF2-40B4-BE49-F238E27FC236}">
-                <a16:creationId xmlns:a16="http://schemas.microsoft.com/office/drawing/2014/main" id="{86E25094-D7D8-4CAA-B7B2-2A4FB48A6233}"/>
-              </a:ext>
-            </a:extLst>
-          </p:cNvPr>
-          <p:cNvSpPr/>
-          <p:nvPr/>
-        </p:nvSpPr>
-        <p:spPr>
-          <a:xfrm>
-            <a:off x="9330823" y="3368753"/>
-            <a:ext cx="1460028" cy="774112"/>
-          </a:xfrm>
-          <a:prstGeom prst="rect">
-            <a:avLst/>
-          </a:prstGeom>
-          <a:solidFill>
-            <a:srgbClr val="00B050"/>
-          </a:solidFill>
-          <a:ln w="25400" cap="flat" cmpd="sng" algn="ctr">
-            <a:noFill/>
-            <a:prstDash val="solid"/>
-          </a:ln>
-          <a:effectLst/>
-        </p:spPr>
-        <p:style>
-          <a:lnRef idx="2">
-            <a:scrgbClr r="0" g="0" b="0"/>
-          </a:lnRef>
-          <a:fillRef idx="1">
-            <a:scrgbClr r="0" g="0" b="0"/>
-          </a:fillRef>
-          <a:effectRef idx="0">
-            <a:scrgbClr r="0" g="0" b="0"/>
-          </a:effectRef>
-          <a:fontRef idx="minor">
-            <a:schemeClr val="lt1"/>
-          </a:fontRef>
-        </p:style>
-        <p:txBody>
-          <a:bodyPr spcFirstLastPara="0" vert="horz" wrap="square" lIns="6350" tIns="6350" rIns="6350" bIns="6350" numCol="1" spcCol="1270" rtlCol="0" anchor="ctr" anchorCtr="0">
-            <a:noAutofit/>
-          </a:bodyPr>
-          <a:lstStyle/>
-          <a:p>
-            <a:pPr algn="ctr" defTabSz="444500">
-              <a:lnSpc>
-                <a:spcPct val="90000"/>
-              </a:lnSpc>
-              <a:spcBef>
-                <a:spcPct val="0"/>
-              </a:spcBef>
-              <a:spcAft>
-                <a:spcPct val="35000"/>
-              </a:spcAft>
-            </a:pPr>
-            <a:r>
-              <a:rPr lang="en-GB" sz="1000" b="1" dirty="0">
-                <a:solidFill>
-                  <a:schemeClr val="tx1"/>
-                </a:solidFill>
-                <a:latin typeface="Vodafone Rg" pitchFamily="34" charset="0"/>
-              </a:rPr>
-              <a:t>Shared Storage</a:t>
-            </a:r>
-          </a:p>
-        </p:txBody>
-      </p:sp>
-      <p:sp>
-        <p:nvSpPr>
-          <p:cNvPr id="107" name="Rectangle 106">
-            <a:extLst>
-              <a:ext uri="{FF2B5EF4-FFF2-40B4-BE49-F238E27FC236}">
-                <a16:creationId xmlns:a16="http://schemas.microsoft.com/office/drawing/2014/main" id="{78CDBA7C-5047-4A21-AA63-1F05D108CE98}"/>
-              </a:ext>
-            </a:extLst>
-          </p:cNvPr>
-          <p:cNvSpPr/>
-          <p:nvPr/>
-        </p:nvSpPr>
-        <p:spPr>
-          <a:xfrm>
-            <a:off x="3398212" y="3868527"/>
-            <a:ext cx="5653689" cy="272932"/>
-          </a:xfrm>
-          <a:prstGeom prst="rect">
-            <a:avLst/>
-          </a:prstGeom>
-          <a:solidFill>
-            <a:srgbClr val="00B050"/>
-          </a:solidFill>
-          <a:ln w="25400" cap="flat" cmpd="sng" algn="ctr">
-            <a:noFill/>
-            <a:prstDash val="solid"/>
-          </a:ln>
-          <a:effectLst/>
-        </p:spPr>
-        <p:style>
-          <a:lnRef idx="2">
-            <a:scrgbClr r="0" g="0" b="0"/>
-          </a:lnRef>
-          <a:fillRef idx="1">
-            <a:scrgbClr r="0" g="0" b="0"/>
-          </a:fillRef>
-          <a:effectRef idx="0">
-            <a:scrgbClr r="0" g="0" b="0"/>
-          </a:effectRef>
-          <a:fontRef idx="minor">
-            <a:schemeClr val="lt1"/>
-          </a:fontRef>
-        </p:style>
-        <p:txBody>
-          <a:bodyPr spcFirstLastPara="0" vert="horz" wrap="square" lIns="6350" tIns="6350" rIns="6350" bIns="6350" numCol="1" spcCol="1270" rtlCol="0" anchor="ctr" anchorCtr="0">
-            <a:noAutofit/>
-          </a:bodyPr>
-          <a:lstStyle/>
-          <a:p>
-            <a:pPr algn="ctr" defTabSz="444500">
-              <a:lnSpc>
-                <a:spcPct val="90000"/>
-              </a:lnSpc>
-              <a:spcBef>
-                <a:spcPct val="0"/>
-              </a:spcBef>
-              <a:spcAft>
-                <a:spcPct val="35000"/>
-              </a:spcAft>
-            </a:pPr>
-            <a:r>
-              <a:rPr lang="en-GB" sz="1000" b="1" dirty="0">
-                <a:solidFill>
-                  <a:schemeClr val="tx1"/>
-                </a:solidFill>
-                <a:latin typeface="Vodafone Rg" pitchFamily="34" charset="0"/>
-              </a:rPr>
-              <a:t>Host OS + Hardware Drivers</a:t>
-            </a:r>
-            <a:endParaRPr lang="en-GB" sz="1000" b="1" kern="1200" dirty="0">
-              <a:solidFill>
-                <a:schemeClr val="tx1"/>
-              </a:solidFill>
-              <a:latin typeface="Vodafone Rg" pitchFamily="34" charset="0"/>
-            </a:endParaRPr>
-          </a:p>
-        </p:txBody>
-      </p:sp>
-      <p:grpSp>
-        <p:nvGrpSpPr>
-          <p:cNvPr id="115" name="Group 114">
-            <a:extLst>
-              <a:ext uri="{FF2B5EF4-FFF2-40B4-BE49-F238E27FC236}">
-                <a16:creationId xmlns:a16="http://schemas.microsoft.com/office/drawing/2014/main" id="{E2AF446D-EE30-4F6B-A680-0618467870F9}"/>
-              </a:ext>
-            </a:extLst>
-          </p:cNvPr>
-          <p:cNvGrpSpPr/>
-          <p:nvPr/>
-        </p:nvGrpSpPr>
-        <p:grpSpPr>
-          <a:xfrm>
-            <a:off x="3901317" y="4377877"/>
-            <a:ext cx="905717" cy="1033544"/>
-            <a:chOff x="3396900" y="2754251"/>
-            <a:chExt cx="905717" cy="1033544"/>
-          </a:xfrm>
-        </p:grpSpPr>
-        <p:sp>
-          <p:nvSpPr>
-            <p:cNvPr id="122" name="Rectangle 121">
-              <a:extLst>
-                <a:ext uri="{FF2B5EF4-FFF2-40B4-BE49-F238E27FC236}">
-                  <a16:creationId xmlns:a16="http://schemas.microsoft.com/office/drawing/2014/main" id="{63B3DF2F-C3DC-4D7B-8AF8-76A1E689CB47}"/>
-                </a:ext>
-              </a:extLst>
-            </p:cNvPr>
-            <p:cNvSpPr/>
-            <p:nvPr/>
-          </p:nvSpPr>
-          <p:spPr>
-            <a:xfrm>
-              <a:off x="3401722" y="2754251"/>
-              <a:ext cx="894878" cy="1033544"/>
-            </a:xfrm>
-            <a:prstGeom prst="rect">
-              <a:avLst/>
-            </a:prstGeom>
-            <a:solidFill>
-              <a:srgbClr val="00B050"/>
-            </a:solidFill>
-            <a:ln w="25400" cap="flat" cmpd="sng" algn="ctr">
-              <a:noFill/>
-              <a:prstDash val="solid"/>
-            </a:ln>
-            <a:effectLst/>
-          </p:spPr>
-          <p:style>
-            <a:lnRef idx="2">
-              <a:scrgbClr r="0" g="0" b="0"/>
-            </a:lnRef>
-            <a:fillRef idx="1">
-              <a:scrgbClr r="0" g="0" b="0"/>
-            </a:fillRef>
-            <a:effectRef idx="0">
-              <a:scrgbClr r="0" g="0" b="0"/>
-            </a:effectRef>
-            <a:fontRef idx="minor">
-              <a:schemeClr val="lt1"/>
-            </a:fontRef>
-          </p:style>
-          <p:txBody>
-            <a:bodyPr spcFirstLastPara="0" vert="horz" wrap="square" lIns="6350" tIns="6350" rIns="6350" bIns="6350" numCol="1" spcCol="1270" rtlCol="0" anchor="ctr" anchorCtr="0">
-              <a:noAutofit/>
-            </a:bodyPr>
-            <a:lstStyle/>
-            <a:p>
-              <a:pPr algn="ctr" defTabSz="444500">
-                <a:lnSpc>
-                  <a:spcPct val="90000"/>
-                </a:lnSpc>
-                <a:spcBef>
-                  <a:spcPct val="0"/>
-                </a:spcBef>
-                <a:spcAft>
-                  <a:spcPct val="35000"/>
-                </a:spcAft>
-              </a:pPr>
-              <a:endParaRPr lang="en-GB" sz="1000" kern="1200" dirty="0">
-                <a:solidFill>
-                  <a:srgbClr val="34342B"/>
-                </a:solidFill>
-                <a:latin typeface="Vodafone Rg" pitchFamily="34" charset="0"/>
-                <a:ea typeface="+mn-ea"/>
-                <a:cs typeface="+mn-cs"/>
-              </a:endParaRPr>
-            </a:p>
-          </p:txBody>
-        </p:sp>
-        <p:sp>
-          <p:nvSpPr>
-            <p:cNvPr id="123" name="TextBox 122">
-              <a:extLst>
-                <a:ext uri="{FF2B5EF4-FFF2-40B4-BE49-F238E27FC236}">
-                  <a16:creationId xmlns:a16="http://schemas.microsoft.com/office/drawing/2014/main" id="{8EBF8EB4-D5D2-4A78-9075-3201E9D740E1}"/>
-                </a:ext>
-              </a:extLst>
-            </p:cNvPr>
-            <p:cNvSpPr txBox="1"/>
-            <p:nvPr/>
-          </p:nvSpPr>
-          <p:spPr>
-            <a:xfrm>
-              <a:off x="3400859" y="2787269"/>
-              <a:ext cx="901758" cy="158719"/>
-            </a:xfrm>
-            <a:prstGeom prst="rect">
-              <a:avLst/>
-            </a:prstGeom>
-          </p:spPr>
-          <p:txBody>
-            <a:bodyPr wrap="square" lIns="0" tIns="0" rIns="0" bIns="0" rtlCol="0">
-              <a:noAutofit/>
-            </a:bodyPr>
-            <a:lstStyle/>
-            <a:p>
-              <a:pPr marL="0" indent="0" algn="ctr">
-                <a:buFont typeface="Arial" pitchFamily="34" charset="0"/>
-                <a:buNone/>
-              </a:pPr>
-              <a:r>
-                <a:rPr lang="en-GB" sz="800" b="1" dirty="0" err="1">
-                  <a:latin typeface="Vodafone Rg" pitchFamily="34" charset="0"/>
-                </a:rPr>
-                <a:t>vRouter</a:t>
-              </a:r>
-              <a:endParaRPr lang="en-GB" sz="800" b="1" dirty="0">
-                <a:latin typeface="Vodafone Rg" pitchFamily="34" charset="0"/>
-              </a:endParaRPr>
-            </a:p>
-          </p:txBody>
-        </p:sp>
-        <p:sp>
-          <p:nvSpPr>
-            <p:cNvPr id="124" name="TextBox 123">
-              <a:extLst>
-                <a:ext uri="{FF2B5EF4-FFF2-40B4-BE49-F238E27FC236}">
-                  <a16:creationId xmlns:a16="http://schemas.microsoft.com/office/drawing/2014/main" id="{637B7EBC-83DB-42E5-BC91-DF28D0CDD6BE}"/>
-                </a:ext>
-              </a:extLst>
-            </p:cNvPr>
-            <p:cNvSpPr txBox="1"/>
-            <p:nvPr/>
-          </p:nvSpPr>
-          <p:spPr>
-            <a:xfrm>
-              <a:off x="3396900" y="3589110"/>
-              <a:ext cx="880481" cy="196299"/>
-            </a:xfrm>
-            <a:prstGeom prst="rect">
-              <a:avLst/>
-            </a:prstGeom>
-          </p:spPr>
-          <p:txBody>
-            <a:bodyPr wrap="square" lIns="0" tIns="0" rIns="0" bIns="0" rtlCol="0">
-              <a:noAutofit/>
-            </a:bodyPr>
-            <a:lstStyle/>
-            <a:p>
-              <a:pPr marL="0" indent="0" algn="ctr">
-                <a:buFont typeface="Arial" pitchFamily="34" charset="0"/>
-                <a:buNone/>
-              </a:pPr>
-              <a:r>
-                <a:rPr lang="en-GB" sz="800" b="1" dirty="0" err="1">
-                  <a:latin typeface="Vodafone Rg" pitchFamily="34" charset="0"/>
-                </a:rPr>
-                <a:t>vR</a:t>
-              </a:r>
-              <a:r>
-                <a:rPr lang="en-GB" sz="800" b="1" dirty="0">
-                  <a:latin typeface="Vodafone Rg" pitchFamily="34" charset="0"/>
-                </a:rPr>
-                <a:t> / DPDK</a:t>
-              </a:r>
-            </a:p>
-          </p:txBody>
-        </p:sp>
-      </p:grpSp>
-      <p:pic>
-        <p:nvPicPr>
-          <p:cNvPr id="51" name="Picture 50" descr="A close up of a sign&#10;&#10;Description automatically generated">
-            <a:extLst>
-              <a:ext uri="{FF2B5EF4-FFF2-40B4-BE49-F238E27FC236}">
-                <a16:creationId xmlns:a16="http://schemas.microsoft.com/office/drawing/2014/main" id="{5D0E6E78-91D7-4AEC-888F-4AEDE5A3BEB4}"/>
-              </a:ext>
-            </a:extLst>
-          </p:cNvPr>
-          <p:cNvPicPr>
-            <a:picLocks noChangeAspect="1"/>
-          </p:cNvPicPr>
-          <p:nvPr/>
-        </p:nvPicPr>
-        <p:blipFill>
-          <a:blip r:embed="rId13">
-            <a:extLst>
-              <a:ext uri="{28A0092B-C50C-407E-A947-70E740481C1C}">
-                <a14:useLocalDpi xmlns:a14="http://schemas.microsoft.com/office/drawing/2010/main" val="0"/>
-              </a:ext>
-            </a:extLst>
-          </a:blip>
-          <a:stretch>
-            <a:fillRect/>
-          </a:stretch>
-        </p:blipFill>
-        <p:spPr>
-          <a:xfrm>
-            <a:off x="4227165" y="4769637"/>
-            <a:ext cx="247830" cy="218257"/>
-          </a:xfrm>
-          <a:prstGeom prst="rect">
-            <a:avLst/>
-          </a:prstGeom>
-        </p:spPr>
-      </p:pic>
     </p:spTree>
     <p:extLst>
       <p:ext uri="{BB962C8B-B14F-4D97-AF65-F5344CB8AC3E}">
@@ -8242,27 +8706,10 @@
 
 <file path=customXml/item1.xml><?xml version="1.0" encoding="utf-8"?>
 <?mso-contentType ?>
-<spe:Receivers xmlns:spe="http://schemas.microsoft.com/sharepoint/events"/>
+<SharedContentType xmlns="Microsoft.SharePoint.Taxonomy.ContentTypeSync" SourceId="34c87397-5fc1-491e-85e7-d6110dbe9cbd" ContentTypeId="0x0101" PreviousValue="false"/>
 </file>
 
 <file path=customXml/item2.xml><?xml version="1.0" encoding="utf-8"?>
-<?mso-contentType ?>
-<FormTemplates xmlns="http://schemas.microsoft.com/sharepoint/v3/contenttype/forms">
-  <Display>DocumentLibraryForm</Display>
-  <Edit>DocumentLibraryForm</Edit>
-  <New>DocumentLibraryForm</New>
-</FormTemplates>
-</file>
-
-<file path=customXml/item3.xml><?xml version="1.0" encoding="utf-8"?>
-<p:properties xmlns:p="http://schemas.microsoft.com/office/2006/metadata/properties" xmlns:xsi="http://www.w3.org/2001/XMLSchema-instance" xmlns:pc="http://schemas.microsoft.com/office/infopath/2007/PartnerControls">
-  <documentManagement>
-    <HideFromDelve xmlns="71c5aaf6-e6ce-465b-b873-5148d2a4c105">false</HideFromDelve>
-  </documentManagement>
-</p:properties>
-</file>
-
-<file path=customXml/item4.xml><?xml version="1.0" encoding="utf-8"?>
 <ct:contentTypeSchema xmlns:ct="http://schemas.microsoft.com/office/2006/metadata/contentType" xmlns:ma="http://schemas.microsoft.com/office/2006/metadata/properties/metaAttributes" ct:_="" ma:_="" ma:contentTypeName="Document" ma:contentTypeID="0x01010091DAD41AE1C547499DAD32324FDBCA83" ma:contentTypeVersion="11" ma:contentTypeDescription="Create a new document." ma:contentTypeScope="" ma:versionID="fe7bb4918db326f609b2286c3a60c3a3">
   <xsd:schema xmlns:xsd="http://www.w3.org/2001/XMLSchema" xmlns:xs="http://www.w3.org/2001/XMLSchema" xmlns:p="http://schemas.microsoft.com/office/2006/metadata/properties" xmlns:ns3="71c5aaf6-e6ce-465b-b873-5148d2a4c105" xmlns:ns4="3ff68e1f-d7e3-4b4f-a3e0-07f53f4abd0b" xmlns:ns5="12bbbc51-f7e9-481b-afc6-59484cfedc35" targetNamespace="http://schemas.microsoft.com/office/2006/metadata/properties" ma:root="true" ma:fieldsID="633697ff280d144c2353e69522d0f21b" ns3:_="" ns4:_="" ns5:_="">
     <xsd:import namespace="71c5aaf6-e6ce-465b-b873-5148d2a4c105"/>
@@ -8507,23 +8954,52 @@
 </ct:contentTypeSchema>
 </file>
 
+<file path=customXml/item3.xml><?xml version="1.0" encoding="utf-8"?>
+<p:properties xmlns:p="http://schemas.microsoft.com/office/2006/metadata/properties" xmlns:xsi="http://www.w3.org/2001/XMLSchema-instance" xmlns:pc="http://schemas.microsoft.com/office/infopath/2007/PartnerControls">
+  <documentManagement>
+    <HideFromDelve xmlns="71c5aaf6-e6ce-465b-b873-5148d2a4c105">false</HideFromDelve>
+  </documentManagement>
+</p:properties>
+</file>
+
+<file path=customXml/item4.xml><?xml version="1.0" encoding="utf-8"?>
+<?mso-contentType ?>
+<FormTemplates xmlns="http://schemas.microsoft.com/sharepoint/v3/contenttype/forms">
+  <Display>DocumentLibraryForm</Display>
+  <Edit>DocumentLibraryForm</Edit>
+  <New>DocumentLibraryForm</New>
+</FormTemplates>
+</file>
+
 <file path=customXml/item5.xml><?xml version="1.0" encoding="utf-8"?>
 <?mso-contentType ?>
-<SharedContentType xmlns="Microsoft.SharePoint.Taxonomy.ContentTypeSync" SourceId="34c87397-5fc1-491e-85e7-d6110dbe9cbd" ContentTypeId="0x0101" PreviousValue="false"/>
+<spe:Receivers xmlns:spe="http://schemas.microsoft.com/sharepoint/events"/>
 </file>
 
 <file path=customXml/itemProps1.xml><?xml version="1.0" encoding="utf-8"?>
-<ds:datastoreItem xmlns:ds="http://schemas.openxmlformats.org/officeDocument/2006/customXml" ds:itemID="{070C8A53-279E-4C85-923A-CD37400F3D1C}">
+<ds:datastoreItem xmlns:ds="http://schemas.openxmlformats.org/officeDocument/2006/customXml" ds:itemID="{BBF2C940-6CC2-4409-A4AF-3215DA2CB557}">
   <ds:schemaRefs>
-    <ds:schemaRef ds:uri="http://schemas.microsoft.com/sharepoint/events"/>
+    <ds:schemaRef ds:uri="Microsoft.SharePoint.Taxonomy.ContentTypeSync"/>
   </ds:schemaRefs>
 </ds:datastoreItem>
 </file>
 
 <file path=customXml/itemProps2.xml><?xml version="1.0" encoding="utf-8"?>
-<ds:datastoreItem xmlns:ds="http://schemas.openxmlformats.org/officeDocument/2006/customXml" ds:itemID="{1BC04104-7754-4987-B71A-5D74337C7112}">
+<ds:datastoreItem xmlns:ds="http://schemas.openxmlformats.org/officeDocument/2006/customXml" ds:itemID="{9E43C64A-2ED8-48B1-8FFD-1BA596FFEF63}">
   <ds:schemaRefs>
-    <ds:schemaRef ds:uri="http://schemas.microsoft.com/sharepoint/v3/contenttype/forms"/>
+    <ds:schemaRef ds:uri="http://schemas.microsoft.com/office/2006/metadata/contentType"/>
+    <ds:schemaRef ds:uri="http://schemas.microsoft.com/office/2006/metadata/properties/metaAttributes"/>
+    <ds:schemaRef ds:uri="http://www.w3.org/2001/XMLSchema"/>
+    <ds:schemaRef ds:uri="http://schemas.microsoft.com/office/2006/metadata/properties"/>
+    <ds:schemaRef ds:uri="71c5aaf6-e6ce-465b-b873-5148d2a4c105"/>
+    <ds:schemaRef ds:uri="3ff68e1f-d7e3-4b4f-a3e0-07f53f4abd0b"/>
+    <ds:schemaRef ds:uri="12bbbc51-f7e9-481b-afc6-59484cfedc35"/>
+    <ds:schemaRef ds:uri="http://schemas.microsoft.com/office/2006/documentManagement/types"/>
+    <ds:schemaRef ds:uri="http://schemas.microsoft.com/office/infopath/2007/PartnerControls"/>
+    <ds:schemaRef ds:uri="http://schemas.openxmlformats.org/package/2006/metadata/core-properties"/>
+    <ds:schemaRef ds:uri="http://purl.org/dc/elements/1.1/"/>
+    <ds:schemaRef ds:uri="http://purl.org/dc/terms/"/>
+    <ds:schemaRef ds:uri="http://schemas.microsoft.com/internal/obd"/>
   </ds:schemaRefs>
 </ds:datastoreItem>
 </file>
@@ -8547,29 +9023,17 @@
 </file>
 
 <file path=customXml/itemProps4.xml><?xml version="1.0" encoding="utf-8"?>
-<ds:datastoreItem xmlns:ds="http://schemas.openxmlformats.org/officeDocument/2006/customXml" ds:itemID="{9E43C64A-2ED8-48B1-8FFD-1BA596FFEF63}">
+<ds:datastoreItem xmlns:ds="http://schemas.openxmlformats.org/officeDocument/2006/customXml" ds:itemID="{1BC04104-7754-4987-B71A-5D74337C7112}">
   <ds:schemaRefs>
-    <ds:schemaRef ds:uri="http://schemas.microsoft.com/office/2006/metadata/contentType"/>
-    <ds:schemaRef ds:uri="http://schemas.microsoft.com/office/2006/metadata/properties/metaAttributes"/>
-    <ds:schemaRef ds:uri="http://www.w3.org/2001/XMLSchema"/>
-    <ds:schemaRef ds:uri="http://schemas.microsoft.com/office/2006/metadata/properties"/>
-    <ds:schemaRef ds:uri="71c5aaf6-e6ce-465b-b873-5148d2a4c105"/>
-    <ds:schemaRef ds:uri="3ff68e1f-d7e3-4b4f-a3e0-07f53f4abd0b"/>
-    <ds:schemaRef ds:uri="12bbbc51-f7e9-481b-afc6-59484cfedc35"/>
-    <ds:schemaRef ds:uri="http://schemas.microsoft.com/office/2006/documentManagement/types"/>
-    <ds:schemaRef ds:uri="http://schemas.microsoft.com/office/infopath/2007/PartnerControls"/>
-    <ds:schemaRef ds:uri="http://schemas.openxmlformats.org/package/2006/metadata/core-properties"/>
-    <ds:schemaRef ds:uri="http://purl.org/dc/elements/1.1/"/>
-    <ds:schemaRef ds:uri="http://purl.org/dc/terms/"/>
-    <ds:schemaRef ds:uri="http://schemas.microsoft.com/internal/obd"/>
+    <ds:schemaRef ds:uri="http://schemas.microsoft.com/sharepoint/v3/contenttype/forms"/>
   </ds:schemaRefs>
 </ds:datastoreItem>
 </file>
 
 <file path=customXml/itemProps5.xml><?xml version="1.0" encoding="utf-8"?>
-<ds:datastoreItem xmlns:ds="http://schemas.openxmlformats.org/officeDocument/2006/customXml" ds:itemID="{BBF2C940-6CC2-4409-A4AF-3215DA2CB557}">
+<ds:datastoreItem xmlns:ds="http://schemas.openxmlformats.org/officeDocument/2006/customXml" ds:itemID="{070C8A53-279E-4C85-923A-CD37400F3D1C}">
   <ds:schemaRefs>
-    <ds:schemaRef ds:uri="Microsoft.SharePoint.Taxonomy.ContentTypeSync"/>
+    <ds:schemaRef ds:uri="http://schemas.microsoft.com/sharepoint/events"/>
   </ds:schemaRefs>
 </ds:datastoreItem>
 </file>
</xml_diff>

<commit_message>
[RA-1 Ch03] Core Services Source File
</commit_message>
<xml_diff>
--- a/doc/ref_arch/openstack/figures/artefacts/RA1-Ch03-Core-Cloud-Infra-Services.pptx
+++ b/doc/ref_arch/openstack/figures/artefacts/RA1-Ch03-Core-Cloud-Infra-Services.pptx
@@ -259,7 +259,7 @@
           <a:p>
             <a:fld id="{342159D6-67C7-40E2-8C3A-19E3D49AF9D3}" type="datetimeFigureOut">
               <a:rPr lang="en-US" smtClean="0"/>
-              <a:t>8/31/2020</a:t>
+              <a:t>10/11/2021</a:t>
             </a:fld>
             <a:endParaRPr lang="en-US"/>
           </a:p>
@@ -457,7 +457,7 @@
           <a:p>
             <a:fld id="{342159D6-67C7-40E2-8C3A-19E3D49AF9D3}" type="datetimeFigureOut">
               <a:rPr lang="en-US" smtClean="0"/>
-              <a:t>8/31/2020</a:t>
+              <a:t>10/11/2021</a:t>
             </a:fld>
             <a:endParaRPr lang="en-US"/>
           </a:p>
@@ -665,7 +665,7 @@
           <a:p>
             <a:fld id="{342159D6-67C7-40E2-8C3A-19E3D49AF9D3}" type="datetimeFigureOut">
               <a:rPr lang="en-US" smtClean="0"/>
-              <a:t>8/31/2020</a:t>
+              <a:t>10/11/2021</a:t>
             </a:fld>
             <a:endParaRPr lang="en-US"/>
           </a:p>
@@ -863,7 +863,7 @@
           <a:p>
             <a:fld id="{342159D6-67C7-40E2-8C3A-19E3D49AF9D3}" type="datetimeFigureOut">
               <a:rPr lang="en-US" smtClean="0"/>
-              <a:t>8/31/2020</a:t>
+              <a:t>10/11/2021</a:t>
             </a:fld>
             <a:endParaRPr lang="en-US"/>
           </a:p>
@@ -1138,7 +1138,7 @@
           <a:p>
             <a:fld id="{342159D6-67C7-40E2-8C3A-19E3D49AF9D3}" type="datetimeFigureOut">
               <a:rPr lang="en-US" smtClean="0"/>
-              <a:t>8/31/2020</a:t>
+              <a:t>10/11/2021</a:t>
             </a:fld>
             <a:endParaRPr lang="en-US"/>
           </a:p>
@@ -1403,7 +1403,7 @@
           <a:p>
             <a:fld id="{342159D6-67C7-40E2-8C3A-19E3D49AF9D3}" type="datetimeFigureOut">
               <a:rPr lang="en-US" smtClean="0"/>
-              <a:t>8/31/2020</a:t>
+              <a:t>10/11/2021</a:t>
             </a:fld>
             <a:endParaRPr lang="en-US"/>
           </a:p>
@@ -1815,7 +1815,7 @@
           <a:p>
             <a:fld id="{342159D6-67C7-40E2-8C3A-19E3D49AF9D3}" type="datetimeFigureOut">
               <a:rPr lang="en-US" smtClean="0"/>
-              <a:t>8/31/2020</a:t>
+              <a:t>10/11/2021</a:t>
             </a:fld>
             <a:endParaRPr lang="en-US"/>
           </a:p>
@@ -1956,7 +1956,7 @@
           <a:p>
             <a:fld id="{342159D6-67C7-40E2-8C3A-19E3D49AF9D3}" type="datetimeFigureOut">
               <a:rPr lang="en-US" smtClean="0"/>
-              <a:t>8/31/2020</a:t>
+              <a:t>10/11/2021</a:t>
             </a:fld>
             <a:endParaRPr lang="en-US"/>
           </a:p>
@@ -2069,7 +2069,7 @@
           <a:p>
             <a:fld id="{342159D6-67C7-40E2-8C3A-19E3D49AF9D3}" type="datetimeFigureOut">
               <a:rPr lang="en-US" smtClean="0"/>
-              <a:t>8/31/2020</a:t>
+              <a:t>10/11/2021</a:t>
             </a:fld>
             <a:endParaRPr lang="en-US"/>
           </a:p>
@@ -2380,7 +2380,7 @@
           <a:p>
             <a:fld id="{342159D6-67C7-40E2-8C3A-19E3D49AF9D3}" type="datetimeFigureOut">
               <a:rPr lang="en-US" smtClean="0"/>
-              <a:t>8/31/2020</a:t>
+              <a:t>10/11/2021</a:t>
             </a:fld>
             <a:endParaRPr lang="en-US"/>
           </a:p>
@@ -2668,7 +2668,7 @@
           <a:p>
             <a:fld id="{342159D6-67C7-40E2-8C3A-19E3D49AF9D3}" type="datetimeFigureOut">
               <a:rPr lang="en-US" smtClean="0"/>
-              <a:t>8/31/2020</a:t>
+              <a:t>10/11/2021</a:t>
             </a:fld>
             <a:endParaRPr lang="en-US"/>
           </a:p>
@@ -2909,7 +2909,7 @@
           <a:p>
             <a:fld id="{342159D6-67C7-40E2-8C3A-19E3D49AF9D3}" type="datetimeFigureOut">
               <a:rPr lang="en-US" smtClean="0"/>
-              <a:t>8/31/2020</a:t>
+              <a:t>10/11/2021</a:t>
             </a:fld>
             <a:endParaRPr lang="en-US"/>
           </a:p>
@@ -3340,8 +3340,8 @@
         </p:nvSpPr>
         <p:spPr>
           <a:xfrm>
-            <a:off x="3036105" y="4262627"/>
-            <a:ext cx="5384607" cy="1904530"/>
+            <a:off x="2003219" y="4309295"/>
+            <a:ext cx="6502606" cy="1904530"/>
           </a:xfrm>
           <a:prstGeom prst="rect">
             <a:avLst/>
@@ -3487,8 +3487,8 @@
         </p:nvSpPr>
         <p:spPr>
           <a:xfrm>
-            <a:off x="3409728" y="5778878"/>
-            <a:ext cx="4737797" cy="279824"/>
+            <a:off x="2376842" y="5825546"/>
+            <a:ext cx="5740665" cy="279824"/>
           </a:xfrm>
           <a:prstGeom prst="rect">
             <a:avLst/>
@@ -3565,8 +3565,8 @@
         </p:nvSpPr>
         <p:spPr>
           <a:xfrm>
-            <a:off x="3027873" y="276045"/>
-            <a:ext cx="5384607" cy="3925019"/>
+            <a:off x="2003219" y="345859"/>
+            <a:ext cx="6502606" cy="3925019"/>
           </a:xfrm>
           <a:prstGeom prst="rect">
             <a:avLst/>
@@ -3638,7 +3638,7 @@
         </p:nvSpPr>
         <p:spPr>
           <a:xfrm>
-            <a:off x="3405994" y="1074507"/>
+            <a:off x="2373108" y="1121175"/>
             <a:ext cx="4698083" cy="178087"/>
           </a:xfrm>
           <a:prstGeom prst="rect">
@@ -3712,7 +3712,7 @@
         </p:nvSpPr>
         <p:spPr>
           <a:xfrm rot="16200000">
-            <a:off x="2635933" y="1922611"/>
+            <a:off x="1603047" y="1969279"/>
             <a:ext cx="1152709" cy="219375"/>
           </a:xfrm>
           <a:prstGeom prst="rect">
@@ -3755,7 +3755,7 @@
         </p:nvSpPr>
         <p:spPr>
           <a:xfrm rot="16200000">
-            <a:off x="2625322" y="4908902"/>
+            <a:off x="1592436" y="4955570"/>
             <a:ext cx="1231984" cy="357234"/>
           </a:xfrm>
           <a:prstGeom prst="rect">
@@ -3795,7 +3795,7 @@
         </p:nvGrpSpPr>
         <p:grpSpPr>
           <a:xfrm>
-            <a:off x="3379031" y="500346"/>
+            <a:off x="2346145" y="547014"/>
             <a:ext cx="1277632" cy="501696"/>
             <a:chOff x="2932087" y="768280"/>
             <a:chExt cx="1277632" cy="501696"/>
@@ -3981,7 +3981,7 @@
         </p:nvGrpSpPr>
         <p:grpSpPr>
           <a:xfrm>
-            <a:off x="3398219" y="1343011"/>
+            <a:off x="2365333" y="1389679"/>
             <a:ext cx="902611" cy="1029307"/>
             <a:chOff x="3398219" y="1627681"/>
             <a:chExt cx="902611" cy="1029307"/>
@@ -4192,7 +4192,7 @@
         </p:nvGrpSpPr>
         <p:grpSpPr>
           <a:xfrm>
-            <a:off x="3396900" y="2459166"/>
+            <a:off x="2364014" y="2505834"/>
             <a:ext cx="906580" cy="1043959"/>
             <a:chOff x="3396900" y="2743836"/>
             <a:chExt cx="906580" cy="1043959"/>
@@ -4403,7 +4403,7 @@
         </p:nvGrpSpPr>
         <p:grpSpPr>
           <a:xfrm>
-            <a:off x="5306643" y="2447727"/>
+            <a:off x="4273757" y="2494395"/>
             <a:ext cx="896839" cy="1043959"/>
             <a:chOff x="5306643" y="2732397"/>
             <a:chExt cx="896839" cy="1043959"/>
@@ -4626,7 +4626,7 @@
         </p:nvGrpSpPr>
         <p:grpSpPr>
           <a:xfrm>
-            <a:off x="4354177" y="2447727"/>
+            <a:off x="3321291" y="2494395"/>
             <a:ext cx="896836" cy="1072201"/>
             <a:chOff x="4354177" y="2732397"/>
             <a:chExt cx="896836" cy="1072201"/>
@@ -4837,7 +4837,7 @@
         </p:nvGrpSpPr>
         <p:grpSpPr>
           <a:xfrm>
-            <a:off x="4354544" y="1350973"/>
+            <a:off x="3321658" y="1397641"/>
             <a:ext cx="883043" cy="1035351"/>
             <a:chOff x="4355516" y="1335684"/>
             <a:chExt cx="1846005" cy="1035351"/>
@@ -5078,7 +5078,7 @@
         </p:nvGrpSpPr>
         <p:grpSpPr>
           <a:xfrm>
-            <a:off x="5291301" y="1335670"/>
+            <a:off x="4258415" y="1382338"/>
             <a:ext cx="898917" cy="1043959"/>
             <a:chOff x="7188241" y="2725652"/>
             <a:chExt cx="898917" cy="1043959"/>
@@ -5373,7 +5373,7 @@
         </p:nvGrpSpPr>
         <p:grpSpPr>
           <a:xfrm>
-            <a:off x="6270111" y="2437604"/>
+            <a:off x="5237225" y="2484272"/>
             <a:ext cx="894878" cy="1043959"/>
             <a:chOff x="9804945" y="1602735"/>
             <a:chExt cx="894878" cy="1043959"/>
@@ -5599,7 +5599,7 @@
         </p:nvGrpSpPr>
         <p:grpSpPr>
           <a:xfrm>
-            <a:off x="7241129" y="2422982"/>
+            <a:off x="6208243" y="2469650"/>
             <a:ext cx="906396" cy="1034021"/>
             <a:chOff x="8091870" y="3344065"/>
             <a:chExt cx="906396" cy="1034021"/>
@@ -5837,8 +5837,8 @@
         </p:nvSpPr>
         <p:spPr>
           <a:xfrm>
-            <a:off x="5306643" y="3585062"/>
-            <a:ext cx="2840882" cy="254559"/>
+            <a:off x="4273756" y="3631730"/>
+            <a:ext cx="3843751" cy="254559"/>
           </a:xfrm>
           <a:prstGeom prst="rect">
             <a:avLst/>
@@ -5920,7 +5920,7 @@
         </p:nvGrpSpPr>
         <p:grpSpPr>
           <a:xfrm>
-            <a:off x="5303840" y="4355876"/>
+            <a:off x="4270954" y="4402544"/>
             <a:ext cx="906580" cy="1043959"/>
             <a:chOff x="3396900" y="2743836"/>
             <a:chExt cx="906580" cy="1043959"/>
@@ -6131,7 +6131,7 @@
         </p:nvGrpSpPr>
         <p:grpSpPr>
           <a:xfrm>
-            <a:off x="6290967" y="4382006"/>
+            <a:off x="5258081" y="4428674"/>
             <a:ext cx="896836" cy="1072201"/>
             <a:chOff x="4354177" y="2732397"/>
             <a:chExt cx="896836" cy="1072201"/>
@@ -6342,7 +6342,7 @@
         </p:nvSpPr>
         <p:spPr>
           <a:xfrm>
-            <a:off x="4354176" y="3576088"/>
+            <a:off x="3321290" y="3622756"/>
             <a:ext cx="881719" cy="221097"/>
           </a:xfrm>
           <a:prstGeom prst="rect">
@@ -6416,7 +6416,7 @@
         </p:nvSpPr>
         <p:spPr>
           <a:xfrm>
-            <a:off x="3405994" y="3576088"/>
+            <a:off x="2373108" y="3622756"/>
             <a:ext cx="881719" cy="221097"/>
           </a:xfrm>
           <a:prstGeom prst="rect">
@@ -6490,7 +6490,7 @@
         </p:nvGrpSpPr>
         <p:grpSpPr>
           <a:xfrm>
-            <a:off x="7260192" y="4359863"/>
+            <a:off x="6227306" y="4406531"/>
             <a:ext cx="896836" cy="1043959"/>
             <a:chOff x="7793663" y="4153047"/>
             <a:chExt cx="896836" cy="1043959"/>
@@ -6933,7 +6933,7 @@
         </p:nvGrpSpPr>
         <p:grpSpPr>
           <a:xfrm>
-            <a:off x="4338539" y="4380498"/>
+            <a:off x="3305653" y="4427166"/>
             <a:ext cx="905717" cy="1033544"/>
             <a:chOff x="4338539" y="4380498"/>
             <a:chExt cx="905717" cy="1033544"/>
@@ -7195,154 +7195,175 @@
           </p:spPr>
         </p:pic>
       </p:grpSp>
-      <p:sp>
-        <p:nvSpPr>
-          <p:cNvPr id="116" name="Rectangle 115">
-            <a:extLst>
-              <a:ext uri="{FF2B5EF4-FFF2-40B4-BE49-F238E27FC236}">
-                <a16:creationId xmlns:a16="http://schemas.microsoft.com/office/drawing/2014/main" id="{CAD5372E-BB4A-450C-88AC-9F2098D43162}"/>
-              </a:ext>
-            </a:extLst>
-          </p:cNvPr>
-          <p:cNvSpPr/>
+      <p:grpSp>
+        <p:nvGrpSpPr>
+          <p:cNvPr id="6" name="Group 5">
+            <a:extLst>
+              <a:ext uri="{FF2B5EF4-FFF2-40B4-BE49-F238E27FC236}">
+                <a16:creationId xmlns:a16="http://schemas.microsoft.com/office/drawing/2014/main" id="{D65254D7-64E8-4C98-AF4D-85AD45F4FC7B}"/>
+              </a:ext>
+            </a:extLst>
+          </p:cNvPr>
+          <p:cNvGrpSpPr/>
           <p:nvPr/>
-        </p:nvSpPr>
-        <p:spPr>
+        </p:nvGrpSpPr>
+        <p:grpSpPr>
           <a:xfrm>
-            <a:off x="5893333" y="5472816"/>
-            <a:ext cx="878728" cy="221097"/>
+            <a:off x="4315870" y="5519484"/>
+            <a:ext cx="1862609" cy="221097"/>
+            <a:chOff x="3876566" y="5519484"/>
+            <a:chExt cx="1862609" cy="221097"/>
           </a:xfrm>
-          <a:prstGeom prst="rect">
-            <a:avLst/>
-          </a:prstGeom>
-          <a:solidFill>
-            <a:srgbClr val="00B050"/>
-          </a:solidFill>
-          <a:ln w="25400" cap="flat" cmpd="sng" algn="ctr">
-            <a:noFill/>
-            <a:prstDash val="solid"/>
-          </a:ln>
-          <a:effectLst/>
-        </p:spPr>
-        <p:style>
-          <a:lnRef idx="2">
-            <a:scrgbClr r="0" g="0" b="0"/>
-          </a:lnRef>
-          <a:fillRef idx="1">
-            <a:scrgbClr r="0" g="0" b="0"/>
-          </a:fillRef>
-          <a:effectRef idx="0">
-            <a:scrgbClr r="0" g="0" b="0"/>
-          </a:effectRef>
-          <a:fontRef idx="minor">
-            <a:schemeClr val="lt1"/>
-          </a:fontRef>
-        </p:style>
-        <p:txBody>
-          <a:bodyPr spcFirstLastPara="0" vert="horz" wrap="square" lIns="6350" tIns="6350" rIns="6350" bIns="6350" numCol="1" spcCol="1270" rtlCol="0" anchor="ctr" anchorCtr="0">
-            <a:noAutofit/>
-          </a:bodyPr>
-          <a:lstStyle/>
-          <a:p>
-            <a:pPr algn="ctr" defTabSz="444500">
-              <a:lnSpc>
-                <a:spcPct val="90000"/>
-              </a:lnSpc>
-              <a:spcBef>
-                <a:spcPct val="0"/>
-              </a:spcBef>
-              <a:spcAft>
-                <a:spcPct val="35000"/>
-              </a:spcAft>
-            </a:pPr>
-            <a:r>
-              <a:rPr lang="en-GB" sz="1000" b="1" kern="1200" dirty="0">
-                <a:solidFill>
-                  <a:schemeClr val="tx1"/>
-                </a:solidFill>
-                <a:latin typeface="Vodafone Rg" pitchFamily="34" charset="0"/>
-                <a:ea typeface="+mn-ea"/>
-                <a:cs typeface="+mn-cs"/>
-              </a:rPr>
-              <a:t>Monitoring</a:t>
-            </a:r>
-          </a:p>
-        </p:txBody>
-      </p:sp>
-      <p:sp>
-        <p:nvSpPr>
-          <p:cNvPr id="117" name="Rectangle 116">
-            <a:extLst>
-              <a:ext uri="{FF2B5EF4-FFF2-40B4-BE49-F238E27FC236}">
-                <a16:creationId xmlns:a16="http://schemas.microsoft.com/office/drawing/2014/main" id="{C129B30A-03E5-4288-922C-75141416A189}"/>
-              </a:ext>
-            </a:extLst>
-          </p:cNvPr>
-          <p:cNvSpPr/>
-          <p:nvPr/>
-        </p:nvSpPr>
-        <p:spPr>
-          <a:xfrm>
-            <a:off x="4909452" y="5472816"/>
-            <a:ext cx="878728" cy="221097"/>
-          </a:xfrm>
-          <a:prstGeom prst="rect">
-            <a:avLst/>
-          </a:prstGeom>
-          <a:solidFill>
-            <a:srgbClr val="00B050"/>
-          </a:solidFill>
-          <a:ln w="25400" cap="flat" cmpd="sng" algn="ctr">
-            <a:noFill/>
-            <a:prstDash val="solid"/>
-          </a:ln>
-          <a:effectLst/>
-        </p:spPr>
-        <p:style>
-          <a:lnRef idx="2">
-            <a:scrgbClr r="0" g="0" b="0"/>
-          </a:lnRef>
-          <a:fillRef idx="1">
-            <a:scrgbClr r="0" g="0" b="0"/>
-          </a:fillRef>
-          <a:effectRef idx="0">
-            <a:scrgbClr r="0" g="0" b="0"/>
-          </a:effectRef>
-          <a:fontRef idx="minor">
-            <a:schemeClr val="lt1"/>
-          </a:fontRef>
-        </p:style>
-        <p:txBody>
-          <a:bodyPr spcFirstLastPara="0" vert="horz" wrap="square" lIns="6350" tIns="6350" rIns="6350" bIns="6350" numCol="1" spcCol="1270" rtlCol="0" anchor="ctr" anchorCtr="0">
-            <a:noAutofit/>
-          </a:bodyPr>
-          <a:lstStyle/>
-          <a:p>
-            <a:pPr algn="ctr" defTabSz="444500">
-              <a:lnSpc>
-                <a:spcPct val="90000"/>
-              </a:lnSpc>
-              <a:spcBef>
-                <a:spcPct val="0"/>
-              </a:spcBef>
-              <a:spcAft>
-                <a:spcPct val="35000"/>
-              </a:spcAft>
-            </a:pPr>
-            <a:r>
-              <a:rPr lang="en-GB" sz="1000" b="1" kern="1200" dirty="0">
-                <a:solidFill>
-                  <a:schemeClr val="tx1"/>
-                </a:solidFill>
-                <a:latin typeface="Vodafone Rg" pitchFamily="34" charset="0"/>
-                <a:ea typeface="+mn-ea"/>
-                <a:cs typeface="+mn-cs"/>
-              </a:rPr>
-              <a:t>Alerting</a:t>
-            </a:r>
-          </a:p>
-        </p:txBody>
-      </p:sp>
+        </p:grpSpPr>
+        <p:sp>
+          <p:nvSpPr>
+            <p:cNvPr id="116" name="Rectangle 115">
+              <a:extLst>
+                <a:ext uri="{FF2B5EF4-FFF2-40B4-BE49-F238E27FC236}">
+                  <a16:creationId xmlns:a16="http://schemas.microsoft.com/office/drawing/2014/main" id="{CAD5372E-BB4A-450C-88AC-9F2098D43162}"/>
+                </a:ext>
+              </a:extLst>
+            </p:cNvPr>
+            <p:cNvSpPr/>
+            <p:nvPr/>
+          </p:nvSpPr>
+          <p:spPr>
+            <a:xfrm>
+              <a:off x="4860447" y="5519484"/>
+              <a:ext cx="878728" cy="221097"/>
+            </a:xfrm>
+            <a:prstGeom prst="rect">
+              <a:avLst/>
+            </a:prstGeom>
+            <a:solidFill>
+              <a:srgbClr val="00B050"/>
+            </a:solidFill>
+            <a:ln w="25400" cap="flat" cmpd="sng" algn="ctr">
+              <a:noFill/>
+              <a:prstDash val="solid"/>
+            </a:ln>
+            <a:effectLst/>
+          </p:spPr>
+          <p:style>
+            <a:lnRef idx="2">
+              <a:scrgbClr r="0" g="0" b="0"/>
+            </a:lnRef>
+            <a:fillRef idx="1">
+              <a:scrgbClr r="0" g="0" b="0"/>
+            </a:fillRef>
+            <a:effectRef idx="0">
+              <a:scrgbClr r="0" g="0" b="0"/>
+            </a:effectRef>
+            <a:fontRef idx="minor">
+              <a:schemeClr val="lt1"/>
+            </a:fontRef>
+          </p:style>
+          <p:txBody>
+            <a:bodyPr spcFirstLastPara="0" vert="horz" wrap="square" lIns="6350" tIns="6350" rIns="6350" bIns="6350" numCol="1" spcCol="1270" rtlCol="0" anchor="ctr" anchorCtr="0">
+              <a:noAutofit/>
+            </a:bodyPr>
+            <a:lstStyle/>
+            <a:p>
+              <a:pPr algn="ctr" defTabSz="444500">
+                <a:lnSpc>
+                  <a:spcPct val="90000"/>
+                </a:lnSpc>
+                <a:spcBef>
+                  <a:spcPct val="0"/>
+                </a:spcBef>
+                <a:spcAft>
+                  <a:spcPct val="35000"/>
+                </a:spcAft>
+              </a:pPr>
+              <a:r>
+                <a:rPr lang="en-GB" sz="1000" b="1" kern="1200" dirty="0">
+                  <a:solidFill>
+                    <a:schemeClr val="tx1"/>
+                  </a:solidFill>
+                  <a:latin typeface="Vodafone Rg" pitchFamily="34" charset="0"/>
+                  <a:ea typeface="+mn-ea"/>
+                  <a:cs typeface="+mn-cs"/>
+                </a:rPr>
+                <a:t>Monitoring</a:t>
+              </a:r>
+            </a:p>
+          </p:txBody>
+        </p:sp>
+        <p:sp>
+          <p:nvSpPr>
+            <p:cNvPr id="117" name="Rectangle 116">
+              <a:extLst>
+                <a:ext uri="{FF2B5EF4-FFF2-40B4-BE49-F238E27FC236}">
+                  <a16:creationId xmlns:a16="http://schemas.microsoft.com/office/drawing/2014/main" id="{C129B30A-03E5-4288-922C-75141416A189}"/>
+                </a:ext>
+              </a:extLst>
+            </p:cNvPr>
+            <p:cNvSpPr/>
+            <p:nvPr/>
+          </p:nvSpPr>
+          <p:spPr>
+            <a:xfrm>
+              <a:off x="3876566" y="5519484"/>
+              <a:ext cx="878728" cy="221097"/>
+            </a:xfrm>
+            <a:prstGeom prst="rect">
+              <a:avLst/>
+            </a:prstGeom>
+            <a:solidFill>
+              <a:srgbClr val="00B050"/>
+            </a:solidFill>
+            <a:ln w="25400" cap="flat" cmpd="sng" algn="ctr">
+              <a:noFill/>
+              <a:prstDash val="solid"/>
+            </a:ln>
+            <a:effectLst/>
+          </p:spPr>
+          <p:style>
+            <a:lnRef idx="2">
+              <a:scrgbClr r="0" g="0" b="0"/>
+            </a:lnRef>
+            <a:fillRef idx="1">
+              <a:scrgbClr r="0" g="0" b="0"/>
+            </a:fillRef>
+            <a:effectRef idx="0">
+              <a:scrgbClr r="0" g="0" b="0"/>
+            </a:effectRef>
+            <a:fontRef idx="minor">
+              <a:schemeClr val="lt1"/>
+            </a:fontRef>
+          </p:style>
+          <p:txBody>
+            <a:bodyPr spcFirstLastPara="0" vert="horz" wrap="square" lIns="6350" tIns="6350" rIns="6350" bIns="6350" numCol="1" spcCol="1270" rtlCol="0" anchor="ctr" anchorCtr="0">
+              <a:noAutofit/>
+            </a:bodyPr>
+            <a:lstStyle/>
+            <a:p>
+              <a:pPr algn="ctr" defTabSz="444500">
+                <a:lnSpc>
+                  <a:spcPct val="90000"/>
+                </a:lnSpc>
+                <a:spcBef>
+                  <a:spcPct val="0"/>
+                </a:spcBef>
+                <a:spcAft>
+                  <a:spcPct val="35000"/>
+                </a:spcAft>
+              </a:pPr>
+              <a:r>
+                <a:rPr lang="en-GB" sz="1000" b="1" kern="1200" dirty="0">
+                  <a:solidFill>
+                    <a:schemeClr val="tx1"/>
+                  </a:solidFill>
+                  <a:latin typeface="Vodafone Rg" pitchFamily="34" charset="0"/>
+                  <a:ea typeface="+mn-ea"/>
+                  <a:cs typeface="+mn-cs"/>
+                </a:rPr>
+                <a:t>Alerting</a:t>
+              </a:r>
+            </a:p>
+          </p:txBody>
+        </p:sp>
+      </p:grpSp>
       <p:sp>
         <p:nvSpPr>
           <p:cNvPr id="118" name="Rectangle 117">
@@ -7693,8 +7714,8 @@
         </p:nvSpPr>
         <p:spPr>
           <a:xfrm>
-            <a:off x="3382401" y="3896804"/>
-            <a:ext cx="4749313" cy="268802"/>
+            <a:off x="2349515" y="3943472"/>
+            <a:ext cx="5779510" cy="268802"/>
           </a:xfrm>
           <a:prstGeom prst="rect">
             <a:avLst/>
@@ -7771,7 +7792,7 @@
         </p:nvGrpSpPr>
         <p:grpSpPr>
           <a:xfrm>
-            <a:off x="3381996" y="4406133"/>
+            <a:off x="2349110" y="4452801"/>
             <a:ext cx="905717" cy="1033544"/>
             <a:chOff x="3381996" y="4406133"/>
             <a:chExt cx="905717" cy="1033544"/>
@@ -8009,7 +8030,7 @@
         </p:nvGrpSpPr>
         <p:grpSpPr>
           <a:xfrm>
-            <a:off x="7219902" y="1343011"/>
+            <a:off x="6187016" y="1389679"/>
             <a:ext cx="902611" cy="1029307"/>
             <a:chOff x="625233" y="1610862"/>
             <a:chExt cx="902611" cy="1029307"/>
@@ -8238,7 +8259,7 @@
         </p:nvGrpSpPr>
         <p:grpSpPr>
           <a:xfrm>
-            <a:off x="6264431" y="1350973"/>
+            <a:off x="5231545" y="1397641"/>
             <a:ext cx="902611" cy="1029307"/>
             <a:chOff x="3398219" y="1627681"/>
             <a:chExt cx="902611" cy="1029307"/>
@@ -8391,6 +8412,574 @@
                   <a:latin typeface="Vodafone Rg" pitchFamily="34" charset="0"/>
                 </a:rPr>
                 <a:t>PLACEMENT</a:t>
+              </a:r>
+            </a:p>
+          </p:txBody>
+        </p:sp>
+      </p:grpSp>
+      <p:grpSp>
+        <p:nvGrpSpPr>
+          <p:cNvPr id="110" name="Group 109">
+            <a:extLst>
+              <a:ext uri="{FF2B5EF4-FFF2-40B4-BE49-F238E27FC236}">
+                <a16:creationId xmlns:a16="http://schemas.microsoft.com/office/drawing/2014/main" id="{2535319B-F79E-4D21-8312-A5348C2C72BE}"/>
+              </a:ext>
+            </a:extLst>
+          </p:cNvPr>
+          <p:cNvGrpSpPr/>
+          <p:nvPr/>
+        </p:nvGrpSpPr>
+        <p:grpSpPr>
+          <a:xfrm>
+            <a:off x="7222629" y="2459723"/>
+            <a:ext cx="906396" cy="1034021"/>
+            <a:chOff x="7241129" y="2422982"/>
+            <a:chExt cx="906396" cy="1034021"/>
+          </a:xfrm>
+        </p:grpSpPr>
+        <p:sp>
+          <p:nvSpPr>
+            <p:cNvPr id="111" name="Rectangle 110">
+              <a:extLst>
+                <a:ext uri="{FF2B5EF4-FFF2-40B4-BE49-F238E27FC236}">
+                  <a16:creationId xmlns:a16="http://schemas.microsoft.com/office/drawing/2014/main" id="{BB1306A4-3362-4796-A673-D717BC1D49BA}"/>
+                </a:ext>
+              </a:extLst>
+            </p:cNvPr>
+            <p:cNvSpPr/>
+            <p:nvPr/>
+          </p:nvSpPr>
+          <p:spPr>
+            <a:xfrm>
+              <a:off x="7269695" y="2422982"/>
+              <a:ext cx="877830" cy="1034021"/>
+            </a:xfrm>
+            <a:prstGeom prst="rect">
+              <a:avLst/>
+            </a:prstGeom>
+            <a:solidFill>
+              <a:srgbClr val="92D050">
+                <a:alpha val="54000"/>
+              </a:srgbClr>
+            </a:solidFill>
+            <a:ln w="25400" cap="flat" cmpd="sng" algn="ctr">
+              <a:noFill/>
+              <a:prstDash val="solid"/>
+            </a:ln>
+            <a:effectLst/>
+          </p:spPr>
+          <p:style>
+            <a:lnRef idx="2">
+              <a:scrgbClr r="0" g="0" b="0"/>
+            </a:lnRef>
+            <a:fillRef idx="1">
+              <a:scrgbClr r="0" g="0" b="0"/>
+            </a:fillRef>
+            <a:effectRef idx="0">
+              <a:scrgbClr r="0" g="0" b="0"/>
+            </a:effectRef>
+            <a:fontRef idx="minor">
+              <a:schemeClr val="lt1"/>
+            </a:fontRef>
+          </p:style>
+          <p:txBody>
+            <a:bodyPr spcFirstLastPara="0" vert="horz" wrap="square" lIns="6350" tIns="6350" rIns="6350" bIns="6350" numCol="1" spcCol="1270" rtlCol="0" anchor="ctr" anchorCtr="0">
+              <a:noAutofit/>
+            </a:bodyPr>
+            <a:lstStyle/>
+            <a:p>
+              <a:pPr algn="ctr" defTabSz="444500">
+                <a:lnSpc>
+                  <a:spcPct val="90000"/>
+                </a:lnSpc>
+                <a:spcBef>
+                  <a:spcPct val="0"/>
+                </a:spcBef>
+                <a:spcAft>
+                  <a:spcPct val="35000"/>
+                </a:spcAft>
+              </a:pPr>
+              <a:endParaRPr lang="en-GB" sz="1000" kern="1200" dirty="0">
+                <a:solidFill>
+                  <a:srgbClr val="34342B"/>
+                </a:solidFill>
+                <a:latin typeface="Vodafone Rg" pitchFamily="34" charset="0"/>
+                <a:ea typeface="+mn-ea"/>
+                <a:cs typeface="+mn-cs"/>
+              </a:endParaRPr>
+            </a:p>
+          </p:txBody>
+        </p:sp>
+        <p:sp>
+          <p:nvSpPr>
+            <p:cNvPr id="112" name="TextBox 111">
+              <a:extLst>
+                <a:ext uri="{FF2B5EF4-FFF2-40B4-BE49-F238E27FC236}">
+                  <a16:creationId xmlns:a16="http://schemas.microsoft.com/office/drawing/2014/main" id="{B9C8E284-0050-4F1C-8850-639D48C4DAD4}"/>
+                </a:ext>
+              </a:extLst>
+            </p:cNvPr>
+            <p:cNvSpPr txBox="1"/>
+            <p:nvPr/>
+          </p:nvSpPr>
+          <p:spPr>
+            <a:xfrm>
+              <a:off x="7241129" y="2443366"/>
+              <a:ext cx="894879" cy="304368"/>
+            </a:xfrm>
+            <a:prstGeom prst="rect">
+              <a:avLst/>
+            </a:prstGeom>
+          </p:spPr>
+          <p:txBody>
+            <a:bodyPr wrap="square" lIns="0" tIns="0" rIns="0" bIns="0" rtlCol="0">
+              <a:noAutofit/>
+            </a:bodyPr>
+            <a:lstStyle/>
+            <a:p>
+              <a:pPr marL="0" indent="0" algn="ctr">
+                <a:buFont typeface="Arial" pitchFamily="34" charset="0"/>
+                <a:buNone/>
+              </a:pPr>
+              <a:r>
+                <a:rPr lang="en-GB" sz="800" b="1" dirty="0">
+                  <a:latin typeface="Vodafone Rg" pitchFamily="34" charset="0"/>
+                </a:rPr>
+                <a:t>Accelerator</a:t>
+              </a:r>
+            </a:p>
+            <a:p>
+              <a:pPr marL="0" indent="0" algn="ctr">
+                <a:buFont typeface="Arial" pitchFamily="34" charset="0"/>
+                <a:buNone/>
+              </a:pPr>
+              <a:r>
+                <a:rPr lang="en-GB" sz="800" b="1" dirty="0">
+                  <a:latin typeface="Vodafone Rg" pitchFamily="34" charset="0"/>
+                </a:rPr>
+                <a:t>Management</a:t>
+              </a:r>
+            </a:p>
+          </p:txBody>
+        </p:sp>
+        <p:sp>
+          <p:nvSpPr>
+            <p:cNvPr id="113" name="TextBox 112">
+              <a:extLst>
+                <a:ext uri="{FF2B5EF4-FFF2-40B4-BE49-F238E27FC236}">
+                  <a16:creationId xmlns:a16="http://schemas.microsoft.com/office/drawing/2014/main" id="{2112B30D-CA63-43FB-A3E2-606A3BF6CBA0}"/>
+                </a:ext>
+              </a:extLst>
+            </p:cNvPr>
+            <p:cNvSpPr txBox="1"/>
+            <p:nvPr/>
+          </p:nvSpPr>
+          <p:spPr>
+            <a:xfrm>
+              <a:off x="7479147" y="3308092"/>
+              <a:ext cx="440819" cy="113171"/>
+            </a:xfrm>
+            <a:prstGeom prst="rect">
+              <a:avLst/>
+            </a:prstGeom>
+          </p:spPr>
+          <p:style>
+            <a:lnRef idx="2">
+              <a:schemeClr val="accent1">
+                <a:shade val="50000"/>
+              </a:schemeClr>
+            </a:lnRef>
+            <a:fillRef idx="1">
+              <a:schemeClr val="accent1"/>
+            </a:fillRef>
+            <a:effectRef idx="0">
+              <a:schemeClr val="accent1"/>
+            </a:effectRef>
+            <a:fontRef idx="minor">
+              <a:schemeClr val="lt1"/>
+            </a:fontRef>
+          </p:style>
+          <p:txBody>
+            <a:bodyPr wrap="square" lIns="0" tIns="0" rIns="0" bIns="0" rtlCol="0">
+              <a:noAutofit/>
+            </a:bodyPr>
+            <a:lstStyle/>
+            <a:p>
+              <a:pPr marL="0" indent="0" algn="ctr">
+                <a:buFont typeface="Arial" pitchFamily="34" charset="0"/>
+                <a:buNone/>
+              </a:pPr>
+              <a:r>
+                <a:rPr lang="en-GB" sz="700" dirty="0">
+                  <a:latin typeface="Vodafone Rg" pitchFamily="34" charset="0"/>
+                </a:rPr>
+                <a:t>Optional</a:t>
+              </a:r>
+            </a:p>
+          </p:txBody>
+        </p:sp>
+        <p:pic>
+          <p:nvPicPr>
+            <p:cNvPr id="114" name="Picture 113" descr="A yellow and black fish&#10;&#10;Description automatically generated with low confidence">
+              <a:extLst>
+                <a:ext uri="{FF2B5EF4-FFF2-40B4-BE49-F238E27FC236}">
+                  <a16:creationId xmlns:a16="http://schemas.microsoft.com/office/drawing/2014/main" id="{2FFEE341-677D-4186-872E-049EC8C8AF33}"/>
+                </a:ext>
+              </a:extLst>
+            </p:cNvPr>
+            <p:cNvPicPr>
+              <a:picLocks noChangeAspect="1"/>
+            </p:cNvPicPr>
+            <p:nvPr/>
+          </p:nvPicPr>
+          <p:blipFill>
+            <a:blip r:embed="rId15">
+              <a:alphaModFix amt="49000"/>
+              <a:extLst>
+                <a:ext uri="{28A0092B-C50C-407E-A947-70E740481C1C}">
+                  <a14:useLocalDpi xmlns:a14="http://schemas.microsoft.com/office/drawing/2010/main" val="0"/>
+                </a:ext>
+              </a:extLst>
+            </a:blip>
+            <a:srcRect/>
+            <a:stretch>
+              <a:fillRect/>
+            </a:stretch>
+          </p:blipFill>
+          <p:spPr bwMode="auto">
+            <a:xfrm>
+              <a:off x="7439352" y="2712879"/>
+              <a:ext cx="538515" cy="454226"/>
+            </a:xfrm>
+            <a:prstGeom prst="rect">
+              <a:avLst/>
+            </a:prstGeom>
+            <a:solidFill>
+              <a:srgbClr val="92D050"/>
+            </a:solidFill>
+            <a:ln>
+              <a:noFill/>
+            </a:ln>
+          </p:spPr>
+        </p:pic>
+        <p:sp>
+          <p:nvSpPr>
+            <p:cNvPr id="125" name="TextBox 124">
+              <a:extLst>
+                <a:ext uri="{FF2B5EF4-FFF2-40B4-BE49-F238E27FC236}">
+                  <a16:creationId xmlns:a16="http://schemas.microsoft.com/office/drawing/2014/main" id="{06FE2293-8849-4278-8366-379725D99A2C}"/>
+                </a:ext>
+              </a:extLst>
+            </p:cNvPr>
+            <p:cNvSpPr txBox="1"/>
+            <p:nvPr/>
+          </p:nvSpPr>
+          <p:spPr>
+            <a:xfrm>
+              <a:off x="7439352" y="3092648"/>
+              <a:ext cx="542135" cy="215444"/>
+            </a:xfrm>
+            <a:prstGeom prst="rect">
+              <a:avLst/>
+            </a:prstGeom>
+            <a:noFill/>
+          </p:spPr>
+          <p:txBody>
+            <a:bodyPr wrap="none" rtlCol="0">
+              <a:spAutoFit/>
+            </a:bodyPr>
+            <a:lstStyle/>
+            <a:p>
+              <a:pPr algn="ctr"/>
+              <a:r>
+                <a:rPr lang="en-US" sz="800" b="1" dirty="0">
+                  <a:latin typeface="Vodafone Rg" pitchFamily="34" charset="0"/>
+                </a:rPr>
+                <a:t>CYBORG</a:t>
+              </a:r>
+            </a:p>
+          </p:txBody>
+        </p:sp>
+      </p:grpSp>
+      <p:grpSp>
+        <p:nvGrpSpPr>
+          <p:cNvPr id="126" name="Group 125">
+            <a:extLst>
+              <a:ext uri="{FF2B5EF4-FFF2-40B4-BE49-F238E27FC236}">
+                <a16:creationId xmlns:a16="http://schemas.microsoft.com/office/drawing/2014/main" id="{30455FE5-FBCF-413F-8B67-80F9198B2006}"/>
+              </a:ext>
+            </a:extLst>
+          </p:cNvPr>
+          <p:cNvGrpSpPr/>
+          <p:nvPr/>
+        </p:nvGrpSpPr>
+        <p:grpSpPr>
+          <a:xfrm>
+            <a:off x="7251195" y="4416469"/>
+            <a:ext cx="906396" cy="1034021"/>
+            <a:chOff x="7241129" y="2422982"/>
+            <a:chExt cx="906396" cy="1034021"/>
+          </a:xfrm>
+        </p:grpSpPr>
+        <p:sp>
+          <p:nvSpPr>
+            <p:cNvPr id="127" name="Rectangle 126">
+              <a:extLst>
+                <a:ext uri="{FF2B5EF4-FFF2-40B4-BE49-F238E27FC236}">
+                  <a16:creationId xmlns:a16="http://schemas.microsoft.com/office/drawing/2014/main" id="{62338819-349D-4EFC-9D17-FFC0F2FD3DD9}"/>
+                </a:ext>
+              </a:extLst>
+            </p:cNvPr>
+            <p:cNvSpPr/>
+            <p:nvPr/>
+          </p:nvSpPr>
+          <p:spPr>
+            <a:xfrm>
+              <a:off x="7269695" y="2422982"/>
+              <a:ext cx="877830" cy="1034021"/>
+            </a:xfrm>
+            <a:prstGeom prst="rect">
+              <a:avLst/>
+            </a:prstGeom>
+            <a:solidFill>
+              <a:srgbClr val="92D050">
+                <a:alpha val="54000"/>
+              </a:srgbClr>
+            </a:solidFill>
+            <a:ln w="25400" cap="flat" cmpd="sng" algn="ctr">
+              <a:noFill/>
+              <a:prstDash val="solid"/>
+            </a:ln>
+            <a:effectLst/>
+          </p:spPr>
+          <p:style>
+            <a:lnRef idx="2">
+              <a:scrgbClr r="0" g="0" b="0"/>
+            </a:lnRef>
+            <a:fillRef idx="1">
+              <a:scrgbClr r="0" g="0" b="0"/>
+            </a:fillRef>
+            <a:effectRef idx="0">
+              <a:scrgbClr r="0" g="0" b="0"/>
+            </a:effectRef>
+            <a:fontRef idx="minor">
+              <a:schemeClr val="lt1"/>
+            </a:fontRef>
+          </p:style>
+          <p:txBody>
+            <a:bodyPr spcFirstLastPara="0" vert="horz" wrap="square" lIns="6350" tIns="6350" rIns="6350" bIns="6350" numCol="1" spcCol="1270" rtlCol="0" anchor="ctr" anchorCtr="0">
+              <a:noAutofit/>
+            </a:bodyPr>
+            <a:lstStyle/>
+            <a:p>
+              <a:pPr algn="ctr" defTabSz="444500">
+                <a:lnSpc>
+                  <a:spcPct val="90000"/>
+                </a:lnSpc>
+                <a:spcBef>
+                  <a:spcPct val="0"/>
+                </a:spcBef>
+                <a:spcAft>
+                  <a:spcPct val="35000"/>
+                </a:spcAft>
+              </a:pPr>
+              <a:endParaRPr lang="en-GB" sz="1000" kern="1200" dirty="0">
+                <a:solidFill>
+                  <a:srgbClr val="34342B"/>
+                </a:solidFill>
+                <a:latin typeface="Vodafone Rg" pitchFamily="34" charset="0"/>
+                <a:ea typeface="+mn-ea"/>
+                <a:cs typeface="+mn-cs"/>
+              </a:endParaRPr>
+            </a:p>
+          </p:txBody>
+        </p:sp>
+        <p:sp>
+          <p:nvSpPr>
+            <p:cNvPr id="128" name="TextBox 127">
+              <a:extLst>
+                <a:ext uri="{FF2B5EF4-FFF2-40B4-BE49-F238E27FC236}">
+                  <a16:creationId xmlns:a16="http://schemas.microsoft.com/office/drawing/2014/main" id="{70C9945F-EFAB-4FF3-88DA-F2AAF36F5FDD}"/>
+                </a:ext>
+              </a:extLst>
+            </p:cNvPr>
+            <p:cNvSpPr txBox="1"/>
+            <p:nvPr/>
+          </p:nvSpPr>
+          <p:spPr>
+            <a:xfrm>
+              <a:off x="7241129" y="2443366"/>
+              <a:ext cx="894879" cy="304368"/>
+            </a:xfrm>
+            <a:prstGeom prst="rect">
+              <a:avLst/>
+            </a:prstGeom>
+          </p:spPr>
+          <p:txBody>
+            <a:bodyPr wrap="square" lIns="0" tIns="0" rIns="0" bIns="0" rtlCol="0">
+              <a:noAutofit/>
+            </a:bodyPr>
+            <a:lstStyle/>
+            <a:p>
+              <a:pPr marL="0" indent="0" algn="ctr">
+                <a:buFont typeface="Arial" pitchFamily="34" charset="0"/>
+                <a:buNone/>
+              </a:pPr>
+              <a:r>
+                <a:rPr lang="en-GB" sz="800" b="1" dirty="0">
+                  <a:latin typeface="Vodafone Rg" pitchFamily="34" charset="0"/>
+                </a:rPr>
+                <a:t>Accelerator</a:t>
+              </a:r>
+            </a:p>
+            <a:p>
+              <a:pPr marL="0" indent="0" algn="ctr">
+                <a:buFont typeface="Arial" pitchFamily="34" charset="0"/>
+                <a:buNone/>
+              </a:pPr>
+              <a:r>
+                <a:rPr lang="en-GB" sz="800" b="1" dirty="0">
+                  <a:latin typeface="Vodafone Rg" pitchFamily="34" charset="0"/>
+                </a:rPr>
+                <a:t>Management</a:t>
+              </a:r>
+            </a:p>
+          </p:txBody>
+        </p:sp>
+        <p:sp>
+          <p:nvSpPr>
+            <p:cNvPr id="129" name="TextBox 128">
+              <a:extLst>
+                <a:ext uri="{FF2B5EF4-FFF2-40B4-BE49-F238E27FC236}">
+                  <a16:creationId xmlns:a16="http://schemas.microsoft.com/office/drawing/2014/main" id="{7F09149C-CC38-4961-9BD9-383CBBF9DC5A}"/>
+                </a:ext>
+              </a:extLst>
+            </p:cNvPr>
+            <p:cNvSpPr txBox="1"/>
+            <p:nvPr/>
+          </p:nvSpPr>
+          <p:spPr>
+            <a:xfrm>
+              <a:off x="7479147" y="3308092"/>
+              <a:ext cx="440819" cy="113171"/>
+            </a:xfrm>
+            <a:prstGeom prst="rect">
+              <a:avLst/>
+            </a:prstGeom>
+          </p:spPr>
+          <p:style>
+            <a:lnRef idx="2">
+              <a:schemeClr val="accent1">
+                <a:shade val="50000"/>
+              </a:schemeClr>
+            </a:lnRef>
+            <a:fillRef idx="1">
+              <a:schemeClr val="accent1"/>
+            </a:fillRef>
+            <a:effectRef idx="0">
+              <a:schemeClr val="accent1"/>
+            </a:effectRef>
+            <a:fontRef idx="minor">
+              <a:schemeClr val="lt1"/>
+            </a:fontRef>
+          </p:style>
+          <p:txBody>
+            <a:bodyPr wrap="square" lIns="0" tIns="0" rIns="0" bIns="0" rtlCol="0">
+              <a:noAutofit/>
+            </a:bodyPr>
+            <a:lstStyle/>
+            <a:p>
+              <a:pPr marL="0" indent="0" algn="ctr">
+                <a:buFont typeface="Arial" pitchFamily="34" charset="0"/>
+                <a:buNone/>
+              </a:pPr>
+              <a:r>
+                <a:rPr lang="en-GB" sz="700" dirty="0">
+                  <a:latin typeface="Vodafone Rg" pitchFamily="34" charset="0"/>
+                </a:rPr>
+                <a:t>Optional</a:t>
+              </a:r>
+            </a:p>
+          </p:txBody>
+        </p:sp>
+        <p:pic>
+          <p:nvPicPr>
+            <p:cNvPr id="132" name="Picture 131" descr="A yellow and black fish&#10;&#10;Description automatically generated with low confidence">
+              <a:extLst>
+                <a:ext uri="{FF2B5EF4-FFF2-40B4-BE49-F238E27FC236}">
+                  <a16:creationId xmlns:a16="http://schemas.microsoft.com/office/drawing/2014/main" id="{79D39335-3DB1-4DCE-BEAF-A0E6FD01FB7E}"/>
+                </a:ext>
+              </a:extLst>
+            </p:cNvPr>
+            <p:cNvPicPr>
+              <a:picLocks noChangeAspect="1"/>
+            </p:cNvPicPr>
+            <p:nvPr/>
+          </p:nvPicPr>
+          <p:blipFill>
+            <a:blip r:embed="rId15">
+              <a:alphaModFix amt="49000"/>
+              <a:extLst>
+                <a:ext uri="{28A0092B-C50C-407E-A947-70E740481C1C}">
+                  <a14:useLocalDpi xmlns:a14="http://schemas.microsoft.com/office/drawing/2010/main" val="0"/>
+                </a:ext>
+              </a:extLst>
+            </a:blip>
+            <a:srcRect/>
+            <a:stretch>
+              <a:fillRect/>
+            </a:stretch>
+          </p:blipFill>
+          <p:spPr bwMode="auto">
+            <a:xfrm>
+              <a:off x="7439352" y="2712879"/>
+              <a:ext cx="538515" cy="454226"/>
+            </a:xfrm>
+            <a:prstGeom prst="rect">
+              <a:avLst/>
+            </a:prstGeom>
+            <a:solidFill>
+              <a:srgbClr val="92D050"/>
+            </a:solidFill>
+            <a:ln>
+              <a:noFill/>
+            </a:ln>
+          </p:spPr>
+        </p:pic>
+        <p:sp>
+          <p:nvSpPr>
+            <p:cNvPr id="135" name="TextBox 134">
+              <a:extLst>
+                <a:ext uri="{FF2B5EF4-FFF2-40B4-BE49-F238E27FC236}">
+                  <a16:creationId xmlns:a16="http://schemas.microsoft.com/office/drawing/2014/main" id="{0079B6DD-F8C5-4C0D-81D7-4352AA984886}"/>
+                </a:ext>
+              </a:extLst>
+            </p:cNvPr>
+            <p:cNvSpPr txBox="1"/>
+            <p:nvPr/>
+          </p:nvSpPr>
+          <p:spPr>
+            <a:xfrm>
+              <a:off x="7439352" y="3092648"/>
+              <a:ext cx="542135" cy="215444"/>
+            </a:xfrm>
+            <a:prstGeom prst="rect">
+              <a:avLst/>
+            </a:prstGeom>
+            <a:noFill/>
+          </p:spPr>
+          <p:txBody>
+            <a:bodyPr wrap="none" rtlCol="0">
+              <a:spAutoFit/>
+            </a:bodyPr>
+            <a:lstStyle/>
+            <a:p>
+              <a:pPr algn="ctr"/>
+              <a:r>
+                <a:rPr lang="en-US" sz="800" b="1" dirty="0">
+                  <a:latin typeface="Vodafone Rg" pitchFamily="34" charset="0"/>
+                </a:rPr>
+                <a:t>CYBORG</a:t>
               </a:r>
             </a:p>
           </p:txBody>
@@ -8706,10 +9295,22 @@
 
 <file path=customXml/item1.xml><?xml version="1.0" encoding="utf-8"?>
 <?mso-contentType ?>
-<SharedContentType xmlns="Microsoft.SharePoint.Taxonomy.ContentTypeSync" SourceId="34c87397-5fc1-491e-85e7-d6110dbe9cbd" ContentTypeId="0x0101" PreviousValue="false"/>
+<FormTemplates xmlns="http://schemas.microsoft.com/sharepoint/v3/contenttype/forms">
+  <Display>DocumentLibraryForm</Display>
+  <Edit>DocumentLibraryForm</Edit>
+  <New>DocumentLibraryForm</New>
+</FormTemplates>
 </file>
 
 <file path=customXml/item2.xml><?xml version="1.0" encoding="utf-8"?>
+<p:properties xmlns:p="http://schemas.microsoft.com/office/2006/metadata/properties" xmlns:xsi="http://www.w3.org/2001/XMLSchema-instance" xmlns:pc="http://schemas.microsoft.com/office/infopath/2007/PartnerControls">
+  <documentManagement>
+    <HideFromDelve xmlns="71c5aaf6-e6ce-465b-b873-5148d2a4c105">false</HideFromDelve>
+  </documentManagement>
+</p:properties>
+</file>
+
+<file path=customXml/item3.xml><?xml version="1.0" encoding="utf-8"?>
 <ct:contentTypeSchema xmlns:ct="http://schemas.microsoft.com/office/2006/metadata/contentType" xmlns:ma="http://schemas.microsoft.com/office/2006/metadata/properties/metaAttributes" ct:_="" ma:_="" ma:contentTypeName="Document" ma:contentTypeID="0x01010091DAD41AE1C547499DAD32324FDBCA83" ma:contentTypeVersion="11" ma:contentTypeDescription="Create a new document." ma:contentTypeScope="" ma:versionID="fe7bb4918db326f609b2286c3a60c3a3">
   <xsd:schema xmlns:xsd="http://www.w3.org/2001/XMLSchema" xmlns:xs="http://www.w3.org/2001/XMLSchema" xmlns:p="http://schemas.microsoft.com/office/2006/metadata/properties" xmlns:ns3="71c5aaf6-e6ce-465b-b873-5148d2a4c105" xmlns:ns4="3ff68e1f-d7e3-4b4f-a3e0-07f53f4abd0b" xmlns:ns5="12bbbc51-f7e9-481b-afc6-59484cfedc35" targetNamespace="http://schemas.microsoft.com/office/2006/metadata/properties" ma:root="true" ma:fieldsID="633697ff280d144c2353e69522d0f21b" ns3:_="" ns4:_="" ns5:_="">
     <xsd:import namespace="71c5aaf6-e6ce-465b-b873-5148d2a4c105"/>
@@ -8954,21 +9555,9 @@
 </ct:contentTypeSchema>
 </file>
 
-<file path=customXml/item3.xml><?xml version="1.0" encoding="utf-8"?>
-<p:properties xmlns:p="http://schemas.microsoft.com/office/2006/metadata/properties" xmlns:xsi="http://www.w3.org/2001/XMLSchema-instance" xmlns:pc="http://schemas.microsoft.com/office/infopath/2007/PartnerControls">
-  <documentManagement>
-    <HideFromDelve xmlns="71c5aaf6-e6ce-465b-b873-5148d2a4c105">false</HideFromDelve>
-  </documentManagement>
-</p:properties>
-</file>
-
 <file path=customXml/item4.xml><?xml version="1.0" encoding="utf-8"?>
 <?mso-contentType ?>
-<FormTemplates xmlns="http://schemas.microsoft.com/sharepoint/v3/contenttype/forms">
-  <Display>DocumentLibraryForm</Display>
-  <Edit>DocumentLibraryForm</Edit>
-  <New>DocumentLibraryForm</New>
-</FormTemplates>
+<SharedContentType xmlns="Microsoft.SharePoint.Taxonomy.ContentTypeSync" SourceId="34c87397-5fc1-491e-85e7-d6110dbe9cbd" ContentTypeId="0x0101" PreviousValue="false"/>
 </file>
 
 <file path=customXml/item5.xml><?xml version="1.0" encoding="utf-8"?>
@@ -8977,14 +9566,32 @@
 </file>
 
 <file path=customXml/itemProps1.xml><?xml version="1.0" encoding="utf-8"?>
-<ds:datastoreItem xmlns:ds="http://schemas.openxmlformats.org/officeDocument/2006/customXml" ds:itemID="{BBF2C940-6CC2-4409-A4AF-3215DA2CB557}">
+<ds:datastoreItem xmlns:ds="http://schemas.openxmlformats.org/officeDocument/2006/customXml" ds:itemID="{1BC04104-7754-4987-B71A-5D74337C7112}">
   <ds:schemaRefs>
-    <ds:schemaRef ds:uri="Microsoft.SharePoint.Taxonomy.ContentTypeSync"/>
+    <ds:schemaRef ds:uri="http://schemas.microsoft.com/sharepoint/v3/contenttype/forms"/>
   </ds:schemaRefs>
 </ds:datastoreItem>
 </file>
 
 <file path=customXml/itemProps2.xml><?xml version="1.0" encoding="utf-8"?>
+<ds:datastoreItem xmlns:ds="http://schemas.openxmlformats.org/officeDocument/2006/customXml" ds:itemID="{0F3EC747-72E4-4EB9-AC83-0B25392ACA02}">
+  <ds:schemaRefs>
+    <ds:schemaRef ds:uri="http://schemas.microsoft.com/office/2006/metadata/properties"/>
+    <ds:schemaRef ds:uri="http://purl.org/dc/elements/1.1/"/>
+    <ds:schemaRef ds:uri="71c5aaf6-e6ce-465b-b873-5148d2a4c105"/>
+    <ds:schemaRef ds:uri="http://schemas.microsoft.com/office/2006/documentManagement/types"/>
+    <ds:schemaRef ds:uri="http://schemas.microsoft.com/office/infopath/2007/PartnerControls"/>
+    <ds:schemaRef ds:uri="http://purl.org/dc/dcmitype/"/>
+    <ds:schemaRef ds:uri="12bbbc51-f7e9-481b-afc6-59484cfedc35"/>
+    <ds:schemaRef ds:uri="http://schemas.openxmlformats.org/package/2006/metadata/core-properties"/>
+    <ds:schemaRef ds:uri="3ff68e1f-d7e3-4b4f-a3e0-07f53f4abd0b"/>
+    <ds:schemaRef ds:uri="http://www.w3.org/XML/1998/namespace"/>
+    <ds:schemaRef ds:uri="http://purl.org/dc/terms/"/>
+  </ds:schemaRefs>
+</ds:datastoreItem>
+</file>
+
+<file path=customXml/itemProps3.xml><?xml version="1.0" encoding="utf-8"?>
 <ds:datastoreItem xmlns:ds="http://schemas.openxmlformats.org/officeDocument/2006/customXml" ds:itemID="{9E43C64A-2ED8-48B1-8FFD-1BA596FFEF63}">
   <ds:schemaRefs>
     <ds:schemaRef ds:uri="http://schemas.microsoft.com/office/2006/metadata/contentType"/>
@@ -9004,28 +9611,10 @@
 </ds:datastoreItem>
 </file>
 
-<file path=customXml/itemProps3.xml><?xml version="1.0" encoding="utf-8"?>
-<ds:datastoreItem xmlns:ds="http://schemas.openxmlformats.org/officeDocument/2006/customXml" ds:itemID="{0F3EC747-72E4-4EB9-AC83-0B25392ACA02}">
+<file path=customXml/itemProps4.xml><?xml version="1.0" encoding="utf-8"?>
+<ds:datastoreItem xmlns:ds="http://schemas.openxmlformats.org/officeDocument/2006/customXml" ds:itemID="{BBF2C940-6CC2-4409-A4AF-3215DA2CB557}">
   <ds:schemaRefs>
-    <ds:schemaRef ds:uri="http://schemas.microsoft.com/office/2006/metadata/properties"/>
-    <ds:schemaRef ds:uri="http://purl.org/dc/elements/1.1/"/>
-    <ds:schemaRef ds:uri="71c5aaf6-e6ce-465b-b873-5148d2a4c105"/>
-    <ds:schemaRef ds:uri="http://schemas.microsoft.com/office/2006/documentManagement/types"/>
-    <ds:schemaRef ds:uri="http://schemas.microsoft.com/office/infopath/2007/PartnerControls"/>
-    <ds:schemaRef ds:uri="http://purl.org/dc/dcmitype/"/>
-    <ds:schemaRef ds:uri="12bbbc51-f7e9-481b-afc6-59484cfedc35"/>
-    <ds:schemaRef ds:uri="http://schemas.openxmlformats.org/package/2006/metadata/core-properties"/>
-    <ds:schemaRef ds:uri="3ff68e1f-d7e3-4b4f-a3e0-07f53f4abd0b"/>
-    <ds:schemaRef ds:uri="http://www.w3.org/XML/1998/namespace"/>
-    <ds:schemaRef ds:uri="http://purl.org/dc/terms/"/>
-  </ds:schemaRefs>
-</ds:datastoreItem>
-</file>
-
-<file path=customXml/itemProps4.xml><?xml version="1.0" encoding="utf-8"?>
-<ds:datastoreItem xmlns:ds="http://schemas.openxmlformats.org/officeDocument/2006/customXml" ds:itemID="{1BC04104-7754-4987-B71A-5D74337C7112}">
-  <ds:schemaRefs>
-    <ds:schemaRef ds:uri="http://schemas.microsoft.com/sharepoint/v3/contenttype/forms"/>
+    <ds:schemaRef ds:uri="Microsoft.SharePoint.Taxonomy.ContentTypeSync"/>
   </ds:schemaRefs>
 </ds:datastoreItem>
 </file>

</xml_diff>

<commit_message>
[RA-1 Ch03/04] Add Cyborg (#2648)
* [RA-1 Ch03/04] Add Cyborg

Fixes #2496 

Re-insert 4.3.1.12 but with updated content

Other patches will:
- update table in 3.3.1.2
- update Figure in 3.3.1

* [RA-1 Ch03] Update table in 3.3.1.3

* [RA-1 Ch03] Core Services Source File

* [RA-1 Ch03] Core Services png file

* [RA-1 Ch04] Cyborg write-up minor correction
</commit_message>
<xml_diff>
--- a/doc/ref_arch/openstack/figures/artefacts/RA1-Ch03-Core-Cloud-Infra-Services.pptx
+++ b/doc/ref_arch/openstack/figures/artefacts/RA1-Ch03-Core-Cloud-Infra-Services.pptx
@@ -259,7 +259,7 @@
           <a:p>
             <a:fld id="{342159D6-67C7-40E2-8C3A-19E3D49AF9D3}" type="datetimeFigureOut">
               <a:rPr lang="en-US" smtClean="0"/>
-              <a:t>8/31/2020</a:t>
+              <a:t>10/11/2021</a:t>
             </a:fld>
             <a:endParaRPr lang="en-US"/>
           </a:p>
@@ -457,7 +457,7 @@
           <a:p>
             <a:fld id="{342159D6-67C7-40E2-8C3A-19E3D49AF9D3}" type="datetimeFigureOut">
               <a:rPr lang="en-US" smtClean="0"/>
-              <a:t>8/31/2020</a:t>
+              <a:t>10/11/2021</a:t>
             </a:fld>
             <a:endParaRPr lang="en-US"/>
           </a:p>
@@ -665,7 +665,7 @@
           <a:p>
             <a:fld id="{342159D6-67C7-40E2-8C3A-19E3D49AF9D3}" type="datetimeFigureOut">
               <a:rPr lang="en-US" smtClean="0"/>
-              <a:t>8/31/2020</a:t>
+              <a:t>10/11/2021</a:t>
             </a:fld>
             <a:endParaRPr lang="en-US"/>
           </a:p>
@@ -863,7 +863,7 @@
           <a:p>
             <a:fld id="{342159D6-67C7-40E2-8C3A-19E3D49AF9D3}" type="datetimeFigureOut">
               <a:rPr lang="en-US" smtClean="0"/>
-              <a:t>8/31/2020</a:t>
+              <a:t>10/11/2021</a:t>
             </a:fld>
             <a:endParaRPr lang="en-US"/>
           </a:p>
@@ -1138,7 +1138,7 @@
           <a:p>
             <a:fld id="{342159D6-67C7-40E2-8C3A-19E3D49AF9D3}" type="datetimeFigureOut">
               <a:rPr lang="en-US" smtClean="0"/>
-              <a:t>8/31/2020</a:t>
+              <a:t>10/11/2021</a:t>
             </a:fld>
             <a:endParaRPr lang="en-US"/>
           </a:p>
@@ -1403,7 +1403,7 @@
           <a:p>
             <a:fld id="{342159D6-67C7-40E2-8C3A-19E3D49AF9D3}" type="datetimeFigureOut">
               <a:rPr lang="en-US" smtClean="0"/>
-              <a:t>8/31/2020</a:t>
+              <a:t>10/11/2021</a:t>
             </a:fld>
             <a:endParaRPr lang="en-US"/>
           </a:p>
@@ -1815,7 +1815,7 @@
           <a:p>
             <a:fld id="{342159D6-67C7-40E2-8C3A-19E3D49AF9D3}" type="datetimeFigureOut">
               <a:rPr lang="en-US" smtClean="0"/>
-              <a:t>8/31/2020</a:t>
+              <a:t>10/11/2021</a:t>
             </a:fld>
             <a:endParaRPr lang="en-US"/>
           </a:p>
@@ -1956,7 +1956,7 @@
           <a:p>
             <a:fld id="{342159D6-67C7-40E2-8C3A-19E3D49AF9D3}" type="datetimeFigureOut">
               <a:rPr lang="en-US" smtClean="0"/>
-              <a:t>8/31/2020</a:t>
+              <a:t>10/11/2021</a:t>
             </a:fld>
             <a:endParaRPr lang="en-US"/>
           </a:p>
@@ -2069,7 +2069,7 @@
           <a:p>
             <a:fld id="{342159D6-67C7-40E2-8C3A-19E3D49AF9D3}" type="datetimeFigureOut">
               <a:rPr lang="en-US" smtClean="0"/>
-              <a:t>8/31/2020</a:t>
+              <a:t>10/11/2021</a:t>
             </a:fld>
             <a:endParaRPr lang="en-US"/>
           </a:p>
@@ -2380,7 +2380,7 @@
           <a:p>
             <a:fld id="{342159D6-67C7-40E2-8C3A-19E3D49AF9D3}" type="datetimeFigureOut">
               <a:rPr lang="en-US" smtClean="0"/>
-              <a:t>8/31/2020</a:t>
+              <a:t>10/11/2021</a:t>
             </a:fld>
             <a:endParaRPr lang="en-US"/>
           </a:p>
@@ -2668,7 +2668,7 @@
           <a:p>
             <a:fld id="{342159D6-67C7-40E2-8C3A-19E3D49AF9D3}" type="datetimeFigureOut">
               <a:rPr lang="en-US" smtClean="0"/>
-              <a:t>8/31/2020</a:t>
+              <a:t>10/11/2021</a:t>
             </a:fld>
             <a:endParaRPr lang="en-US"/>
           </a:p>
@@ -2909,7 +2909,7 @@
           <a:p>
             <a:fld id="{342159D6-67C7-40E2-8C3A-19E3D49AF9D3}" type="datetimeFigureOut">
               <a:rPr lang="en-US" smtClean="0"/>
-              <a:t>8/31/2020</a:t>
+              <a:t>10/11/2021</a:t>
             </a:fld>
             <a:endParaRPr lang="en-US"/>
           </a:p>
@@ -3340,8 +3340,8 @@
         </p:nvSpPr>
         <p:spPr>
           <a:xfrm>
-            <a:off x="3036105" y="4262627"/>
-            <a:ext cx="5384607" cy="1904530"/>
+            <a:off x="2003219" y="4309295"/>
+            <a:ext cx="6502606" cy="1904530"/>
           </a:xfrm>
           <a:prstGeom prst="rect">
             <a:avLst/>
@@ -3487,8 +3487,8 @@
         </p:nvSpPr>
         <p:spPr>
           <a:xfrm>
-            <a:off x="3409728" y="5778878"/>
-            <a:ext cx="4737797" cy="279824"/>
+            <a:off x="2376842" y="5825546"/>
+            <a:ext cx="5740665" cy="279824"/>
           </a:xfrm>
           <a:prstGeom prst="rect">
             <a:avLst/>
@@ -3565,8 +3565,8 @@
         </p:nvSpPr>
         <p:spPr>
           <a:xfrm>
-            <a:off x="3027873" y="276045"/>
-            <a:ext cx="5384607" cy="3925019"/>
+            <a:off x="2003219" y="345859"/>
+            <a:ext cx="6502606" cy="3925019"/>
           </a:xfrm>
           <a:prstGeom prst="rect">
             <a:avLst/>
@@ -3638,7 +3638,7 @@
         </p:nvSpPr>
         <p:spPr>
           <a:xfrm>
-            <a:off x="3405994" y="1074507"/>
+            <a:off x="2373108" y="1121175"/>
             <a:ext cx="4698083" cy="178087"/>
           </a:xfrm>
           <a:prstGeom prst="rect">
@@ -3712,7 +3712,7 @@
         </p:nvSpPr>
         <p:spPr>
           <a:xfrm rot="16200000">
-            <a:off x="2635933" y="1922611"/>
+            <a:off x="1603047" y="1969279"/>
             <a:ext cx="1152709" cy="219375"/>
           </a:xfrm>
           <a:prstGeom prst="rect">
@@ -3755,7 +3755,7 @@
         </p:nvSpPr>
         <p:spPr>
           <a:xfrm rot="16200000">
-            <a:off x="2625322" y="4908902"/>
+            <a:off x="1592436" y="4955570"/>
             <a:ext cx="1231984" cy="357234"/>
           </a:xfrm>
           <a:prstGeom prst="rect">
@@ -3795,7 +3795,7 @@
         </p:nvGrpSpPr>
         <p:grpSpPr>
           <a:xfrm>
-            <a:off x="3379031" y="500346"/>
+            <a:off x="2346145" y="547014"/>
             <a:ext cx="1277632" cy="501696"/>
             <a:chOff x="2932087" y="768280"/>
             <a:chExt cx="1277632" cy="501696"/>
@@ -3981,7 +3981,7 @@
         </p:nvGrpSpPr>
         <p:grpSpPr>
           <a:xfrm>
-            <a:off x="3398219" y="1343011"/>
+            <a:off x="2365333" y="1389679"/>
             <a:ext cx="902611" cy="1029307"/>
             <a:chOff x="3398219" y="1627681"/>
             <a:chExt cx="902611" cy="1029307"/>
@@ -4192,7 +4192,7 @@
         </p:nvGrpSpPr>
         <p:grpSpPr>
           <a:xfrm>
-            <a:off x="3396900" y="2459166"/>
+            <a:off x="2364014" y="2505834"/>
             <a:ext cx="906580" cy="1043959"/>
             <a:chOff x="3396900" y="2743836"/>
             <a:chExt cx="906580" cy="1043959"/>
@@ -4403,7 +4403,7 @@
         </p:nvGrpSpPr>
         <p:grpSpPr>
           <a:xfrm>
-            <a:off x="5306643" y="2447727"/>
+            <a:off x="4273757" y="2494395"/>
             <a:ext cx="896839" cy="1043959"/>
             <a:chOff x="5306643" y="2732397"/>
             <a:chExt cx="896839" cy="1043959"/>
@@ -4626,7 +4626,7 @@
         </p:nvGrpSpPr>
         <p:grpSpPr>
           <a:xfrm>
-            <a:off x="4354177" y="2447727"/>
+            <a:off x="3321291" y="2494395"/>
             <a:ext cx="896836" cy="1072201"/>
             <a:chOff x="4354177" y="2732397"/>
             <a:chExt cx="896836" cy="1072201"/>
@@ -4837,7 +4837,7 @@
         </p:nvGrpSpPr>
         <p:grpSpPr>
           <a:xfrm>
-            <a:off x="4354544" y="1350973"/>
+            <a:off x="3321658" y="1397641"/>
             <a:ext cx="883043" cy="1035351"/>
             <a:chOff x="4355516" y="1335684"/>
             <a:chExt cx="1846005" cy="1035351"/>
@@ -5078,7 +5078,7 @@
         </p:nvGrpSpPr>
         <p:grpSpPr>
           <a:xfrm>
-            <a:off x="5291301" y="1335670"/>
+            <a:off x="4258415" y="1382338"/>
             <a:ext cx="898917" cy="1043959"/>
             <a:chOff x="7188241" y="2725652"/>
             <a:chExt cx="898917" cy="1043959"/>
@@ -5373,7 +5373,7 @@
         </p:nvGrpSpPr>
         <p:grpSpPr>
           <a:xfrm>
-            <a:off x="6270111" y="2437604"/>
+            <a:off x="5237225" y="2484272"/>
             <a:ext cx="894878" cy="1043959"/>
             <a:chOff x="9804945" y="1602735"/>
             <a:chExt cx="894878" cy="1043959"/>
@@ -5599,7 +5599,7 @@
         </p:nvGrpSpPr>
         <p:grpSpPr>
           <a:xfrm>
-            <a:off x="7241129" y="2422982"/>
+            <a:off x="6208243" y="2469650"/>
             <a:ext cx="906396" cy="1034021"/>
             <a:chOff x="8091870" y="3344065"/>
             <a:chExt cx="906396" cy="1034021"/>
@@ -5837,8 +5837,8 @@
         </p:nvSpPr>
         <p:spPr>
           <a:xfrm>
-            <a:off x="5306643" y="3585062"/>
-            <a:ext cx="2840882" cy="254559"/>
+            <a:off x="4273756" y="3631730"/>
+            <a:ext cx="3843751" cy="254559"/>
           </a:xfrm>
           <a:prstGeom prst="rect">
             <a:avLst/>
@@ -5920,7 +5920,7 @@
         </p:nvGrpSpPr>
         <p:grpSpPr>
           <a:xfrm>
-            <a:off x="5303840" y="4355876"/>
+            <a:off x="4270954" y="4402544"/>
             <a:ext cx="906580" cy="1043959"/>
             <a:chOff x="3396900" y="2743836"/>
             <a:chExt cx="906580" cy="1043959"/>
@@ -6131,7 +6131,7 @@
         </p:nvGrpSpPr>
         <p:grpSpPr>
           <a:xfrm>
-            <a:off x="6290967" y="4382006"/>
+            <a:off x="5258081" y="4428674"/>
             <a:ext cx="896836" cy="1072201"/>
             <a:chOff x="4354177" y="2732397"/>
             <a:chExt cx="896836" cy="1072201"/>
@@ -6342,7 +6342,7 @@
         </p:nvSpPr>
         <p:spPr>
           <a:xfrm>
-            <a:off x="4354176" y="3576088"/>
+            <a:off x="3321290" y="3622756"/>
             <a:ext cx="881719" cy="221097"/>
           </a:xfrm>
           <a:prstGeom prst="rect">
@@ -6416,7 +6416,7 @@
         </p:nvSpPr>
         <p:spPr>
           <a:xfrm>
-            <a:off x="3405994" y="3576088"/>
+            <a:off x="2373108" y="3622756"/>
             <a:ext cx="881719" cy="221097"/>
           </a:xfrm>
           <a:prstGeom prst="rect">
@@ -6490,7 +6490,7 @@
         </p:nvGrpSpPr>
         <p:grpSpPr>
           <a:xfrm>
-            <a:off x="7260192" y="4359863"/>
+            <a:off x="6227306" y="4406531"/>
             <a:ext cx="896836" cy="1043959"/>
             <a:chOff x="7793663" y="4153047"/>
             <a:chExt cx="896836" cy="1043959"/>
@@ -6933,7 +6933,7 @@
         </p:nvGrpSpPr>
         <p:grpSpPr>
           <a:xfrm>
-            <a:off x="4338539" y="4380498"/>
+            <a:off x="3305653" y="4427166"/>
             <a:ext cx="905717" cy="1033544"/>
             <a:chOff x="4338539" y="4380498"/>
             <a:chExt cx="905717" cy="1033544"/>
@@ -7195,154 +7195,175 @@
           </p:spPr>
         </p:pic>
       </p:grpSp>
-      <p:sp>
-        <p:nvSpPr>
-          <p:cNvPr id="116" name="Rectangle 115">
-            <a:extLst>
-              <a:ext uri="{FF2B5EF4-FFF2-40B4-BE49-F238E27FC236}">
-                <a16:creationId xmlns:a16="http://schemas.microsoft.com/office/drawing/2014/main" id="{CAD5372E-BB4A-450C-88AC-9F2098D43162}"/>
-              </a:ext>
-            </a:extLst>
-          </p:cNvPr>
-          <p:cNvSpPr/>
+      <p:grpSp>
+        <p:nvGrpSpPr>
+          <p:cNvPr id="6" name="Group 5">
+            <a:extLst>
+              <a:ext uri="{FF2B5EF4-FFF2-40B4-BE49-F238E27FC236}">
+                <a16:creationId xmlns:a16="http://schemas.microsoft.com/office/drawing/2014/main" id="{D65254D7-64E8-4C98-AF4D-85AD45F4FC7B}"/>
+              </a:ext>
+            </a:extLst>
+          </p:cNvPr>
+          <p:cNvGrpSpPr/>
           <p:nvPr/>
-        </p:nvSpPr>
-        <p:spPr>
+        </p:nvGrpSpPr>
+        <p:grpSpPr>
           <a:xfrm>
-            <a:off x="5893333" y="5472816"/>
-            <a:ext cx="878728" cy="221097"/>
+            <a:off x="4315870" y="5519484"/>
+            <a:ext cx="1862609" cy="221097"/>
+            <a:chOff x="3876566" y="5519484"/>
+            <a:chExt cx="1862609" cy="221097"/>
           </a:xfrm>
-          <a:prstGeom prst="rect">
-            <a:avLst/>
-          </a:prstGeom>
-          <a:solidFill>
-            <a:srgbClr val="00B050"/>
-          </a:solidFill>
-          <a:ln w="25400" cap="flat" cmpd="sng" algn="ctr">
-            <a:noFill/>
-            <a:prstDash val="solid"/>
-          </a:ln>
-          <a:effectLst/>
-        </p:spPr>
-        <p:style>
-          <a:lnRef idx="2">
-            <a:scrgbClr r="0" g="0" b="0"/>
-          </a:lnRef>
-          <a:fillRef idx="1">
-            <a:scrgbClr r="0" g="0" b="0"/>
-          </a:fillRef>
-          <a:effectRef idx="0">
-            <a:scrgbClr r="0" g="0" b="0"/>
-          </a:effectRef>
-          <a:fontRef idx="minor">
-            <a:schemeClr val="lt1"/>
-          </a:fontRef>
-        </p:style>
-        <p:txBody>
-          <a:bodyPr spcFirstLastPara="0" vert="horz" wrap="square" lIns="6350" tIns="6350" rIns="6350" bIns="6350" numCol="1" spcCol="1270" rtlCol="0" anchor="ctr" anchorCtr="0">
-            <a:noAutofit/>
-          </a:bodyPr>
-          <a:lstStyle/>
-          <a:p>
-            <a:pPr algn="ctr" defTabSz="444500">
-              <a:lnSpc>
-                <a:spcPct val="90000"/>
-              </a:lnSpc>
-              <a:spcBef>
-                <a:spcPct val="0"/>
-              </a:spcBef>
-              <a:spcAft>
-                <a:spcPct val="35000"/>
-              </a:spcAft>
-            </a:pPr>
-            <a:r>
-              <a:rPr lang="en-GB" sz="1000" b="1" kern="1200" dirty="0">
-                <a:solidFill>
-                  <a:schemeClr val="tx1"/>
-                </a:solidFill>
-                <a:latin typeface="Vodafone Rg" pitchFamily="34" charset="0"/>
-                <a:ea typeface="+mn-ea"/>
-                <a:cs typeface="+mn-cs"/>
-              </a:rPr>
-              <a:t>Monitoring</a:t>
-            </a:r>
-          </a:p>
-        </p:txBody>
-      </p:sp>
-      <p:sp>
-        <p:nvSpPr>
-          <p:cNvPr id="117" name="Rectangle 116">
-            <a:extLst>
-              <a:ext uri="{FF2B5EF4-FFF2-40B4-BE49-F238E27FC236}">
-                <a16:creationId xmlns:a16="http://schemas.microsoft.com/office/drawing/2014/main" id="{C129B30A-03E5-4288-922C-75141416A189}"/>
-              </a:ext>
-            </a:extLst>
-          </p:cNvPr>
-          <p:cNvSpPr/>
-          <p:nvPr/>
-        </p:nvSpPr>
-        <p:spPr>
-          <a:xfrm>
-            <a:off x="4909452" y="5472816"/>
-            <a:ext cx="878728" cy="221097"/>
-          </a:xfrm>
-          <a:prstGeom prst="rect">
-            <a:avLst/>
-          </a:prstGeom>
-          <a:solidFill>
-            <a:srgbClr val="00B050"/>
-          </a:solidFill>
-          <a:ln w="25400" cap="flat" cmpd="sng" algn="ctr">
-            <a:noFill/>
-            <a:prstDash val="solid"/>
-          </a:ln>
-          <a:effectLst/>
-        </p:spPr>
-        <p:style>
-          <a:lnRef idx="2">
-            <a:scrgbClr r="0" g="0" b="0"/>
-          </a:lnRef>
-          <a:fillRef idx="1">
-            <a:scrgbClr r="0" g="0" b="0"/>
-          </a:fillRef>
-          <a:effectRef idx="0">
-            <a:scrgbClr r="0" g="0" b="0"/>
-          </a:effectRef>
-          <a:fontRef idx="minor">
-            <a:schemeClr val="lt1"/>
-          </a:fontRef>
-        </p:style>
-        <p:txBody>
-          <a:bodyPr spcFirstLastPara="0" vert="horz" wrap="square" lIns="6350" tIns="6350" rIns="6350" bIns="6350" numCol="1" spcCol="1270" rtlCol="0" anchor="ctr" anchorCtr="0">
-            <a:noAutofit/>
-          </a:bodyPr>
-          <a:lstStyle/>
-          <a:p>
-            <a:pPr algn="ctr" defTabSz="444500">
-              <a:lnSpc>
-                <a:spcPct val="90000"/>
-              </a:lnSpc>
-              <a:spcBef>
-                <a:spcPct val="0"/>
-              </a:spcBef>
-              <a:spcAft>
-                <a:spcPct val="35000"/>
-              </a:spcAft>
-            </a:pPr>
-            <a:r>
-              <a:rPr lang="en-GB" sz="1000" b="1" kern="1200" dirty="0">
-                <a:solidFill>
-                  <a:schemeClr val="tx1"/>
-                </a:solidFill>
-                <a:latin typeface="Vodafone Rg" pitchFamily="34" charset="0"/>
-                <a:ea typeface="+mn-ea"/>
-                <a:cs typeface="+mn-cs"/>
-              </a:rPr>
-              <a:t>Alerting</a:t>
-            </a:r>
-          </a:p>
-        </p:txBody>
-      </p:sp>
+        </p:grpSpPr>
+        <p:sp>
+          <p:nvSpPr>
+            <p:cNvPr id="116" name="Rectangle 115">
+              <a:extLst>
+                <a:ext uri="{FF2B5EF4-FFF2-40B4-BE49-F238E27FC236}">
+                  <a16:creationId xmlns:a16="http://schemas.microsoft.com/office/drawing/2014/main" id="{CAD5372E-BB4A-450C-88AC-9F2098D43162}"/>
+                </a:ext>
+              </a:extLst>
+            </p:cNvPr>
+            <p:cNvSpPr/>
+            <p:nvPr/>
+          </p:nvSpPr>
+          <p:spPr>
+            <a:xfrm>
+              <a:off x="4860447" y="5519484"/>
+              <a:ext cx="878728" cy="221097"/>
+            </a:xfrm>
+            <a:prstGeom prst="rect">
+              <a:avLst/>
+            </a:prstGeom>
+            <a:solidFill>
+              <a:srgbClr val="00B050"/>
+            </a:solidFill>
+            <a:ln w="25400" cap="flat" cmpd="sng" algn="ctr">
+              <a:noFill/>
+              <a:prstDash val="solid"/>
+            </a:ln>
+            <a:effectLst/>
+          </p:spPr>
+          <p:style>
+            <a:lnRef idx="2">
+              <a:scrgbClr r="0" g="0" b="0"/>
+            </a:lnRef>
+            <a:fillRef idx="1">
+              <a:scrgbClr r="0" g="0" b="0"/>
+            </a:fillRef>
+            <a:effectRef idx="0">
+              <a:scrgbClr r="0" g="0" b="0"/>
+            </a:effectRef>
+            <a:fontRef idx="minor">
+              <a:schemeClr val="lt1"/>
+            </a:fontRef>
+          </p:style>
+          <p:txBody>
+            <a:bodyPr spcFirstLastPara="0" vert="horz" wrap="square" lIns="6350" tIns="6350" rIns="6350" bIns="6350" numCol="1" spcCol="1270" rtlCol="0" anchor="ctr" anchorCtr="0">
+              <a:noAutofit/>
+            </a:bodyPr>
+            <a:lstStyle/>
+            <a:p>
+              <a:pPr algn="ctr" defTabSz="444500">
+                <a:lnSpc>
+                  <a:spcPct val="90000"/>
+                </a:lnSpc>
+                <a:spcBef>
+                  <a:spcPct val="0"/>
+                </a:spcBef>
+                <a:spcAft>
+                  <a:spcPct val="35000"/>
+                </a:spcAft>
+              </a:pPr>
+              <a:r>
+                <a:rPr lang="en-GB" sz="1000" b="1" kern="1200" dirty="0">
+                  <a:solidFill>
+                    <a:schemeClr val="tx1"/>
+                  </a:solidFill>
+                  <a:latin typeface="Vodafone Rg" pitchFamily="34" charset="0"/>
+                  <a:ea typeface="+mn-ea"/>
+                  <a:cs typeface="+mn-cs"/>
+                </a:rPr>
+                <a:t>Monitoring</a:t>
+              </a:r>
+            </a:p>
+          </p:txBody>
+        </p:sp>
+        <p:sp>
+          <p:nvSpPr>
+            <p:cNvPr id="117" name="Rectangle 116">
+              <a:extLst>
+                <a:ext uri="{FF2B5EF4-FFF2-40B4-BE49-F238E27FC236}">
+                  <a16:creationId xmlns:a16="http://schemas.microsoft.com/office/drawing/2014/main" id="{C129B30A-03E5-4288-922C-75141416A189}"/>
+                </a:ext>
+              </a:extLst>
+            </p:cNvPr>
+            <p:cNvSpPr/>
+            <p:nvPr/>
+          </p:nvSpPr>
+          <p:spPr>
+            <a:xfrm>
+              <a:off x="3876566" y="5519484"/>
+              <a:ext cx="878728" cy="221097"/>
+            </a:xfrm>
+            <a:prstGeom prst="rect">
+              <a:avLst/>
+            </a:prstGeom>
+            <a:solidFill>
+              <a:srgbClr val="00B050"/>
+            </a:solidFill>
+            <a:ln w="25400" cap="flat" cmpd="sng" algn="ctr">
+              <a:noFill/>
+              <a:prstDash val="solid"/>
+            </a:ln>
+            <a:effectLst/>
+          </p:spPr>
+          <p:style>
+            <a:lnRef idx="2">
+              <a:scrgbClr r="0" g="0" b="0"/>
+            </a:lnRef>
+            <a:fillRef idx="1">
+              <a:scrgbClr r="0" g="0" b="0"/>
+            </a:fillRef>
+            <a:effectRef idx="0">
+              <a:scrgbClr r="0" g="0" b="0"/>
+            </a:effectRef>
+            <a:fontRef idx="minor">
+              <a:schemeClr val="lt1"/>
+            </a:fontRef>
+          </p:style>
+          <p:txBody>
+            <a:bodyPr spcFirstLastPara="0" vert="horz" wrap="square" lIns="6350" tIns="6350" rIns="6350" bIns="6350" numCol="1" spcCol="1270" rtlCol="0" anchor="ctr" anchorCtr="0">
+              <a:noAutofit/>
+            </a:bodyPr>
+            <a:lstStyle/>
+            <a:p>
+              <a:pPr algn="ctr" defTabSz="444500">
+                <a:lnSpc>
+                  <a:spcPct val="90000"/>
+                </a:lnSpc>
+                <a:spcBef>
+                  <a:spcPct val="0"/>
+                </a:spcBef>
+                <a:spcAft>
+                  <a:spcPct val="35000"/>
+                </a:spcAft>
+              </a:pPr>
+              <a:r>
+                <a:rPr lang="en-GB" sz="1000" b="1" kern="1200" dirty="0">
+                  <a:solidFill>
+                    <a:schemeClr val="tx1"/>
+                  </a:solidFill>
+                  <a:latin typeface="Vodafone Rg" pitchFamily="34" charset="0"/>
+                  <a:ea typeface="+mn-ea"/>
+                  <a:cs typeface="+mn-cs"/>
+                </a:rPr>
+                <a:t>Alerting</a:t>
+              </a:r>
+            </a:p>
+          </p:txBody>
+        </p:sp>
+      </p:grpSp>
       <p:sp>
         <p:nvSpPr>
           <p:cNvPr id="118" name="Rectangle 117">
@@ -7693,8 +7714,8 @@
         </p:nvSpPr>
         <p:spPr>
           <a:xfrm>
-            <a:off x="3382401" y="3896804"/>
-            <a:ext cx="4749313" cy="268802"/>
+            <a:off x="2349515" y="3943472"/>
+            <a:ext cx="5779510" cy="268802"/>
           </a:xfrm>
           <a:prstGeom prst="rect">
             <a:avLst/>
@@ -7771,7 +7792,7 @@
         </p:nvGrpSpPr>
         <p:grpSpPr>
           <a:xfrm>
-            <a:off x="3381996" y="4406133"/>
+            <a:off x="2349110" y="4452801"/>
             <a:ext cx="905717" cy="1033544"/>
             <a:chOff x="3381996" y="4406133"/>
             <a:chExt cx="905717" cy="1033544"/>
@@ -8009,7 +8030,7 @@
         </p:nvGrpSpPr>
         <p:grpSpPr>
           <a:xfrm>
-            <a:off x="7219902" y="1343011"/>
+            <a:off x="6187016" y="1389679"/>
             <a:ext cx="902611" cy="1029307"/>
             <a:chOff x="625233" y="1610862"/>
             <a:chExt cx="902611" cy="1029307"/>
@@ -8238,7 +8259,7 @@
         </p:nvGrpSpPr>
         <p:grpSpPr>
           <a:xfrm>
-            <a:off x="6264431" y="1350973"/>
+            <a:off x="5231545" y="1397641"/>
             <a:ext cx="902611" cy="1029307"/>
             <a:chOff x="3398219" y="1627681"/>
             <a:chExt cx="902611" cy="1029307"/>
@@ -8391,6 +8412,574 @@
                   <a:latin typeface="Vodafone Rg" pitchFamily="34" charset="0"/>
                 </a:rPr>
                 <a:t>PLACEMENT</a:t>
+              </a:r>
+            </a:p>
+          </p:txBody>
+        </p:sp>
+      </p:grpSp>
+      <p:grpSp>
+        <p:nvGrpSpPr>
+          <p:cNvPr id="110" name="Group 109">
+            <a:extLst>
+              <a:ext uri="{FF2B5EF4-FFF2-40B4-BE49-F238E27FC236}">
+                <a16:creationId xmlns:a16="http://schemas.microsoft.com/office/drawing/2014/main" id="{2535319B-F79E-4D21-8312-A5348C2C72BE}"/>
+              </a:ext>
+            </a:extLst>
+          </p:cNvPr>
+          <p:cNvGrpSpPr/>
+          <p:nvPr/>
+        </p:nvGrpSpPr>
+        <p:grpSpPr>
+          <a:xfrm>
+            <a:off x="7222629" y="2459723"/>
+            <a:ext cx="906396" cy="1034021"/>
+            <a:chOff x="7241129" y="2422982"/>
+            <a:chExt cx="906396" cy="1034021"/>
+          </a:xfrm>
+        </p:grpSpPr>
+        <p:sp>
+          <p:nvSpPr>
+            <p:cNvPr id="111" name="Rectangle 110">
+              <a:extLst>
+                <a:ext uri="{FF2B5EF4-FFF2-40B4-BE49-F238E27FC236}">
+                  <a16:creationId xmlns:a16="http://schemas.microsoft.com/office/drawing/2014/main" id="{BB1306A4-3362-4796-A673-D717BC1D49BA}"/>
+                </a:ext>
+              </a:extLst>
+            </p:cNvPr>
+            <p:cNvSpPr/>
+            <p:nvPr/>
+          </p:nvSpPr>
+          <p:spPr>
+            <a:xfrm>
+              <a:off x="7269695" y="2422982"/>
+              <a:ext cx="877830" cy="1034021"/>
+            </a:xfrm>
+            <a:prstGeom prst="rect">
+              <a:avLst/>
+            </a:prstGeom>
+            <a:solidFill>
+              <a:srgbClr val="92D050">
+                <a:alpha val="54000"/>
+              </a:srgbClr>
+            </a:solidFill>
+            <a:ln w="25400" cap="flat" cmpd="sng" algn="ctr">
+              <a:noFill/>
+              <a:prstDash val="solid"/>
+            </a:ln>
+            <a:effectLst/>
+          </p:spPr>
+          <p:style>
+            <a:lnRef idx="2">
+              <a:scrgbClr r="0" g="0" b="0"/>
+            </a:lnRef>
+            <a:fillRef idx="1">
+              <a:scrgbClr r="0" g="0" b="0"/>
+            </a:fillRef>
+            <a:effectRef idx="0">
+              <a:scrgbClr r="0" g="0" b="0"/>
+            </a:effectRef>
+            <a:fontRef idx="minor">
+              <a:schemeClr val="lt1"/>
+            </a:fontRef>
+          </p:style>
+          <p:txBody>
+            <a:bodyPr spcFirstLastPara="0" vert="horz" wrap="square" lIns="6350" tIns="6350" rIns="6350" bIns="6350" numCol="1" spcCol="1270" rtlCol="0" anchor="ctr" anchorCtr="0">
+              <a:noAutofit/>
+            </a:bodyPr>
+            <a:lstStyle/>
+            <a:p>
+              <a:pPr algn="ctr" defTabSz="444500">
+                <a:lnSpc>
+                  <a:spcPct val="90000"/>
+                </a:lnSpc>
+                <a:spcBef>
+                  <a:spcPct val="0"/>
+                </a:spcBef>
+                <a:spcAft>
+                  <a:spcPct val="35000"/>
+                </a:spcAft>
+              </a:pPr>
+              <a:endParaRPr lang="en-GB" sz="1000" kern="1200" dirty="0">
+                <a:solidFill>
+                  <a:srgbClr val="34342B"/>
+                </a:solidFill>
+                <a:latin typeface="Vodafone Rg" pitchFamily="34" charset="0"/>
+                <a:ea typeface="+mn-ea"/>
+                <a:cs typeface="+mn-cs"/>
+              </a:endParaRPr>
+            </a:p>
+          </p:txBody>
+        </p:sp>
+        <p:sp>
+          <p:nvSpPr>
+            <p:cNvPr id="112" name="TextBox 111">
+              <a:extLst>
+                <a:ext uri="{FF2B5EF4-FFF2-40B4-BE49-F238E27FC236}">
+                  <a16:creationId xmlns:a16="http://schemas.microsoft.com/office/drawing/2014/main" id="{B9C8E284-0050-4F1C-8850-639D48C4DAD4}"/>
+                </a:ext>
+              </a:extLst>
+            </p:cNvPr>
+            <p:cNvSpPr txBox="1"/>
+            <p:nvPr/>
+          </p:nvSpPr>
+          <p:spPr>
+            <a:xfrm>
+              <a:off x="7241129" y="2443366"/>
+              <a:ext cx="894879" cy="304368"/>
+            </a:xfrm>
+            <a:prstGeom prst="rect">
+              <a:avLst/>
+            </a:prstGeom>
+          </p:spPr>
+          <p:txBody>
+            <a:bodyPr wrap="square" lIns="0" tIns="0" rIns="0" bIns="0" rtlCol="0">
+              <a:noAutofit/>
+            </a:bodyPr>
+            <a:lstStyle/>
+            <a:p>
+              <a:pPr marL="0" indent="0" algn="ctr">
+                <a:buFont typeface="Arial" pitchFamily="34" charset="0"/>
+                <a:buNone/>
+              </a:pPr>
+              <a:r>
+                <a:rPr lang="en-GB" sz="800" b="1" dirty="0">
+                  <a:latin typeface="Vodafone Rg" pitchFamily="34" charset="0"/>
+                </a:rPr>
+                <a:t>Accelerator</a:t>
+              </a:r>
+            </a:p>
+            <a:p>
+              <a:pPr marL="0" indent="0" algn="ctr">
+                <a:buFont typeface="Arial" pitchFamily="34" charset="0"/>
+                <a:buNone/>
+              </a:pPr>
+              <a:r>
+                <a:rPr lang="en-GB" sz="800" b="1" dirty="0">
+                  <a:latin typeface="Vodafone Rg" pitchFamily="34" charset="0"/>
+                </a:rPr>
+                <a:t>Management</a:t>
+              </a:r>
+            </a:p>
+          </p:txBody>
+        </p:sp>
+        <p:sp>
+          <p:nvSpPr>
+            <p:cNvPr id="113" name="TextBox 112">
+              <a:extLst>
+                <a:ext uri="{FF2B5EF4-FFF2-40B4-BE49-F238E27FC236}">
+                  <a16:creationId xmlns:a16="http://schemas.microsoft.com/office/drawing/2014/main" id="{2112B30D-CA63-43FB-A3E2-606A3BF6CBA0}"/>
+                </a:ext>
+              </a:extLst>
+            </p:cNvPr>
+            <p:cNvSpPr txBox="1"/>
+            <p:nvPr/>
+          </p:nvSpPr>
+          <p:spPr>
+            <a:xfrm>
+              <a:off x="7479147" y="3308092"/>
+              <a:ext cx="440819" cy="113171"/>
+            </a:xfrm>
+            <a:prstGeom prst="rect">
+              <a:avLst/>
+            </a:prstGeom>
+          </p:spPr>
+          <p:style>
+            <a:lnRef idx="2">
+              <a:schemeClr val="accent1">
+                <a:shade val="50000"/>
+              </a:schemeClr>
+            </a:lnRef>
+            <a:fillRef idx="1">
+              <a:schemeClr val="accent1"/>
+            </a:fillRef>
+            <a:effectRef idx="0">
+              <a:schemeClr val="accent1"/>
+            </a:effectRef>
+            <a:fontRef idx="minor">
+              <a:schemeClr val="lt1"/>
+            </a:fontRef>
+          </p:style>
+          <p:txBody>
+            <a:bodyPr wrap="square" lIns="0" tIns="0" rIns="0" bIns="0" rtlCol="0">
+              <a:noAutofit/>
+            </a:bodyPr>
+            <a:lstStyle/>
+            <a:p>
+              <a:pPr marL="0" indent="0" algn="ctr">
+                <a:buFont typeface="Arial" pitchFamily="34" charset="0"/>
+                <a:buNone/>
+              </a:pPr>
+              <a:r>
+                <a:rPr lang="en-GB" sz="700" dirty="0">
+                  <a:latin typeface="Vodafone Rg" pitchFamily="34" charset="0"/>
+                </a:rPr>
+                <a:t>Optional</a:t>
+              </a:r>
+            </a:p>
+          </p:txBody>
+        </p:sp>
+        <p:pic>
+          <p:nvPicPr>
+            <p:cNvPr id="114" name="Picture 113" descr="A yellow and black fish&#10;&#10;Description automatically generated with low confidence">
+              <a:extLst>
+                <a:ext uri="{FF2B5EF4-FFF2-40B4-BE49-F238E27FC236}">
+                  <a16:creationId xmlns:a16="http://schemas.microsoft.com/office/drawing/2014/main" id="{2FFEE341-677D-4186-872E-049EC8C8AF33}"/>
+                </a:ext>
+              </a:extLst>
+            </p:cNvPr>
+            <p:cNvPicPr>
+              <a:picLocks noChangeAspect="1"/>
+            </p:cNvPicPr>
+            <p:nvPr/>
+          </p:nvPicPr>
+          <p:blipFill>
+            <a:blip r:embed="rId15">
+              <a:alphaModFix amt="49000"/>
+              <a:extLst>
+                <a:ext uri="{28A0092B-C50C-407E-A947-70E740481C1C}">
+                  <a14:useLocalDpi xmlns:a14="http://schemas.microsoft.com/office/drawing/2010/main" val="0"/>
+                </a:ext>
+              </a:extLst>
+            </a:blip>
+            <a:srcRect/>
+            <a:stretch>
+              <a:fillRect/>
+            </a:stretch>
+          </p:blipFill>
+          <p:spPr bwMode="auto">
+            <a:xfrm>
+              <a:off x="7439352" y="2712879"/>
+              <a:ext cx="538515" cy="454226"/>
+            </a:xfrm>
+            <a:prstGeom prst="rect">
+              <a:avLst/>
+            </a:prstGeom>
+            <a:solidFill>
+              <a:srgbClr val="92D050"/>
+            </a:solidFill>
+            <a:ln>
+              <a:noFill/>
+            </a:ln>
+          </p:spPr>
+        </p:pic>
+        <p:sp>
+          <p:nvSpPr>
+            <p:cNvPr id="125" name="TextBox 124">
+              <a:extLst>
+                <a:ext uri="{FF2B5EF4-FFF2-40B4-BE49-F238E27FC236}">
+                  <a16:creationId xmlns:a16="http://schemas.microsoft.com/office/drawing/2014/main" id="{06FE2293-8849-4278-8366-379725D99A2C}"/>
+                </a:ext>
+              </a:extLst>
+            </p:cNvPr>
+            <p:cNvSpPr txBox="1"/>
+            <p:nvPr/>
+          </p:nvSpPr>
+          <p:spPr>
+            <a:xfrm>
+              <a:off x="7439352" y="3092648"/>
+              <a:ext cx="542135" cy="215444"/>
+            </a:xfrm>
+            <a:prstGeom prst="rect">
+              <a:avLst/>
+            </a:prstGeom>
+            <a:noFill/>
+          </p:spPr>
+          <p:txBody>
+            <a:bodyPr wrap="none" rtlCol="0">
+              <a:spAutoFit/>
+            </a:bodyPr>
+            <a:lstStyle/>
+            <a:p>
+              <a:pPr algn="ctr"/>
+              <a:r>
+                <a:rPr lang="en-US" sz="800" b="1" dirty="0">
+                  <a:latin typeface="Vodafone Rg" pitchFamily="34" charset="0"/>
+                </a:rPr>
+                <a:t>CYBORG</a:t>
+              </a:r>
+            </a:p>
+          </p:txBody>
+        </p:sp>
+      </p:grpSp>
+      <p:grpSp>
+        <p:nvGrpSpPr>
+          <p:cNvPr id="126" name="Group 125">
+            <a:extLst>
+              <a:ext uri="{FF2B5EF4-FFF2-40B4-BE49-F238E27FC236}">
+                <a16:creationId xmlns:a16="http://schemas.microsoft.com/office/drawing/2014/main" id="{30455FE5-FBCF-413F-8B67-80F9198B2006}"/>
+              </a:ext>
+            </a:extLst>
+          </p:cNvPr>
+          <p:cNvGrpSpPr/>
+          <p:nvPr/>
+        </p:nvGrpSpPr>
+        <p:grpSpPr>
+          <a:xfrm>
+            <a:off x="7251195" y="4416469"/>
+            <a:ext cx="906396" cy="1034021"/>
+            <a:chOff x="7241129" y="2422982"/>
+            <a:chExt cx="906396" cy="1034021"/>
+          </a:xfrm>
+        </p:grpSpPr>
+        <p:sp>
+          <p:nvSpPr>
+            <p:cNvPr id="127" name="Rectangle 126">
+              <a:extLst>
+                <a:ext uri="{FF2B5EF4-FFF2-40B4-BE49-F238E27FC236}">
+                  <a16:creationId xmlns:a16="http://schemas.microsoft.com/office/drawing/2014/main" id="{62338819-349D-4EFC-9D17-FFC0F2FD3DD9}"/>
+                </a:ext>
+              </a:extLst>
+            </p:cNvPr>
+            <p:cNvSpPr/>
+            <p:nvPr/>
+          </p:nvSpPr>
+          <p:spPr>
+            <a:xfrm>
+              <a:off x="7269695" y="2422982"/>
+              <a:ext cx="877830" cy="1034021"/>
+            </a:xfrm>
+            <a:prstGeom prst="rect">
+              <a:avLst/>
+            </a:prstGeom>
+            <a:solidFill>
+              <a:srgbClr val="92D050">
+                <a:alpha val="54000"/>
+              </a:srgbClr>
+            </a:solidFill>
+            <a:ln w="25400" cap="flat" cmpd="sng" algn="ctr">
+              <a:noFill/>
+              <a:prstDash val="solid"/>
+            </a:ln>
+            <a:effectLst/>
+          </p:spPr>
+          <p:style>
+            <a:lnRef idx="2">
+              <a:scrgbClr r="0" g="0" b="0"/>
+            </a:lnRef>
+            <a:fillRef idx="1">
+              <a:scrgbClr r="0" g="0" b="0"/>
+            </a:fillRef>
+            <a:effectRef idx="0">
+              <a:scrgbClr r="0" g="0" b="0"/>
+            </a:effectRef>
+            <a:fontRef idx="minor">
+              <a:schemeClr val="lt1"/>
+            </a:fontRef>
+          </p:style>
+          <p:txBody>
+            <a:bodyPr spcFirstLastPara="0" vert="horz" wrap="square" lIns="6350" tIns="6350" rIns="6350" bIns="6350" numCol="1" spcCol="1270" rtlCol="0" anchor="ctr" anchorCtr="0">
+              <a:noAutofit/>
+            </a:bodyPr>
+            <a:lstStyle/>
+            <a:p>
+              <a:pPr algn="ctr" defTabSz="444500">
+                <a:lnSpc>
+                  <a:spcPct val="90000"/>
+                </a:lnSpc>
+                <a:spcBef>
+                  <a:spcPct val="0"/>
+                </a:spcBef>
+                <a:spcAft>
+                  <a:spcPct val="35000"/>
+                </a:spcAft>
+              </a:pPr>
+              <a:endParaRPr lang="en-GB" sz="1000" kern="1200" dirty="0">
+                <a:solidFill>
+                  <a:srgbClr val="34342B"/>
+                </a:solidFill>
+                <a:latin typeface="Vodafone Rg" pitchFamily="34" charset="0"/>
+                <a:ea typeface="+mn-ea"/>
+                <a:cs typeface="+mn-cs"/>
+              </a:endParaRPr>
+            </a:p>
+          </p:txBody>
+        </p:sp>
+        <p:sp>
+          <p:nvSpPr>
+            <p:cNvPr id="128" name="TextBox 127">
+              <a:extLst>
+                <a:ext uri="{FF2B5EF4-FFF2-40B4-BE49-F238E27FC236}">
+                  <a16:creationId xmlns:a16="http://schemas.microsoft.com/office/drawing/2014/main" id="{70C9945F-EFAB-4FF3-88DA-F2AAF36F5FDD}"/>
+                </a:ext>
+              </a:extLst>
+            </p:cNvPr>
+            <p:cNvSpPr txBox="1"/>
+            <p:nvPr/>
+          </p:nvSpPr>
+          <p:spPr>
+            <a:xfrm>
+              <a:off x="7241129" y="2443366"/>
+              <a:ext cx="894879" cy="304368"/>
+            </a:xfrm>
+            <a:prstGeom prst="rect">
+              <a:avLst/>
+            </a:prstGeom>
+          </p:spPr>
+          <p:txBody>
+            <a:bodyPr wrap="square" lIns="0" tIns="0" rIns="0" bIns="0" rtlCol="0">
+              <a:noAutofit/>
+            </a:bodyPr>
+            <a:lstStyle/>
+            <a:p>
+              <a:pPr marL="0" indent="0" algn="ctr">
+                <a:buFont typeface="Arial" pitchFamily="34" charset="0"/>
+                <a:buNone/>
+              </a:pPr>
+              <a:r>
+                <a:rPr lang="en-GB" sz="800" b="1" dirty="0">
+                  <a:latin typeface="Vodafone Rg" pitchFamily="34" charset="0"/>
+                </a:rPr>
+                <a:t>Accelerator</a:t>
+              </a:r>
+            </a:p>
+            <a:p>
+              <a:pPr marL="0" indent="0" algn="ctr">
+                <a:buFont typeface="Arial" pitchFamily="34" charset="0"/>
+                <a:buNone/>
+              </a:pPr>
+              <a:r>
+                <a:rPr lang="en-GB" sz="800" b="1" dirty="0">
+                  <a:latin typeface="Vodafone Rg" pitchFamily="34" charset="0"/>
+                </a:rPr>
+                <a:t>Management</a:t>
+              </a:r>
+            </a:p>
+          </p:txBody>
+        </p:sp>
+        <p:sp>
+          <p:nvSpPr>
+            <p:cNvPr id="129" name="TextBox 128">
+              <a:extLst>
+                <a:ext uri="{FF2B5EF4-FFF2-40B4-BE49-F238E27FC236}">
+                  <a16:creationId xmlns:a16="http://schemas.microsoft.com/office/drawing/2014/main" id="{7F09149C-CC38-4961-9BD9-383CBBF9DC5A}"/>
+                </a:ext>
+              </a:extLst>
+            </p:cNvPr>
+            <p:cNvSpPr txBox="1"/>
+            <p:nvPr/>
+          </p:nvSpPr>
+          <p:spPr>
+            <a:xfrm>
+              <a:off x="7479147" y="3308092"/>
+              <a:ext cx="440819" cy="113171"/>
+            </a:xfrm>
+            <a:prstGeom prst="rect">
+              <a:avLst/>
+            </a:prstGeom>
+          </p:spPr>
+          <p:style>
+            <a:lnRef idx="2">
+              <a:schemeClr val="accent1">
+                <a:shade val="50000"/>
+              </a:schemeClr>
+            </a:lnRef>
+            <a:fillRef idx="1">
+              <a:schemeClr val="accent1"/>
+            </a:fillRef>
+            <a:effectRef idx="0">
+              <a:schemeClr val="accent1"/>
+            </a:effectRef>
+            <a:fontRef idx="minor">
+              <a:schemeClr val="lt1"/>
+            </a:fontRef>
+          </p:style>
+          <p:txBody>
+            <a:bodyPr wrap="square" lIns="0" tIns="0" rIns="0" bIns="0" rtlCol="0">
+              <a:noAutofit/>
+            </a:bodyPr>
+            <a:lstStyle/>
+            <a:p>
+              <a:pPr marL="0" indent="0" algn="ctr">
+                <a:buFont typeface="Arial" pitchFamily="34" charset="0"/>
+                <a:buNone/>
+              </a:pPr>
+              <a:r>
+                <a:rPr lang="en-GB" sz="700" dirty="0">
+                  <a:latin typeface="Vodafone Rg" pitchFamily="34" charset="0"/>
+                </a:rPr>
+                <a:t>Optional</a:t>
+              </a:r>
+            </a:p>
+          </p:txBody>
+        </p:sp>
+        <p:pic>
+          <p:nvPicPr>
+            <p:cNvPr id="132" name="Picture 131" descr="A yellow and black fish&#10;&#10;Description automatically generated with low confidence">
+              <a:extLst>
+                <a:ext uri="{FF2B5EF4-FFF2-40B4-BE49-F238E27FC236}">
+                  <a16:creationId xmlns:a16="http://schemas.microsoft.com/office/drawing/2014/main" id="{79D39335-3DB1-4DCE-BEAF-A0E6FD01FB7E}"/>
+                </a:ext>
+              </a:extLst>
+            </p:cNvPr>
+            <p:cNvPicPr>
+              <a:picLocks noChangeAspect="1"/>
+            </p:cNvPicPr>
+            <p:nvPr/>
+          </p:nvPicPr>
+          <p:blipFill>
+            <a:blip r:embed="rId15">
+              <a:alphaModFix amt="49000"/>
+              <a:extLst>
+                <a:ext uri="{28A0092B-C50C-407E-A947-70E740481C1C}">
+                  <a14:useLocalDpi xmlns:a14="http://schemas.microsoft.com/office/drawing/2010/main" val="0"/>
+                </a:ext>
+              </a:extLst>
+            </a:blip>
+            <a:srcRect/>
+            <a:stretch>
+              <a:fillRect/>
+            </a:stretch>
+          </p:blipFill>
+          <p:spPr bwMode="auto">
+            <a:xfrm>
+              <a:off x="7439352" y="2712879"/>
+              <a:ext cx="538515" cy="454226"/>
+            </a:xfrm>
+            <a:prstGeom prst="rect">
+              <a:avLst/>
+            </a:prstGeom>
+            <a:solidFill>
+              <a:srgbClr val="92D050"/>
+            </a:solidFill>
+            <a:ln>
+              <a:noFill/>
+            </a:ln>
+          </p:spPr>
+        </p:pic>
+        <p:sp>
+          <p:nvSpPr>
+            <p:cNvPr id="135" name="TextBox 134">
+              <a:extLst>
+                <a:ext uri="{FF2B5EF4-FFF2-40B4-BE49-F238E27FC236}">
+                  <a16:creationId xmlns:a16="http://schemas.microsoft.com/office/drawing/2014/main" id="{0079B6DD-F8C5-4C0D-81D7-4352AA984886}"/>
+                </a:ext>
+              </a:extLst>
+            </p:cNvPr>
+            <p:cNvSpPr txBox="1"/>
+            <p:nvPr/>
+          </p:nvSpPr>
+          <p:spPr>
+            <a:xfrm>
+              <a:off x="7439352" y="3092648"/>
+              <a:ext cx="542135" cy="215444"/>
+            </a:xfrm>
+            <a:prstGeom prst="rect">
+              <a:avLst/>
+            </a:prstGeom>
+            <a:noFill/>
+          </p:spPr>
+          <p:txBody>
+            <a:bodyPr wrap="none" rtlCol="0">
+              <a:spAutoFit/>
+            </a:bodyPr>
+            <a:lstStyle/>
+            <a:p>
+              <a:pPr algn="ctr"/>
+              <a:r>
+                <a:rPr lang="en-US" sz="800" b="1" dirty="0">
+                  <a:latin typeface="Vodafone Rg" pitchFamily="34" charset="0"/>
+                </a:rPr>
+                <a:t>CYBORG</a:t>
               </a:r>
             </a:p>
           </p:txBody>
@@ -8706,10 +9295,22 @@
 
 <file path=customXml/item1.xml><?xml version="1.0" encoding="utf-8"?>
 <?mso-contentType ?>
-<SharedContentType xmlns="Microsoft.SharePoint.Taxonomy.ContentTypeSync" SourceId="34c87397-5fc1-491e-85e7-d6110dbe9cbd" ContentTypeId="0x0101" PreviousValue="false"/>
+<FormTemplates xmlns="http://schemas.microsoft.com/sharepoint/v3/contenttype/forms">
+  <Display>DocumentLibraryForm</Display>
+  <Edit>DocumentLibraryForm</Edit>
+  <New>DocumentLibraryForm</New>
+</FormTemplates>
 </file>
 
 <file path=customXml/item2.xml><?xml version="1.0" encoding="utf-8"?>
+<p:properties xmlns:p="http://schemas.microsoft.com/office/2006/metadata/properties" xmlns:xsi="http://www.w3.org/2001/XMLSchema-instance" xmlns:pc="http://schemas.microsoft.com/office/infopath/2007/PartnerControls">
+  <documentManagement>
+    <HideFromDelve xmlns="71c5aaf6-e6ce-465b-b873-5148d2a4c105">false</HideFromDelve>
+  </documentManagement>
+</p:properties>
+</file>
+
+<file path=customXml/item3.xml><?xml version="1.0" encoding="utf-8"?>
 <ct:contentTypeSchema xmlns:ct="http://schemas.microsoft.com/office/2006/metadata/contentType" xmlns:ma="http://schemas.microsoft.com/office/2006/metadata/properties/metaAttributes" ct:_="" ma:_="" ma:contentTypeName="Document" ma:contentTypeID="0x01010091DAD41AE1C547499DAD32324FDBCA83" ma:contentTypeVersion="11" ma:contentTypeDescription="Create a new document." ma:contentTypeScope="" ma:versionID="fe7bb4918db326f609b2286c3a60c3a3">
   <xsd:schema xmlns:xsd="http://www.w3.org/2001/XMLSchema" xmlns:xs="http://www.w3.org/2001/XMLSchema" xmlns:p="http://schemas.microsoft.com/office/2006/metadata/properties" xmlns:ns3="71c5aaf6-e6ce-465b-b873-5148d2a4c105" xmlns:ns4="3ff68e1f-d7e3-4b4f-a3e0-07f53f4abd0b" xmlns:ns5="12bbbc51-f7e9-481b-afc6-59484cfedc35" targetNamespace="http://schemas.microsoft.com/office/2006/metadata/properties" ma:root="true" ma:fieldsID="633697ff280d144c2353e69522d0f21b" ns3:_="" ns4:_="" ns5:_="">
     <xsd:import namespace="71c5aaf6-e6ce-465b-b873-5148d2a4c105"/>
@@ -8954,21 +9555,9 @@
 </ct:contentTypeSchema>
 </file>
 
-<file path=customXml/item3.xml><?xml version="1.0" encoding="utf-8"?>
-<p:properties xmlns:p="http://schemas.microsoft.com/office/2006/metadata/properties" xmlns:xsi="http://www.w3.org/2001/XMLSchema-instance" xmlns:pc="http://schemas.microsoft.com/office/infopath/2007/PartnerControls">
-  <documentManagement>
-    <HideFromDelve xmlns="71c5aaf6-e6ce-465b-b873-5148d2a4c105">false</HideFromDelve>
-  </documentManagement>
-</p:properties>
-</file>
-
 <file path=customXml/item4.xml><?xml version="1.0" encoding="utf-8"?>
 <?mso-contentType ?>
-<FormTemplates xmlns="http://schemas.microsoft.com/sharepoint/v3/contenttype/forms">
-  <Display>DocumentLibraryForm</Display>
-  <Edit>DocumentLibraryForm</Edit>
-  <New>DocumentLibraryForm</New>
-</FormTemplates>
+<SharedContentType xmlns="Microsoft.SharePoint.Taxonomy.ContentTypeSync" SourceId="34c87397-5fc1-491e-85e7-d6110dbe9cbd" ContentTypeId="0x0101" PreviousValue="false"/>
 </file>
 
 <file path=customXml/item5.xml><?xml version="1.0" encoding="utf-8"?>
@@ -8977,14 +9566,32 @@
 </file>
 
 <file path=customXml/itemProps1.xml><?xml version="1.0" encoding="utf-8"?>
-<ds:datastoreItem xmlns:ds="http://schemas.openxmlformats.org/officeDocument/2006/customXml" ds:itemID="{BBF2C940-6CC2-4409-A4AF-3215DA2CB557}">
+<ds:datastoreItem xmlns:ds="http://schemas.openxmlformats.org/officeDocument/2006/customXml" ds:itemID="{1BC04104-7754-4987-B71A-5D74337C7112}">
   <ds:schemaRefs>
-    <ds:schemaRef ds:uri="Microsoft.SharePoint.Taxonomy.ContentTypeSync"/>
+    <ds:schemaRef ds:uri="http://schemas.microsoft.com/sharepoint/v3/contenttype/forms"/>
   </ds:schemaRefs>
 </ds:datastoreItem>
 </file>
 
 <file path=customXml/itemProps2.xml><?xml version="1.0" encoding="utf-8"?>
+<ds:datastoreItem xmlns:ds="http://schemas.openxmlformats.org/officeDocument/2006/customXml" ds:itemID="{0F3EC747-72E4-4EB9-AC83-0B25392ACA02}">
+  <ds:schemaRefs>
+    <ds:schemaRef ds:uri="http://schemas.microsoft.com/office/2006/metadata/properties"/>
+    <ds:schemaRef ds:uri="http://purl.org/dc/elements/1.1/"/>
+    <ds:schemaRef ds:uri="71c5aaf6-e6ce-465b-b873-5148d2a4c105"/>
+    <ds:schemaRef ds:uri="http://schemas.microsoft.com/office/2006/documentManagement/types"/>
+    <ds:schemaRef ds:uri="http://schemas.microsoft.com/office/infopath/2007/PartnerControls"/>
+    <ds:schemaRef ds:uri="http://purl.org/dc/dcmitype/"/>
+    <ds:schemaRef ds:uri="12bbbc51-f7e9-481b-afc6-59484cfedc35"/>
+    <ds:schemaRef ds:uri="http://schemas.openxmlformats.org/package/2006/metadata/core-properties"/>
+    <ds:schemaRef ds:uri="3ff68e1f-d7e3-4b4f-a3e0-07f53f4abd0b"/>
+    <ds:schemaRef ds:uri="http://www.w3.org/XML/1998/namespace"/>
+    <ds:schemaRef ds:uri="http://purl.org/dc/terms/"/>
+  </ds:schemaRefs>
+</ds:datastoreItem>
+</file>
+
+<file path=customXml/itemProps3.xml><?xml version="1.0" encoding="utf-8"?>
 <ds:datastoreItem xmlns:ds="http://schemas.openxmlformats.org/officeDocument/2006/customXml" ds:itemID="{9E43C64A-2ED8-48B1-8FFD-1BA596FFEF63}">
   <ds:schemaRefs>
     <ds:schemaRef ds:uri="http://schemas.microsoft.com/office/2006/metadata/contentType"/>
@@ -9004,28 +9611,10 @@
 </ds:datastoreItem>
 </file>
 
-<file path=customXml/itemProps3.xml><?xml version="1.0" encoding="utf-8"?>
-<ds:datastoreItem xmlns:ds="http://schemas.openxmlformats.org/officeDocument/2006/customXml" ds:itemID="{0F3EC747-72E4-4EB9-AC83-0B25392ACA02}">
+<file path=customXml/itemProps4.xml><?xml version="1.0" encoding="utf-8"?>
+<ds:datastoreItem xmlns:ds="http://schemas.openxmlformats.org/officeDocument/2006/customXml" ds:itemID="{BBF2C940-6CC2-4409-A4AF-3215DA2CB557}">
   <ds:schemaRefs>
-    <ds:schemaRef ds:uri="http://schemas.microsoft.com/office/2006/metadata/properties"/>
-    <ds:schemaRef ds:uri="http://purl.org/dc/elements/1.1/"/>
-    <ds:schemaRef ds:uri="71c5aaf6-e6ce-465b-b873-5148d2a4c105"/>
-    <ds:schemaRef ds:uri="http://schemas.microsoft.com/office/2006/documentManagement/types"/>
-    <ds:schemaRef ds:uri="http://schemas.microsoft.com/office/infopath/2007/PartnerControls"/>
-    <ds:schemaRef ds:uri="http://purl.org/dc/dcmitype/"/>
-    <ds:schemaRef ds:uri="12bbbc51-f7e9-481b-afc6-59484cfedc35"/>
-    <ds:schemaRef ds:uri="http://schemas.openxmlformats.org/package/2006/metadata/core-properties"/>
-    <ds:schemaRef ds:uri="3ff68e1f-d7e3-4b4f-a3e0-07f53f4abd0b"/>
-    <ds:schemaRef ds:uri="http://www.w3.org/XML/1998/namespace"/>
-    <ds:schemaRef ds:uri="http://purl.org/dc/terms/"/>
-  </ds:schemaRefs>
-</ds:datastoreItem>
-</file>
-
-<file path=customXml/itemProps4.xml><?xml version="1.0" encoding="utf-8"?>
-<ds:datastoreItem xmlns:ds="http://schemas.openxmlformats.org/officeDocument/2006/customXml" ds:itemID="{1BC04104-7754-4987-B71A-5D74337C7112}">
-  <ds:schemaRefs>
-    <ds:schemaRef ds:uri="http://schemas.microsoft.com/sharepoint/v3/contenttype/forms"/>
+    <ds:schemaRef ds:uri="Microsoft.SharePoint.Taxonomy.ContentTypeSync"/>
   </ds:schemaRefs>
 </ds:datastoreItem>
 </file>

</xml_diff>